<commit_message>
Updates through 2/18/25; add Tutorial folder and files
</commit_message>
<xml_diff>
--- a/Best_Practices_Coded_Models.pptx
+++ b/Best_Practices_Coded_Models.pptx
@@ -7,7 +7,13 @@
   <p:sldIdLst>
     <p:sldId id="256" r:id="rId2"/>
     <p:sldId id="257" r:id="rId3"/>
-    <p:sldId id="262" r:id="rId4"/>
+    <p:sldId id="263" r:id="rId4"/>
+    <p:sldId id="264" r:id="rId5"/>
+    <p:sldId id="267" r:id="rId6"/>
+    <p:sldId id="262" r:id="rId7"/>
+    <p:sldId id="266" r:id="rId8"/>
+    <p:sldId id="268" r:id="rId9"/>
+    <p:sldId id="269" r:id="rId10"/>
   </p:sldIdLst>
   <p:sldSz cx="12192000" cy="6858000"/>
   <p:notesSz cx="6858000" cy="9144000"/>
@@ -2068,7 +2074,7 @@
           <a:p>
             <a:fld id="{ED291B17-9318-49DB-B28B-6E5994AE9581}" type="datetime1">
               <a:rPr lang="en-US" smtClean="0"/>
-              <a:t>2/17/25</a:t>
+              <a:t>2/18/25</a:t>
             </a:fld>
             <a:endParaRPr lang="en-US" dirty="0"/>
           </a:p>
@@ -2271,7 +2277,7 @@
           <a:p>
             <a:fld id="{2CED4963-E985-44C4-B8C4-FDD613B7C2F8}" type="datetime1">
               <a:rPr lang="en-US" smtClean="0"/>
-              <a:t>2/17/25</a:t>
+              <a:t>2/18/25</a:t>
             </a:fld>
             <a:endParaRPr lang="en-US" dirty="0"/>
           </a:p>
@@ -2633,7 +2639,7 @@
           <a:p>
             <a:fld id="{ED291B17-9318-49DB-B28B-6E5994AE9581}" type="datetime1">
               <a:rPr lang="en-US" smtClean="0"/>
-              <a:t>2/17/25</a:t>
+              <a:t>2/18/25</a:t>
             </a:fld>
             <a:endParaRPr lang="en-US" dirty="0"/>
           </a:p>
@@ -2831,7 +2837,7 @@
           <a:p>
             <a:fld id="{78DD82B9-B8EE-4375-B6FF-88FA6ABB15D9}" type="datetime1">
               <a:rPr lang="en-US" smtClean="0"/>
-              <a:t>2/17/25</a:t>
+              <a:t>2/18/25</a:t>
             </a:fld>
             <a:endParaRPr lang="en-US" dirty="0"/>
           </a:p>
@@ -3143,7 +3149,7 @@
           <a:p>
             <a:fld id="{B2497495-0637-405E-AE64-5CC7506D51F5}" type="datetime1">
               <a:rPr lang="en-US" smtClean="0"/>
-              <a:t>2/17/25</a:t>
+              <a:t>2/18/25</a:t>
             </a:fld>
             <a:endParaRPr lang="en-US" dirty="0"/>
           </a:p>
@@ -3396,7 +3402,7 @@
           <a:p>
             <a:fld id="{7BFFD690-9426-415D-8B65-26881E07B2D4}" type="datetime1">
               <a:rPr lang="en-US" smtClean="0"/>
-              <a:t>2/17/25</a:t>
+              <a:t>2/18/25</a:t>
             </a:fld>
             <a:endParaRPr lang="en-US" dirty="0"/>
           </a:p>
@@ -3826,7 +3832,7 @@
           <a:p>
             <a:fld id="{04C4989A-474C-40DE-95B9-011C28B71673}" type="datetime1">
               <a:rPr lang="en-US" smtClean="0"/>
-              <a:t>2/17/25</a:t>
+              <a:t>2/18/25</a:t>
             </a:fld>
             <a:endParaRPr lang="en-US" dirty="0"/>
           </a:p>
@@ -3949,7 +3955,7 @@
           <a:p>
             <a:fld id="{5DB4ED54-5B5E-4A04-93D3-5772E3CE3818}" type="datetime1">
               <a:rPr lang="en-US" smtClean="0"/>
-              <a:t>2/17/25</a:t>
+              <a:t>2/18/25</a:t>
             </a:fld>
             <a:endParaRPr lang="en-US" dirty="0"/>
           </a:p>
@@ -4044,7 +4050,7 @@
           <a:p>
             <a:fld id="{4EDE50D6-574B-40AF-946F-D52A04ADE379}" type="datetime1">
               <a:rPr lang="en-US" smtClean="0"/>
-              <a:t>2/17/25</a:t>
+              <a:t>2/18/25</a:t>
             </a:fld>
             <a:endParaRPr lang="en-US" dirty="0"/>
           </a:p>
@@ -4421,7 +4427,7 @@
           <a:p>
             <a:fld id="{D82884F1-FFEA-405F-9602-3DCA865EDA4E}" type="datetime1">
               <a:rPr lang="en-US" smtClean="0"/>
-              <a:t>2/17/25</a:t>
+              <a:t>2/18/25</a:t>
             </a:fld>
             <a:endParaRPr lang="en-US" dirty="0"/>
           </a:p>
@@ -4717,7 +4723,7 @@
           <a:p>
             <a:fld id="{7E18DB4A-8810-4A10-AD5C-D5E2C667F5B3}" type="datetime1">
               <a:rPr lang="en-US" smtClean="0"/>
-              <a:t>2/17/25</a:t>
+              <a:t>2/18/25</a:t>
             </a:fld>
             <a:endParaRPr lang="en-US" dirty="0"/>
           </a:p>
@@ -4932,7 +4938,7 @@
           <a:p>
             <a:fld id="{ED291B17-9318-49DB-B28B-6E5994AE9581}" type="datetime1">
               <a:rPr lang="en-US" smtClean="0"/>
-              <a:t>2/17/25</a:t>
+              <a:t>2/18/25</a:t>
             </a:fld>
             <a:endParaRPr lang="en-US" dirty="0"/>
           </a:p>
@@ -5809,7 +5815,7 @@
           <a:p>
             <a:r>
               <a:rPr lang="en-US" sz="2000" dirty="0"/>
-              <a:t>Previously Principal Engineer, Procter and Gamble Co. Inc.</a:t>
+              <a:t>Former Principal Engineer, Procter and Gamble Co. Inc.</a:t>
             </a:r>
           </a:p>
           <a:p>
@@ -5904,6 +5910,293 @@
           <a:lstStyle/>
           <a:p>
             <a:endParaRPr lang="en-US"/>
+          </a:p>
+        </p:txBody>
+      </p:sp>
+      <p:sp>
+        <p:nvSpPr>
+          <p:cNvPr id="5" name="Subtitle 2">
+            <a:extLst>
+              <a:ext uri="{FF2B5EF4-FFF2-40B4-BE49-F238E27FC236}">
+                <a16:creationId xmlns:a16="http://schemas.microsoft.com/office/drawing/2014/main" id="{785A9A28-41E3-F9DE-2C88-4F01E8A0493D}"/>
+              </a:ext>
+            </a:extLst>
+          </p:cNvPr>
+          <p:cNvSpPr txBox="1">
+            <a:spLocks/>
+          </p:cNvSpPr>
+          <p:nvPr/>
+        </p:nvSpPr>
+        <p:spPr>
+          <a:xfrm>
+            <a:off x="1344706" y="5064302"/>
+            <a:ext cx="6192999" cy="1661020"/>
+          </a:xfrm>
+          <a:prstGeom prst="rect">
+            <a:avLst/>
+          </a:prstGeom>
+        </p:spPr>
+        <p:txBody>
+          <a:bodyPr vert="horz" lIns="91440" tIns="45720" rIns="91440" bIns="45720" rtlCol="0" anchor="t">
+            <a:normAutofit fontScale="85000" lnSpcReduction="10000"/>
+          </a:bodyPr>
+          <a:lstStyle>
+            <a:lvl1pPr marL="0" indent="0" algn="l" defTabSz="457200" rtl="0" eaLnBrk="1" latinLnBrk="0" hangingPunct="1">
+              <a:lnSpc>
+                <a:spcPct val="110000"/>
+              </a:lnSpc>
+              <a:spcBef>
+                <a:spcPct val="20000"/>
+              </a:spcBef>
+              <a:spcAft>
+                <a:spcPts val="600"/>
+              </a:spcAft>
+              <a:buClr>
+                <a:schemeClr val="accent1"/>
+              </a:buClr>
+              <a:buSzPct val="92000"/>
+              <a:buFont typeface="Wingdings 2" panose="05020102010507070707" pitchFamily="18" charset="2"/>
+              <a:buNone/>
+              <a:defRPr sz="1600" kern="1200" cap="all">
+                <a:solidFill>
+                  <a:schemeClr val="accent1"/>
+                </a:solidFill>
+                <a:latin typeface="+mn-lt"/>
+                <a:ea typeface="+mn-ea"/>
+                <a:cs typeface="+mn-cs"/>
+              </a:defRPr>
+            </a:lvl1pPr>
+            <a:lvl2pPr marL="457200" indent="0" algn="ctr" defTabSz="457200" rtl="0" eaLnBrk="1" latinLnBrk="0" hangingPunct="1">
+              <a:spcBef>
+                <a:spcPct val="20000"/>
+              </a:spcBef>
+              <a:spcAft>
+                <a:spcPts val="600"/>
+              </a:spcAft>
+              <a:buClr>
+                <a:schemeClr val="accent1"/>
+              </a:buClr>
+              <a:buSzPct val="92000"/>
+              <a:buFont typeface="Wingdings 2" panose="05020102010507070707" pitchFamily="18" charset="2"/>
+              <a:buNone/>
+              <a:defRPr sz="1400" kern="1200">
+                <a:solidFill>
+                  <a:schemeClr val="tx1">
+                    <a:tint val="75000"/>
+                  </a:schemeClr>
+                </a:solidFill>
+                <a:latin typeface="+mn-lt"/>
+                <a:ea typeface="+mn-ea"/>
+                <a:cs typeface="+mn-cs"/>
+              </a:defRPr>
+            </a:lvl2pPr>
+            <a:lvl3pPr marL="914400" indent="0" algn="ctr" defTabSz="457200" rtl="0" eaLnBrk="1" latinLnBrk="0" hangingPunct="1">
+              <a:spcBef>
+                <a:spcPct val="20000"/>
+              </a:spcBef>
+              <a:spcAft>
+                <a:spcPts val="600"/>
+              </a:spcAft>
+              <a:buClr>
+                <a:schemeClr val="accent1"/>
+              </a:buClr>
+              <a:buSzPct val="92000"/>
+              <a:buFont typeface="Wingdings 2" panose="05020102010507070707" pitchFamily="18" charset="2"/>
+              <a:buNone/>
+              <a:defRPr sz="1300" kern="1200">
+                <a:solidFill>
+                  <a:schemeClr val="tx1">
+                    <a:tint val="75000"/>
+                  </a:schemeClr>
+                </a:solidFill>
+                <a:latin typeface="+mn-lt"/>
+                <a:ea typeface="+mn-ea"/>
+                <a:cs typeface="+mn-cs"/>
+              </a:defRPr>
+            </a:lvl3pPr>
+            <a:lvl4pPr marL="1371600" indent="0" algn="ctr" defTabSz="457200" rtl="0" eaLnBrk="1" latinLnBrk="0" hangingPunct="1">
+              <a:spcBef>
+                <a:spcPct val="20000"/>
+              </a:spcBef>
+              <a:spcAft>
+                <a:spcPts val="600"/>
+              </a:spcAft>
+              <a:buClr>
+                <a:schemeClr val="accent1"/>
+              </a:buClr>
+              <a:buSzPct val="92000"/>
+              <a:buFont typeface="Wingdings 2" panose="05020102010507070707" pitchFamily="18" charset="2"/>
+              <a:buNone/>
+              <a:defRPr sz="1100" kern="1200">
+                <a:solidFill>
+                  <a:schemeClr val="tx1">
+                    <a:tint val="75000"/>
+                  </a:schemeClr>
+                </a:solidFill>
+                <a:latin typeface="+mn-lt"/>
+                <a:ea typeface="+mn-ea"/>
+                <a:cs typeface="+mn-cs"/>
+              </a:defRPr>
+            </a:lvl4pPr>
+            <a:lvl5pPr marL="1828800" indent="0" algn="ctr" defTabSz="457200" rtl="0" eaLnBrk="1" latinLnBrk="0" hangingPunct="1">
+              <a:spcBef>
+                <a:spcPct val="20000"/>
+              </a:spcBef>
+              <a:spcAft>
+                <a:spcPts val="600"/>
+              </a:spcAft>
+              <a:buClr>
+                <a:schemeClr val="accent1"/>
+              </a:buClr>
+              <a:buSzPct val="92000"/>
+              <a:buFont typeface="Wingdings 2" panose="05020102010507070707" pitchFamily="18" charset="2"/>
+              <a:buNone/>
+              <a:defRPr sz="1100" kern="1200">
+                <a:solidFill>
+                  <a:schemeClr val="tx1">
+                    <a:tint val="75000"/>
+                  </a:schemeClr>
+                </a:solidFill>
+                <a:latin typeface="+mn-lt"/>
+                <a:ea typeface="+mn-ea"/>
+                <a:cs typeface="+mn-cs"/>
+              </a:defRPr>
+            </a:lvl5pPr>
+            <a:lvl6pPr marL="2286000" indent="0" algn="ctr" defTabSz="457200" rtl="0" eaLnBrk="1" latinLnBrk="0" hangingPunct="1">
+              <a:spcBef>
+                <a:spcPct val="20000"/>
+              </a:spcBef>
+              <a:spcAft>
+                <a:spcPts val="600"/>
+              </a:spcAft>
+              <a:buClr>
+                <a:schemeClr val="accent2"/>
+              </a:buClr>
+              <a:buSzPct val="92000"/>
+              <a:buFont typeface="Wingdings 2" panose="05020102010507070707" pitchFamily="18" charset="2"/>
+              <a:buNone/>
+              <a:defRPr sz="1200" kern="1200">
+                <a:solidFill>
+                  <a:schemeClr val="tx1">
+                    <a:tint val="75000"/>
+                  </a:schemeClr>
+                </a:solidFill>
+                <a:latin typeface="+mn-lt"/>
+                <a:ea typeface="+mn-ea"/>
+                <a:cs typeface="+mn-cs"/>
+              </a:defRPr>
+            </a:lvl6pPr>
+            <a:lvl7pPr marL="2743200" indent="0" algn="ctr" defTabSz="457200" rtl="0" eaLnBrk="1" latinLnBrk="0" hangingPunct="1">
+              <a:spcBef>
+                <a:spcPct val="20000"/>
+              </a:spcBef>
+              <a:spcAft>
+                <a:spcPts val="600"/>
+              </a:spcAft>
+              <a:buClr>
+                <a:schemeClr val="accent2"/>
+              </a:buClr>
+              <a:buSzPct val="92000"/>
+              <a:buFont typeface="Wingdings 2" panose="05020102010507070707" pitchFamily="18" charset="2"/>
+              <a:buNone/>
+              <a:defRPr sz="1200" kern="1200">
+                <a:solidFill>
+                  <a:schemeClr val="tx1">
+                    <a:tint val="75000"/>
+                  </a:schemeClr>
+                </a:solidFill>
+                <a:latin typeface="+mn-lt"/>
+                <a:ea typeface="+mn-ea"/>
+                <a:cs typeface="+mn-cs"/>
+              </a:defRPr>
+            </a:lvl7pPr>
+            <a:lvl8pPr marL="3200400" indent="0" algn="ctr" defTabSz="457200" rtl="0" eaLnBrk="1" latinLnBrk="0" hangingPunct="1">
+              <a:spcBef>
+                <a:spcPct val="20000"/>
+              </a:spcBef>
+              <a:spcAft>
+                <a:spcPts val="600"/>
+              </a:spcAft>
+              <a:buClr>
+                <a:schemeClr val="accent2"/>
+              </a:buClr>
+              <a:buSzPct val="92000"/>
+              <a:buFont typeface="Wingdings 2" panose="05020102010507070707" pitchFamily="18" charset="2"/>
+              <a:buNone/>
+              <a:defRPr sz="1200" kern="1200">
+                <a:solidFill>
+                  <a:schemeClr val="tx1">
+                    <a:tint val="75000"/>
+                  </a:schemeClr>
+                </a:solidFill>
+                <a:latin typeface="+mn-lt"/>
+                <a:ea typeface="+mn-ea"/>
+                <a:cs typeface="+mn-cs"/>
+              </a:defRPr>
+            </a:lvl8pPr>
+            <a:lvl9pPr marL="3657600" indent="0" algn="ctr" defTabSz="457200" rtl="0" eaLnBrk="1" latinLnBrk="0" hangingPunct="1">
+              <a:spcBef>
+                <a:spcPct val="20000"/>
+              </a:spcBef>
+              <a:spcAft>
+                <a:spcPts val="600"/>
+              </a:spcAft>
+              <a:buClr>
+                <a:schemeClr val="accent2"/>
+              </a:buClr>
+              <a:buSzPct val="92000"/>
+              <a:buFont typeface="Wingdings 2" panose="05020102010507070707" pitchFamily="18" charset="2"/>
+              <a:buNone/>
+              <a:defRPr sz="1200" kern="1200">
+                <a:solidFill>
+                  <a:schemeClr val="tx1">
+                    <a:tint val="75000"/>
+                  </a:schemeClr>
+                </a:solidFill>
+                <a:latin typeface="+mn-lt"/>
+                <a:ea typeface="+mn-ea"/>
+                <a:cs typeface="+mn-cs"/>
+              </a:defRPr>
+            </a:lvl9pPr>
+          </a:lstStyle>
+          <a:p>
+            <a:r>
+              <a:rPr lang="en-US" sz="2000" cap="none" dirty="0">
+                <a:solidFill>
+                  <a:schemeClr val="accent5">
+                    <a:lumMod val="20000"/>
+                    <a:lumOff val="80000"/>
+                  </a:schemeClr>
+                </a:solidFill>
+              </a:rPr>
+              <a:t>Colloquium on occasion of Professor Sotiris Pratsinis retirement</a:t>
+            </a:r>
+          </a:p>
+          <a:p>
+            <a:r>
+              <a:rPr lang="en-US" sz="2000" cap="none" dirty="0">
+                <a:solidFill>
+                  <a:schemeClr val="accent5">
+                    <a:lumMod val="20000"/>
+                    <a:lumOff val="80000"/>
+                  </a:schemeClr>
+                </a:solidFill>
+              </a:rPr>
+              <a:t>February 26, 2025</a:t>
+            </a:r>
+          </a:p>
+          <a:p>
+            <a:r>
+              <a:rPr lang="en-US" sz="2000" cap="none" dirty="0">
+                <a:solidFill>
+                  <a:schemeClr val="accent5">
+                    <a:lumMod val="20000"/>
+                    <a:lumOff val="80000"/>
+                  </a:schemeClr>
+                </a:solidFill>
+              </a:rPr>
+              <a:t>Particle Technology Laboratory. Department of Mechanical &amp; Process Engineering, ETH Zürich, Switzerland</a:t>
+            </a:r>
           </a:p>
         </p:txBody>
       </p:sp>
@@ -6283,7 +6576,7 @@
                   <a:srgbClr val="FFFFFF"/>
                 </a:solidFill>
               </a:rPr>
-              <a:t>xxx</a:t>
+              <a:t>Intro</a:t>
             </a:r>
           </a:p>
         </p:txBody>
@@ -6306,12 +6599,12 @@
         </p:nvSpPr>
         <p:spPr>
           <a:xfrm>
-            <a:off x="4561870" y="723899"/>
-            <a:ext cx="7183597" cy="3429245"/>
+            <a:off x="4561870" y="723898"/>
+            <a:ext cx="4828375" cy="5569325"/>
           </a:xfrm>
         </p:spPr>
         <p:txBody>
-          <a:bodyPr>
+          <a:bodyPr anchor="t" anchorCtr="0">
             <a:normAutofit/>
           </a:bodyPr>
           <a:lstStyle/>
@@ -6321,10 +6614,6 @@
                 <a:spcPct val="90000"/>
               </a:lnSpc>
             </a:pPr>
-            <a:r>
-              <a:rPr lang="en-US" sz="1500"/>
-              <a:t>Tutorial is at: </a:t>
-            </a:r>
             <a:endParaRPr lang="en-US" sz="1500" dirty="0"/>
           </a:p>
           <a:p>
@@ -6335,19 +6624,201 @@
             </a:pPr>
             <a:r>
               <a:rPr lang="en-US" sz="1500" dirty="0"/>
-              <a:t>If you are not familiar with Github, click on </a:t>
-            </a:r>
-            <a:r>
-              <a:rPr lang="en-US" sz="1500" dirty="0" err="1"/>
-              <a:t>Readme.md</a:t>
-            </a:r>
+              <a:t>30+ years Procter and Gamble technologist/Principal Engineer – Consumer Packaged Goods R&amp;D</a:t>
+            </a:r>
+          </a:p>
+          <a:p>
+            <a:pPr>
+              <a:lnSpc>
+                <a:spcPct val="90000"/>
+              </a:lnSpc>
+            </a:pPr>
             <a:r>
               <a:rPr lang="en-US" sz="1500" dirty="0"/>
-              <a:t> for instructions on downloading the files as a Zip archive</a:t>
-            </a:r>
-          </a:p>
-        </p:txBody>
-      </p:sp>
+              <a:t>BS ChE (Purdue University 1984)</a:t>
+            </a:r>
+          </a:p>
+          <a:p>
+            <a:pPr>
+              <a:lnSpc>
+                <a:spcPct val="90000"/>
+              </a:lnSpc>
+            </a:pPr>
+            <a:r>
+              <a:rPr lang="en-US" sz="1500" dirty="0"/>
+              <a:t>MS ChE (U. of Cincinnati/Pratsinis 1989) </a:t>
+            </a:r>
+          </a:p>
+          <a:p>
+            <a:pPr marL="311000" indent="0">
+              <a:lnSpc>
+                <a:spcPct val="90000"/>
+              </a:lnSpc>
+              <a:buNone/>
+            </a:pPr>
+            <a:r>
+              <a:rPr lang="en-US" sz="1500" dirty="0"/>
+              <a:t>[xxx title xxx]</a:t>
+            </a:r>
+          </a:p>
+          <a:p>
+            <a:pPr>
+              <a:lnSpc>
+                <a:spcPct val="90000"/>
+              </a:lnSpc>
+            </a:pPr>
+            <a:r>
+              <a:rPr lang="en-US" sz="1500" dirty="0"/>
+              <a:t>Data science and technical modeling consulting practice (</a:t>
+            </a:r>
+            <a:r>
+              <a:rPr lang="en-US" sz="1500" dirty="0">
+                <a:hlinkClick r:id="rId2"/>
+              </a:rPr>
+              <a:t>datadelveengineer.com</a:t>
+            </a:r>
+            <a:r>
+              <a:rPr lang="en-US" sz="1500" dirty="0"/>
+              <a:t>)</a:t>
+            </a:r>
+          </a:p>
+          <a:p>
+            <a:pPr>
+              <a:lnSpc>
+                <a:spcPct val="90000"/>
+              </a:lnSpc>
+            </a:pPr>
+            <a:r>
+              <a:rPr lang="en-US" sz="1500" dirty="0"/>
+              <a:t>Adjunct Professor, University of Delaware USA Chemical Engineering</a:t>
+            </a:r>
+          </a:p>
+          <a:p>
+            <a:pPr>
+              <a:lnSpc>
+                <a:spcPct val="90000"/>
+              </a:lnSpc>
+            </a:pPr>
+            <a:endParaRPr lang="en-US" sz="1500" dirty="0"/>
+          </a:p>
+          <a:p>
+            <a:pPr>
+              <a:lnSpc>
+                <a:spcPct val="90000"/>
+              </a:lnSpc>
+            </a:pPr>
+            <a:endParaRPr lang="en-US" sz="1500" dirty="0"/>
+          </a:p>
+        </p:txBody>
+      </p:sp>
+      <p:pic>
+        <p:nvPicPr>
+          <p:cNvPr id="15" name="Picture 14">
+            <a:extLst>
+              <a:ext uri="{FF2B5EF4-FFF2-40B4-BE49-F238E27FC236}">
+                <a16:creationId xmlns:a16="http://schemas.microsoft.com/office/drawing/2014/main" id="{539F9079-7DDE-0CCC-C9CA-C9370479309E}"/>
+              </a:ext>
+            </a:extLst>
+          </p:cNvPr>
+          <p:cNvPicPr>
+            <a:picLocks noChangeAspect="1"/>
+          </p:cNvPicPr>
+          <p:nvPr/>
+        </p:nvPicPr>
+        <p:blipFill>
+          <a:blip r:embed="rId3" cstate="print">
+            <a:extLst>
+              <a:ext uri="{28A0092B-C50C-407E-A947-70E740481C1C}">
+                <a14:useLocalDpi xmlns:a14="http://schemas.microsoft.com/office/drawing/2010/main" val="0"/>
+              </a:ext>
+            </a:extLst>
+          </a:blip>
+          <a:stretch>
+            <a:fillRect/>
+          </a:stretch>
+        </p:blipFill>
+        <p:spPr>
+          <a:xfrm>
+            <a:off x="9095024" y="3441723"/>
+            <a:ext cx="2016889" cy="231018"/>
+          </a:xfrm>
+          <a:prstGeom prst="rect">
+            <a:avLst/>
+          </a:prstGeom>
+        </p:spPr>
+      </p:pic>
+      <p:pic>
+        <p:nvPicPr>
+          <p:cNvPr id="17" name="Picture 16" descr="A person sitting at a table with a computer&#10;&#10;Description automatically generated with medium confidence">
+            <a:extLst>
+              <a:ext uri="{FF2B5EF4-FFF2-40B4-BE49-F238E27FC236}">
+                <a16:creationId xmlns:a16="http://schemas.microsoft.com/office/drawing/2014/main" id="{A5162048-2391-F07A-6FE2-40AD63C6435B}"/>
+              </a:ext>
+            </a:extLst>
+          </p:cNvPr>
+          <p:cNvPicPr>
+            <a:picLocks noChangeAspect="1"/>
+          </p:cNvPicPr>
+          <p:nvPr/>
+        </p:nvPicPr>
+        <p:blipFill>
+          <a:blip r:embed="rId4" cstate="print">
+            <a:extLst>
+              <a:ext uri="{28A0092B-C50C-407E-A947-70E740481C1C}">
+                <a14:useLocalDpi xmlns:a14="http://schemas.microsoft.com/office/drawing/2010/main" val="0"/>
+              </a:ext>
+            </a:extLst>
+          </a:blip>
+          <a:stretch>
+            <a:fillRect/>
+          </a:stretch>
+        </p:blipFill>
+        <p:spPr>
+          <a:xfrm>
+            <a:off x="8947253" y="3874120"/>
+            <a:ext cx="2650443" cy="2650443"/>
+          </a:xfrm>
+          <a:prstGeom prst="rect">
+            <a:avLst/>
+          </a:prstGeom>
+        </p:spPr>
+      </p:pic>
+      <p:pic>
+        <p:nvPicPr>
+          <p:cNvPr id="19" name="Picture 18" descr="A picture containing person, indoor, person, preparing&#10;&#10;Description automatically generated">
+            <a:extLst>
+              <a:ext uri="{FF2B5EF4-FFF2-40B4-BE49-F238E27FC236}">
+                <a16:creationId xmlns:a16="http://schemas.microsoft.com/office/drawing/2014/main" id="{2E287C16-9CEE-37D5-64B0-44D6C6173789}"/>
+              </a:ext>
+            </a:extLst>
+          </p:cNvPr>
+          <p:cNvPicPr>
+            <a:picLocks noChangeAspect="1"/>
+          </p:cNvPicPr>
+          <p:nvPr/>
+        </p:nvPicPr>
+        <p:blipFill>
+          <a:blip r:embed="rId5" cstate="print">
+            <a:extLst>
+              <a:ext uri="{28A0092B-C50C-407E-A947-70E740481C1C}">
+                <a14:useLocalDpi xmlns:a14="http://schemas.microsoft.com/office/drawing/2010/main" val="0"/>
+              </a:ext>
+            </a:extLst>
+          </a:blip>
+          <a:stretch>
+            <a:fillRect/>
+          </a:stretch>
+        </p:blipFill>
+        <p:spPr>
+          <a:xfrm>
+            <a:off x="9572344" y="723898"/>
+            <a:ext cx="2311985" cy="2516446"/>
+          </a:xfrm>
+          <a:prstGeom prst="rect">
+            <a:avLst/>
+          </a:prstGeom>
+        </p:spPr>
+      </p:pic>
     </p:spTree>
     <p:extLst>
       <p:ext uri="{BB962C8B-B14F-4D97-AF65-F5344CB8AC3E}">
@@ -6374,7 +6845,13 @@
     </p:bg>
     <p:spTree>
       <p:nvGrpSpPr>
-        <p:cNvPr id="1" name=""/>
+        <p:cNvPr id="1" name="">
+          <a:extLst>
+            <a:ext uri="{FF2B5EF4-FFF2-40B4-BE49-F238E27FC236}">
+              <a16:creationId xmlns:a16="http://schemas.microsoft.com/office/drawing/2014/main" id="{6409BB4F-AAD4-053D-7BC5-79B81ECC9E20}"/>
+            </a:ext>
+          </a:extLst>
+        </p:cNvPr>
         <p:cNvGrpSpPr/>
         <p:nvPr/>
       </p:nvGrpSpPr>
@@ -6391,7 +6868,7 @@
           <p:cNvPr id="10" name="Rectangle 9">
             <a:extLst>
               <a:ext uri="{FF2B5EF4-FFF2-40B4-BE49-F238E27FC236}">
-                <a16:creationId xmlns:a16="http://schemas.microsoft.com/office/drawing/2014/main" id="{F875149D-F692-45DA-8324-D5E0193D5FC4}"/>
+                <a16:creationId xmlns:a16="http://schemas.microsoft.com/office/drawing/2014/main" id="{7CC02B13-9F10-C954-FD9E-4F32E4ADEC1C}"/>
               </a:ext>
               <a:ext uri="{C183D7F6-B498-43B3-948B-1728B52AA6E4}">
                 <adec:decorative xmlns:adec="http://schemas.microsoft.com/office/drawing/2017/decorative" val="1"/>
@@ -6451,7 +6928,7 @@
           <p:cNvPr id="12" name="Rectangle 11">
             <a:extLst>
               <a:ext uri="{FF2B5EF4-FFF2-40B4-BE49-F238E27FC236}">
-                <a16:creationId xmlns:a16="http://schemas.microsoft.com/office/drawing/2014/main" id="{C0B19935-C760-4698-9DD1-973C8A428D26}"/>
+                <a16:creationId xmlns:a16="http://schemas.microsoft.com/office/drawing/2014/main" id="{50CA1105-5266-031D-7C31-694F01211C69}"/>
               </a:ext>
               <a:ext uri="{C183D7F6-B498-43B3-948B-1728B52AA6E4}">
                 <adec:decorative xmlns:adec="http://schemas.microsoft.com/office/drawing/2017/decorative" val="1"/>
@@ -6512,7 +6989,7 @@
           <p:cNvPr id="14" name="Rectangle 13">
             <a:extLst>
               <a:ext uri="{FF2B5EF4-FFF2-40B4-BE49-F238E27FC236}">
-                <a16:creationId xmlns:a16="http://schemas.microsoft.com/office/drawing/2014/main" id="{08990612-E008-4F02-AEBB-B140BE753558}"/>
+                <a16:creationId xmlns:a16="http://schemas.microsoft.com/office/drawing/2014/main" id="{E48AAF7D-4C34-DAA3-5372-F3A7E8C279FA}"/>
               </a:ext>
               <a:ext uri="{C183D7F6-B498-43B3-948B-1728B52AA6E4}">
                 <adec:decorative xmlns:adec="http://schemas.microsoft.com/office/drawing/2017/decorative" val="1"/>
@@ -6573,7 +7050,7 @@
           <p:cNvPr id="16" name="Rectangle 15">
             <a:extLst>
               <a:ext uri="{FF2B5EF4-FFF2-40B4-BE49-F238E27FC236}">
-                <a16:creationId xmlns:a16="http://schemas.microsoft.com/office/drawing/2014/main" id="{A310A41F-3A14-4150-B6CF-0A577DDDEAD2}"/>
+                <a16:creationId xmlns:a16="http://schemas.microsoft.com/office/drawing/2014/main" id="{A0974F2D-54C8-BBB9-8F1D-0FA4518136C7}"/>
               </a:ext>
               <a:ext uri="{C183D7F6-B498-43B3-948B-1728B52AA6E4}">
                 <adec:decorative xmlns:adec="http://schemas.microsoft.com/office/drawing/2017/decorative" val="1"/>
@@ -6634,7 +7111,7 @@
           <p:cNvPr id="18" name="Rectangle 17">
             <a:extLst>
               <a:ext uri="{FF2B5EF4-FFF2-40B4-BE49-F238E27FC236}">
-                <a16:creationId xmlns:a16="http://schemas.microsoft.com/office/drawing/2014/main" id="{7B89EEFD-93BC-4ACF-962C-E6279E72B00B}"/>
+                <a16:creationId xmlns:a16="http://schemas.microsoft.com/office/drawing/2014/main" id="{8EAB7539-FC75-DEA1-68ED-DC9021678338}"/>
               </a:ext>
               <a:ext uri="{C183D7F6-B498-43B3-948B-1728B52AA6E4}">
                 <adec:decorative xmlns:adec="http://schemas.microsoft.com/office/drawing/2017/decorative" val="1"/>
@@ -6695,7 +7172,7 @@
           <p:cNvPr id="2" name="Title 1">
             <a:extLst>
               <a:ext uri="{FF2B5EF4-FFF2-40B4-BE49-F238E27FC236}">
-                <a16:creationId xmlns:a16="http://schemas.microsoft.com/office/drawing/2014/main" id="{54EE378A-F88D-4129-A984-BE9F8C7B2BC5}"/>
+                <a16:creationId xmlns:a16="http://schemas.microsoft.com/office/drawing/2014/main" id="{398531FE-2112-6E75-1C40-AE74861E4AB3}"/>
               </a:ext>
             </a:extLst>
           </p:cNvPr>
@@ -6724,8 +7201,21 @@
                   <a:srgbClr val="FFFFFF"/>
                 </a:solidFill>
               </a:rPr>
-              <a:t>Downloading Files xxx</a:t>
-            </a:r>
+              <a:t>Some things I learned from “Dr. P”</a:t>
+            </a:r>
+            <a:r>
+              <a:rPr lang="en-US" sz="3200" dirty="0">
+                <a:solidFill>
+                  <a:srgbClr val="FFFFFF"/>
+                </a:solidFill>
+              </a:rPr>
+              <a:t>*</a:t>
+            </a:r>
+            <a:endParaRPr lang="en-US" dirty="0">
+              <a:solidFill>
+                <a:srgbClr val="FFFFFF"/>
+              </a:solidFill>
+            </a:endParaRPr>
           </a:p>
         </p:txBody>
       </p:sp>
@@ -6734,7 +7224,7 @@
           <p:cNvPr id="3" name="Content Placeholder 2">
             <a:extLst>
               <a:ext uri="{FF2B5EF4-FFF2-40B4-BE49-F238E27FC236}">
-                <a16:creationId xmlns:a16="http://schemas.microsoft.com/office/drawing/2014/main" id="{F6CC5DE2-2678-4F40-A49A-D84BF4E75F4F}"/>
+                <a16:creationId xmlns:a16="http://schemas.microsoft.com/office/drawing/2014/main" id="{74F3819E-D1F4-62E1-32C1-1B4403EDFB15}"/>
               </a:ext>
             </a:extLst>
           </p:cNvPr>
@@ -6747,12 +7237,12 @@
         </p:nvSpPr>
         <p:spPr>
           <a:xfrm>
-            <a:off x="4561870" y="723899"/>
-            <a:ext cx="7183597" cy="1771875"/>
+            <a:off x="4561870" y="723898"/>
+            <a:ext cx="4828375" cy="5569325"/>
           </a:xfrm>
         </p:spPr>
         <p:txBody>
-          <a:bodyPr>
+          <a:bodyPr anchor="t" anchorCtr="0">
             <a:normAutofit/>
           </a:bodyPr>
           <a:lstStyle/>
@@ -6764,8 +7254,35 @@
             </a:pPr>
             <a:r>
               <a:rPr lang="en-US" sz="1500" dirty="0"/>
-              <a:t>Download tutorial materials from Github repository: https://github.com/jlandgre/JMP_Intro_Tutorial</a:t>
-            </a:r>
+              <a:t>Penetrate technically to the full extent of the topic</a:t>
+            </a:r>
+          </a:p>
+          <a:p>
+            <a:pPr marL="0" indent="0">
+              <a:lnSpc>
+                <a:spcPct val="90000"/>
+              </a:lnSpc>
+              <a:buNone/>
+            </a:pPr>
+            <a:endParaRPr lang="en-US" sz="1500" dirty="0"/>
+          </a:p>
+          <a:p>
+            <a:pPr marL="0" indent="0">
+              <a:lnSpc>
+                <a:spcPct val="90000"/>
+              </a:lnSpc>
+              <a:buNone/>
+            </a:pPr>
+            <a:endParaRPr lang="en-US" sz="1500" dirty="0"/>
+          </a:p>
+          <a:p>
+            <a:pPr marL="0" indent="0">
+              <a:lnSpc>
+                <a:spcPct val="90000"/>
+              </a:lnSpc>
+              <a:buNone/>
+            </a:pPr>
+            <a:endParaRPr lang="en-US" sz="1500" dirty="0"/>
           </a:p>
           <a:p>
             <a:pPr>
@@ -6775,7 +7292,7 @@
             </a:pPr>
             <a:r>
               <a:rPr lang="en-US" sz="1500" dirty="0"/>
-              <a:t>Github: Good for engineers to know! It’s common for sharing open-source materials like this tutorial</a:t>
+              <a:t>Research is a team sport. Be friends with your colleagues wherever they may be</a:t>
             </a:r>
           </a:p>
           <a:p>
@@ -6786,17 +7303,340 @@
             </a:pPr>
             <a:r>
               <a:rPr lang="en-US" sz="1500" dirty="0"/>
-              <a:t>Github repositories can be open (like this one) or private</a:t>
+              <a:t>Great visuals rule the day (Corollary: “Say it with dimensionless numbers”)</a:t>
+            </a:r>
+          </a:p>
+          <a:p>
+            <a:pPr>
+              <a:lnSpc>
+                <a:spcPct val="90000"/>
+              </a:lnSpc>
+            </a:pPr>
+            <a:endParaRPr lang="en-US" sz="1500" dirty="0"/>
+          </a:p>
+          <a:p>
+            <a:pPr>
+              <a:lnSpc>
+                <a:spcPct val="90000"/>
+              </a:lnSpc>
+            </a:pPr>
+            <a:r>
+              <a:rPr lang="en-US" sz="1500" dirty="0"/>
+              <a:t>Mentoring means giving your mentees/those under you a “seat at the table”</a:t>
+            </a:r>
+          </a:p>
+          <a:p>
+            <a:pPr lvl="1">
+              <a:lnSpc>
+                <a:spcPct val="90000"/>
+              </a:lnSpc>
+            </a:pPr>
+            <a:r>
+              <a:rPr lang="en-US" sz="1200" dirty="0"/>
+              <a:t>Conferences </a:t>
+            </a:r>
+          </a:p>
+          <a:p>
+            <a:pPr lvl="1">
+              <a:lnSpc>
+                <a:spcPct val="90000"/>
+              </a:lnSpc>
+            </a:pPr>
+            <a:r>
+              <a:rPr lang="en-US" sz="1200" dirty="0"/>
+              <a:t>Consulting</a:t>
+            </a:r>
+          </a:p>
+          <a:p>
+            <a:pPr>
+              <a:lnSpc>
+                <a:spcPct val="90000"/>
+              </a:lnSpc>
+            </a:pPr>
+            <a:r>
+              <a:rPr lang="en-US" sz="1500" dirty="0"/>
+              <a:t>Lead a balanced life that pays full attention to our creator and to those around us</a:t>
+            </a:r>
+          </a:p>
+        </p:txBody>
+      </p:sp>
+      <p:sp>
+        <p:nvSpPr>
+          <p:cNvPr id="4" name="Content Placeholder 2">
+            <a:extLst>
+              <a:ext uri="{FF2B5EF4-FFF2-40B4-BE49-F238E27FC236}">
+                <a16:creationId xmlns:a16="http://schemas.microsoft.com/office/drawing/2014/main" id="{4B07C422-2F1D-DD11-A580-CA3763B00BF1}"/>
+              </a:ext>
+            </a:extLst>
+          </p:cNvPr>
+          <p:cNvSpPr txBox="1">
+            <a:spLocks/>
+          </p:cNvSpPr>
+          <p:nvPr/>
+        </p:nvSpPr>
+        <p:spPr>
+          <a:xfrm>
+            <a:off x="675204" y="5233125"/>
+            <a:ext cx="3305125" cy="882177"/>
+          </a:xfrm>
+          <a:prstGeom prst="rect">
+            <a:avLst/>
+          </a:prstGeom>
+        </p:spPr>
+        <p:txBody>
+          <a:bodyPr vert="horz" lIns="91440" tIns="45720" rIns="91440" bIns="45720" rtlCol="0" anchor="ctr">
+            <a:normAutofit/>
+          </a:bodyPr>
+          <a:lstStyle>
+            <a:lvl1pPr marL="306000" indent="-306000" algn="l" defTabSz="457200" rtl="0" eaLnBrk="1" latinLnBrk="0" hangingPunct="1">
+              <a:lnSpc>
+                <a:spcPct val="110000"/>
+              </a:lnSpc>
+              <a:spcBef>
+                <a:spcPct val="20000"/>
+              </a:spcBef>
+              <a:spcAft>
+                <a:spcPts val="600"/>
+              </a:spcAft>
+              <a:buClr>
+                <a:schemeClr val="accent1"/>
+              </a:buClr>
+              <a:buSzPct val="92000"/>
+              <a:buFont typeface="Wingdings 2" panose="05020102010507070707" pitchFamily="18" charset="2"/>
+              <a:buChar char=""/>
+              <a:defRPr sz="1700" kern="1200">
+                <a:solidFill>
+                  <a:schemeClr val="tx1">
+                    <a:lumMod val="75000"/>
+                    <a:lumOff val="25000"/>
+                  </a:schemeClr>
+                </a:solidFill>
+                <a:latin typeface="+mn-lt"/>
+                <a:ea typeface="+mn-ea"/>
+                <a:cs typeface="+mn-cs"/>
+              </a:defRPr>
+            </a:lvl1pPr>
+            <a:lvl2pPr marL="630000" indent="-306000" algn="l" defTabSz="457200" rtl="0" eaLnBrk="1" latinLnBrk="0" hangingPunct="1">
+              <a:spcBef>
+                <a:spcPct val="20000"/>
+              </a:spcBef>
+              <a:spcAft>
+                <a:spcPts val="600"/>
+              </a:spcAft>
+              <a:buClr>
+                <a:schemeClr val="accent1"/>
+              </a:buClr>
+              <a:buSzPct val="92000"/>
+              <a:buFont typeface="Wingdings 2" panose="05020102010507070707" pitchFamily="18" charset="2"/>
+              <a:buChar char=""/>
+              <a:defRPr sz="1400" kern="1200">
+                <a:solidFill>
+                  <a:schemeClr val="tx1">
+                    <a:lumMod val="75000"/>
+                    <a:lumOff val="25000"/>
+                  </a:schemeClr>
+                </a:solidFill>
+                <a:latin typeface="+mn-lt"/>
+                <a:ea typeface="+mn-ea"/>
+                <a:cs typeface="+mn-cs"/>
+              </a:defRPr>
+            </a:lvl2pPr>
+            <a:lvl3pPr marL="900000" indent="-270000" algn="l" defTabSz="457200" rtl="0" eaLnBrk="1" latinLnBrk="0" hangingPunct="1">
+              <a:spcBef>
+                <a:spcPct val="20000"/>
+              </a:spcBef>
+              <a:spcAft>
+                <a:spcPts val="600"/>
+              </a:spcAft>
+              <a:buClr>
+                <a:schemeClr val="accent1"/>
+              </a:buClr>
+              <a:buSzPct val="92000"/>
+              <a:buFont typeface="Wingdings 2" panose="05020102010507070707" pitchFamily="18" charset="2"/>
+              <a:buChar char=""/>
+              <a:defRPr sz="1300" kern="1200">
+                <a:solidFill>
+                  <a:schemeClr val="tx1">
+                    <a:lumMod val="75000"/>
+                    <a:lumOff val="25000"/>
+                  </a:schemeClr>
+                </a:solidFill>
+                <a:latin typeface="+mn-lt"/>
+                <a:ea typeface="+mn-ea"/>
+                <a:cs typeface="+mn-cs"/>
+              </a:defRPr>
+            </a:lvl3pPr>
+            <a:lvl4pPr marL="1242000" indent="-234000" algn="l" defTabSz="457200" rtl="0" eaLnBrk="1" latinLnBrk="0" hangingPunct="1">
+              <a:spcBef>
+                <a:spcPct val="20000"/>
+              </a:spcBef>
+              <a:spcAft>
+                <a:spcPts val="600"/>
+              </a:spcAft>
+              <a:buClr>
+                <a:schemeClr val="accent1"/>
+              </a:buClr>
+              <a:buSzPct val="92000"/>
+              <a:buFont typeface="Wingdings 2" panose="05020102010507070707" pitchFamily="18" charset="2"/>
+              <a:buChar char=""/>
+              <a:defRPr sz="1100" kern="1200">
+                <a:solidFill>
+                  <a:schemeClr val="tx1">
+                    <a:lumMod val="75000"/>
+                    <a:lumOff val="25000"/>
+                  </a:schemeClr>
+                </a:solidFill>
+                <a:latin typeface="+mn-lt"/>
+                <a:ea typeface="+mn-ea"/>
+                <a:cs typeface="+mn-cs"/>
+              </a:defRPr>
+            </a:lvl4pPr>
+            <a:lvl5pPr marL="1602000" indent="-234000" algn="l" defTabSz="457200" rtl="0" eaLnBrk="1" latinLnBrk="0" hangingPunct="1">
+              <a:spcBef>
+                <a:spcPct val="20000"/>
+              </a:spcBef>
+              <a:spcAft>
+                <a:spcPts val="600"/>
+              </a:spcAft>
+              <a:buClr>
+                <a:schemeClr val="accent1"/>
+              </a:buClr>
+              <a:buSzPct val="92000"/>
+              <a:buFont typeface="Wingdings 2" panose="05020102010507070707" pitchFamily="18" charset="2"/>
+              <a:buChar char=""/>
+              <a:defRPr sz="1100" kern="1200">
+                <a:solidFill>
+                  <a:schemeClr val="tx1">
+                    <a:lumMod val="75000"/>
+                    <a:lumOff val="25000"/>
+                  </a:schemeClr>
+                </a:solidFill>
+                <a:latin typeface="+mn-lt"/>
+                <a:ea typeface="+mn-ea"/>
+                <a:cs typeface="+mn-cs"/>
+              </a:defRPr>
+            </a:lvl5pPr>
+            <a:lvl6pPr marL="1900000" indent="-228600" algn="l" defTabSz="457200" rtl="0" eaLnBrk="1" latinLnBrk="0" hangingPunct="1">
+              <a:spcBef>
+                <a:spcPct val="20000"/>
+              </a:spcBef>
+              <a:spcAft>
+                <a:spcPts val="600"/>
+              </a:spcAft>
+              <a:buClr>
+                <a:schemeClr val="accent2"/>
+              </a:buClr>
+              <a:buSzPct val="92000"/>
+              <a:buFont typeface="Wingdings 2" panose="05020102010507070707" pitchFamily="18" charset="2"/>
+              <a:buChar char=""/>
+              <a:defRPr sz="1200" kern="1200">
+                <a:solidFill>
+                  <a:schemeClr val="tx2"/>
+                </a:solidFill>
+                <a:latin typeface="+mn-lt"/>
+                <a:ea typeface="+mn-ea"/>
+                <a:cs typeface="+mn-cs"/>
+              </a:defRPr>
+            </a:lvl6pPr>
+            <a:lvl7pPr marL="2200000" indent="-228600" algn="l" defTabSz="457200" rtl="0" eaLnBrk="1" latinLnBrk="0" hangingPunct="1">
+              <a:spcBef>
+                <a:spcPct val="20000"/>
+              </a:spcBef>
+              <a:spcAft>
+                <a:spcPts val="600"/>
+              </a:spcAft>
+              <a:buClr>
+                <a:schemeClr val="accent2"/>
+              </a:buClr>
+              <a:buSzPct val="92000"/>
+              <a:buFont typeface="Wingdings 2" panose="05020102010507070707" pitchFamily="18" charset="2"/>
+              <a:buChar char=""/>
+              <a:defRPr sz="1200" kern="1200">
+                <a:solidFill>
+                  <a:schemeClr val="tx2"/>
+                </a:solidFill>
+                <a:latin typeface="+mn-lt"/>
+                <a:ea typeface="+mn-ea"/>
+                <a:cs typeface="+mn-cs"/>
+              </a:defRPr>
+            </a:lvl7pPr>
+            <a:lvl8pPr marL="2500000" indent="-228600" algn="l" defTabSz="457200" rtl="0" eaLnBrk="1" latinLnBrk="0" hangingPunct="1">
+              <a:spcBef>
+                <a:spcPct val="20000"/>
+              </a:spcBef>
+              <a:spcAft>
+                <a:spcPts val="600"/>
+              </a:spcAft>
+              <a:buClr>
+                <a:schemeClr val="accent2"/>
+              </a:buClr>
+              <a:buSzPct val="92000"/>
+              <a:buFont typeface="Wingdings 2" panose="05020102010507070707" pitchFamily="18" charset="2"/>
+              <a:buChar char=""/>
+              <a:defRPr sz="1200" kern="1200">
+                <a:solidFill>
+                  <a:schemeClr val="tx2"/>
+                </a:solidFill>
+                <a:latin typeface="+mn-lt"/>
+                <a:ea typeface="+mn-ea"/>
+                <a:cs typeface="+mn-cs"/>
+              </a:defRPr>
+            </a:lvl8pPr>
+            <a:lvl9pPr marL="2800000" indent="-228600" algn="l" defTabSz="457200" rtl="0" eaLnBrk="1" latinLnBrk="0" hangingPunct="1">
+              <a:spcBef>
+                <a:spcPct val="20000"/>
+              </a:spcBef>
+              <a:spcAft>
+                <a:spcPts val="600"/>
+              </a:spcAft>
+              <a:buClr>
+                <a:schemeClr val="accent2"/>
+              </a:buClr>
+              <a:buSzPct val="92000"/>
+              <a:buFont typeface="Wingdings 2" panose="05020102010507070707" pitchFamily="18" charset="2"/>
+              <a:buChar char=""/>
+              <a:defRPr sz="1200" kern="1200">
+                <a:solidFill>
+                  <a:schemeClr val="tx2"/>
+                </a:solidFill>
+                <a:latin typeface="+mn-lt"/>
+                <a:ea typeface="+mn-ea"/>
+                <a:cs typeface="+mn-cs"/>
+              </a:defRPr>
+            </a:lvl9pPr>
+          </a:lstStyle>
+          <a:p>
+            <a:pPr marL="0" indent="0">
+              <a:lnSpc>
+                <a:spcPct val="90000"/>
+              </a:lnSpc>
+              <a:buNone/>
+            </a:pPr>
+            <a:r>
+              <a:rPr lang="en-US" sz="1500" baseline="30000" dirty="0">
+                <a:solidFill>
+                  <a:schemeClr val="bg1"/>
+                </a:solidFill>
+              </a:rPr>
+              <a:t>*</a:t>
+            </a:r>
+            <a:r>
+              <a:rPr lang="en-US" sz="1500" dirty="0">
+                <a:solidFill>
+                  <a:schemeClr val="bg1"/>
+                </a:solidFill>
+              </a:rPr>
+              <a:t> My newlywed wife’s name for Sotiris circa 1987</a:t>
             </a:r>
           </a:p>
         </p:txBody>
       </p:sp>
       <p:pic>
         <p:nvPicPr>
-          <p:cNvPr id="6" name="Picture 5" descr="A screenshot of a computer&#10;&#10;Description automatically generated">
+          <p:cNvPr id="6" name="Picture 5" descr="A screenshot of a computer&#10;&#10;AI-generated content may be incorrect.">
             <a:extLst>
               <a:ext uri="{FF2B5EF4-FFF2-40B4-BE49-F238E27FC236}">
-                <a16:creationId xmlns:a16="http://schemas.microsoft.com/office/drawing/2014/main" id="{6FF1C0FD-A93B-447D-42D9-4DF0EBDAC202}"/>
+                <a16:creationId xmlns:a16="http://schemas.microsoft.com/office/drawing/2014/main" id="{4A5CCE6D-2659-743E-AA37-979575B493E8}"/>
               </a:ext>
             </a:extLst>
           </p:cNvPr>
@@ -6819,8 +7659,519 @@
         </p:blipFill>
         <p:spPr>
           <a:xfrm>
-            <a:off x="4699950" y="2495774"/>
-            <a:ext cx="7071551" cy="4362226"/>
+            <a:off x="5124382" y="1081144"/>
+            <a:ext cx="4083080" cy="899587"/>
+          </a:xfrm>
+          <a:prstGeom prst="rect">
+            <a:avLst/>
+          </a:prstGeom>
+        </p:spPr>
+      </p:pic>
+      <p:pic>
+        <p:nvPicPr>
+          <p:cNvPr id="8" name="Picture 7" descr="A graph of a graph of a function&#10;&#10;AI-generated content may be incorrect.">
+            <a:extLst>
+              <a:ext uri="{FF2B5EF4-FFF2-40B4-BE49-F238E27FC236}">
+                <a16:creationId xmlns:a16="http://schemas.microsoft.com/office/drawing/2014/main" id="{A142AC04-CE78-9DE0-2381-6A3821A4CDFD}"/>
+              </a:ext>
+            </a:extLst>
+          </p:cNvPr>
+          <p:cNvPicPr>
+            <a:picLocks noChangeAspect="1"/>
+          </p:cNvPicPr>
+          <p:nvPr/>
+        </p:nvPicPr>
+        <p:blipFill>
+          <a:blip r:embed="rId3">
+            <a:extLst>
+              <a:ext uri="{28A0092B-C50C-407E-A947-70E740481C1C}">
+                <a14:useLocalDpi xmlns:a14="http://schemas.microsoft.com/office/drawing/2010/main" val="0"/>
+              </a:ext>
+            </a:extLst>
+          </a:blip>
+          <a:stretch>
+            <a:fillRect/>
+          </a:stretch>
+        </p:blipFill>
+        <p:spPr>
+          <a:xfrm>
+            <a:off x="9516800" y="579320"/>
+            <a:ext cx="1812783" cy="1903234"/>
+          </a:xfrm>
+          <a:prstGeom prst="rect">
+            <a:avLst/>
+          </a:prstGeom>
+        </p:spPr>
+      </p:pic>
+      <p:pic>
+        <p:nvPicPr>
+          <p:cNvPr id="11" name="Picture 10" descr="A graph of a chemical reaction&#10;&#10;AI-generated content may be incorrect.">
+            <a:extLst>
+              <a:ext uri="{FF2B5EF4-FFF2-40B4-BE49-F238E27FC236}">
+                <a16:creationId xmlns:a16="http://schemas.microsoft.com/office/drawing/2014/main" id="{8F1341E9-E769-E4D6-CBCD-01078912F34C}"/>
+              </a:ext>
+            </a:extLst>
+          </p:cNvPr>
+          <p:cNvPicPr>
+            <a:picLocks noChangeAspect="1"/>
+          </p:cNvPicPr>
+          <p:nvPr/>
+        </p:nvPicPr>
+        <p:blipFill>
+          <a:blip r:embed="rId4">
+            <a:extLst>
+              <a:ext uri="{28A0092B-C50C-407E-A947-70E740481C1C}">
+                <a14:useLocalDpi xmlns:a14="http://schemas.microsoft.com/office/drawing/2010/main" val="0"/>
+              </a:ext>
+            </a:extLst>
+          </a:blip>
+          <a:stretch>
+            <a:fillRect/>
+          </a:stretch>
+        </p:blipFill>
+        <p:spPr>
+          <a:xfrm rot="-60000">
+            <a:off x="9285602" y="2261607"/>
+            <a:ext cx="2776731" cy="1835018"/>
+          </a:xfrm>
+          <a:prstGeom prst="rect">
+            <a:avLst/>
+          </a:prstGeom>
+        </p:spPr>
+      </p:pic>
+      <p:sp>
+        <p:nvSpPr>
+          <p:cNvPr id="13" name="TextBox 12">
+            <a:extLst>
+              <a:ext uri="{FF2B5EF4-FFF2-40B4-BE49-F238E27FC236}">
+                <a16:creationId xmlns:a16="http://schemas.microsoft.com/office/drawing/2014/main" id="{B61FC1B3-B522-D719-126F-4CD803A1833E}"/>
+              </a:ext>
+            </a:extLst>
+          </p:cNvPr>
+          <p:cNvSpPr txBox="1"/>
+          <p:nvPr/>
+        </p:nvSpPr>
+        <p:spPr>
+          <a:xfrm>
+            <a:off x="4292741" y="5329684"/>
+            <a:ext cx="7717369" cy="1366528"/>
+          </a:xfrm>
+          <a:prstGeom prst="rect">
+            <a:avLst/>
+          </a:prstGeom>
+          <a:noFill/>
+        </p:spPr>
+        <p:txBody>
+          <a:bodyPr wrap="none" rtlCol="0">
+            <a:spAutoFit/>
+          </a:bodyPr>
+          <a:lstStyle/>
+          <a:p>
+            <a:pPr marL="9525" lvl="1" indent="0">
+              <a:lnSpc>
+                <a:spcPct val="90000"/>
+              </a:lnSpc>
+              <a:buNone/>
+            </a:pPr>
+            <a:r>
+              <a:rPr lang="en-US" sz="1800" dirty="0"/>
+              <a:t>Blog: </a:t>
+            </a:r>
+            <a:r>
+              <a:rPr lang="en-US" sz="1800" u="sng" dirty="0"/>
+              <a:t>What I Learned from Dr. P.</a:t>
+            </a:r>
+          </a:p>
+          <a:p>
+            <a:pPr marL="9525" lvl="1" indent="0">
+              <a:lnSpc>
+                <a:spcPct val="90000"/>
+              </a:lnSpc>
+              <a:buNone/>
+            </a:pPr>
+            <a:r>
+              <a:rPr lang="en-US" sz="1800" dirty="0"/>
+              <a:t>With congratulations, gratitude and warmest best wishes to Sotiris and Eleni!!</a:t>
+            </a:r>
+          </a:p>
+          <a:p>
+            <a:pPr marL="9525" lvl="1" indent="0">
+              <a:lnSpc>
+                <a:spcPct val="90000"/>
+              </a:lnSpc>
+              <a:buNone/>
+            </a:pPr>
+            <a:endParaRPr lang="en-US" sz="1800" dirty="0"/>
+          </a:p>
+          <a:p>
+            <a:pPr marL="9525" lvl="1" indent="0">
+              <a:lnSpc>
+                <a:spcPct val="90000"/>
+              </a:lnSpc>
+              <a:buNone/>
+            </a:pPr>
+            <a:r>
+              <a:rPr lang="en-US" dirty="0"/>
+              <a:t>	</a:t>
+            </a:r>
+            <a:r>
+              <a:rPr lang="en-US" sz="1800" dirty="0"/>
+              <a:t>Sue and J.D. Landgrebe</a:t>
+            </a:r>
+          </a:p>
+          <a:p>
+            <a:endParaRPr lang="en-US" dirty="0"/>
+          </a:p>
+        </p:txBody>
+      </p:sp>
+    </p:spTree>
+    <p:extLst>
+      <p:ext uri="{BB962C8B-B14F-4D97-AF65-F5344CB8AC3E}">
+        <p14:creationId xmlns:p14="http://schemas.microsoft.com/office/powerpoint/2010/main" val="2672671091"/>
+      </p:ext>
+    </p:extLst>
+  </p:cSld>
+  <p:clrMapOvr>
+    <a:masterClrMapping/>
+  </p:clrMapOvr>
+</p:sld>
+</file>
+
+<file path=ppt/slides/slide4.xml><?xml version="1.0" encoding="utf-8"?>
+<p:sld xmlns:a="http://schemas.openxmlformats.org/drawingml/2006/main" xmlns:r="http://schemas.openxmlformats.org/officeDocument/2006/relationships" xmlns:p="http://schemas.openxmlformats.org/presentationml/2006/main">
+  <p:cSld>
+    <p:bg>
+      <p:bgPr>
+        <a:solidFill>
+          <a:schemeClr val="bg1"/>
+        </a:solidFill>
+        <a:effectLst/>
+      </p:bgPr>
+    </p:bg>
+    <p:spTree>
+      <p:nvGrpSpPr>
+        <p:cNvPr id="1" name="">
+          <a:extLst>
+            <a:ext uri="{FF2B5EF4-FFF2-40B4-BE49-F238E27FC236}">
+              <a16:creationId xmlns:a16="http://schemas.microsoft.com/office/drawing/2014/main" id="{3BBE5A40-D72D-5928-CD41-0C0A0E7217E5}"/>
+            </a:ext>
+          </a:extLst>
+        </p:cNvPr>
+        <p:cNvGrpSpPr/>
+        <p:nvPr/>
+      </p:nvGrpSpPr>
+      <p:grpSpPr>
+        <a:xfrm>
+          <a:off x="0" y="0"/>
+          <a:ext cx="0" cy="0"/>
+          <a:chOff x="0" y="0"/>
+          <a:chExt cx="0" cy="0"/>
+        </a:xfrm>
+      </p:grpSpPr>
+      <p:sp>
+        <p:nvSpPr>
+          <p:cNvPr id="2" name="Title 1">
+            <a:extLst>
+              <a:ext uri="{FF2B5EF4-FFF2-40B4-BE49-F238E27FC236}">
+                <a16:creationId xmlns:a16="http://schemas.microsoft.com/office/drawing/2014/main" id="{7122CA21-765C-DA8F-CB98-82FDD8561A38}"/>
+              </a:ext>
+            </a:extLst>
+          </p:cNvPr>
+          <p:cNvSpPr>
+            <a:spLocks noGrp="1"/>
+          </p:cNvSpPr>
+          <p:nvPr>
+            <p:ph type="title"/>
+          </p:nvPr>
+        </p:nvSpPr>
+        <p:spPr/>
+        <p:txBody>
+          <a:bodyPr anchor="ctr">
+            <a:normAutofit/>
+          </a:bodyPr>
+          <a:lstStyle/>
+          <a:p>
+            <a:r>
+              <a:rPr lang="en-US" dirty="0">
+                <a:solidFill>
+                  <a:srgbClr val="FFFFFF"/>
+                </a:solidFill>
+              </a:rPr>
+              <a:t>Why Best Practices for Coded Models?</a:t>
+            </a:r>
+          </a:p>
+        </p:txBody>
+      </p:sp>
+      <p:sp>
+        <p:nvSpPr>
+          <p:cNvPr id="3" name="Content Placeholder 2">
+            <a:extLst>
+              <a:ext uri="{FF2B5EF4-FFF2-40B4-BE49-F238E27FC236}">
+                <a16:creationId xmlns:a16="http://schemas.microsoft.com/office/drawing/2014/main" id="{077028CB-5289-2A96-1FCA-FF5C2AC0ECB5}"/>
+              </a:ext>
+            </a:extLst>
+          </p:cNvPr>
+          <p:cNvSpPr>
+            <a:spLocks noGrp="1"/>
+          </p:cNvSpPr>
+          <p:nvPr>
+            <p:ph idx="1"/>
+          </p:nvPr>
+        </p:nvSpPr>
+        <p:spPr>
+          <a:xfrm>
+            <a:off x="4261950" y="685472"/>
+            <a:ext cx="7779486" cy="6023800"/>
+          </a:xfrm>
+        </p:spPr>
+        <p:txBody>
+          <a:bodyPr anchor="t" anchorCtr="0">
+            <a:normAutofit/>
+          </a:bodyPr>
+          <a:lstStyle/>
+          <a:p>
+            <a:pPr>
+              <a:lnSpc>
+                <a:spcPct val="90000"/>
+              </a:lnSpc>
+            </a:pPr>
+            <a:r>
+              <a:rPr lang="en-US" sz="1600" dirty="0"/>
+              <a:t>Have you ever:</a:t>
+            </a:r>
+          </a:p>
+          <a:p>
+            <a:pPr lvl="1">
+              <a:lnSpc>
+                <a:spcPct val="90000"/>
+              </a:lnSpc>
+            </a:pPr>
+            <a:r>
+              <a:rPr lang="en-US" sz="1500" dirty="0"/>
+              <a:t>Picked up a colleague’s, former student’s (or your own </a:t>
+            </a:r>
+            <a:r>
+              <a:rPr lang="en-US" sz="1500" dirty="0">
+                <a:sym typeface="Wingdings" pitchFamily="2" charset="2"/>
+              </a:rPr>
+              <a:t>🤪😫) </a:t>
+            </a:r>
+            <a:r>
+              <a:rPr lang="en-US" sz="1500" dirty="0"/>
+              <a:t>code and spent hours trying to understand it?</a:t>
+            </a:r>
+          </a:p>
+          <a:p>
+            <a:pPr lvl="1">
+              <a:lnSpc>
+                <a:spcPct val="90000"/>
+              </a:lnSpc>
+            </a:pPr>
+            <a:r>
+              <a:rPr lang="en-US" sz="1500" dirty="0"/>
+              <a:t>Been unable or had difficulty running someone’s previous model?</a:t>
+            </a:r>
+          </a:p>
+          <a:p>
+            <a:pPr lvl="1">
+              <a:lnSpc>
+                <a:spcPct val="90000"/>
+              </a:lnSpc>
+            </a:pPr>
+            <a:r>
+              <a:rPr lang="en-US" sz="1500" dirty="0"/>
+              <a:t>Had difficulty extending or scaling a previous model (your own or someone else’s?</a:t>
+            </a:r>
+          </a:p>
+          <a:p>
+            <a:pPr>
+              <a:lnSpc>
+                <a:spcPct val="90000"/>
+              </a:lnSpc>
+            </a:pPr>
+            <a:r>
+              <a:rPr lang="en-US" sz="1600" dirty="0"/>
+              <a:t>HUGE opportunity to set best practices individually, in research groups and corporate teams –it’s a leadership job!!!</a:t>
+            </a:r>
+          </a:p>
+          <a:p>
+            <a:pPr>
+              <a:lnSpc>
+                <a:spcPct val="90000"/>
+              </a:lnSpc>
+            </a:pPr>
+            <a:endParaRPr lang="en-US" sz="1600" dirty="0"/>
+          </a:p>
+          <a:p>
+            <a:pPr>
+              <a:lnSpc>
+                <a:spcPct val="90000"/>
+              </a:lnSpc>
+            </a:pPr>
+            <a:endParaRPr lang="en-US" sz="1600" dirty="0"/>
+          </a:p>
+          <a:p>
+            <a:pPr>
+              <a:lnSpc>
+                <a:spcPct val="90000"/>
+              </a:lnSpc>
+            </a:pPr>
+            <a:endParaRPr lang="en-US" sz="1600" dirty="0"/>
+          </a:p>
+          <a:p>
+            <a:pPr>
+              <a:lnSpc>
+                <a:spcPct val="90000"/>
+              </a:lnSpc>
+            </a:pPr>
+            <a:endParaRPr lang="en-US" sz="1600" dirty="0"/>
+          </a:p>
+          <a:p>
+            <a:pPr>
+              <a:lnSpc>
+                <a:spcPct val="90000"/>
+              </a:lnSpc>
+            </a:pPr>
+            <a:endParaRPr lang="en-US" sz="1600" dirty="0"/>
+          </a:p>
+          <a:p>
+            <a:pPr>
+              <a:lnSpc>
+                <a:spcPct val="90000"/>
+              </a:lnSpc>
+            </a:pPr>
+            <a:endParaRPr lang="en-US" sz="1600" dirty="0"/>
+          </a:p>
+          <a:p>
+            <a:pPr>
+              <a:lnSpc>
+                <a:spcPct val="90000"/>
+              </a:lnSpc>
+            </a:pPr>
+            <a:endParaRPr lang="en-US" sz="1600" dirty="0"/>
+          </a:p>
+          <a:p>
+            <a:pPr>
+              <a:lnSpc>
+                <a:spcPct val="90000"/>
+              </a:lnSpc>
+            </a:pPr>
+            <a:r>
+              <a:rPr lang="en-US" sz="1600" dirty="0"/>
+              <a:t>Target audience: </a:t>
+            </a:r>
+          </a:p>
+          <a:p>
+            <a:pPr lvl="1">
+              <a:lnSpc>
+                <a:spcPct val="90000"/>
+              </a:lnSpc>
+            </a:pPr>
+            <a:r>
+              <a:rPr lang="en-US" sz="1400" dirty="0"/>
+              <a:t>Leaders of groups who want to lead setting culture </a:t>
+            </a:r>
+            <a:r>
+              <a:rPr lang="en-US" sz="1400" dirty="0" err="1"/>
+              <a:t>fpr</a:t>
+            </a:r>
+            <a:r>
+              <a:rPr lang="en-US" sz="1400" dirty="0"/>
+              <a:t> how things are done under their watch</a:t>
+            </a:r>
+          </a:p>
+          <a:p>
+            <a:pPr lvl="1">
+              <a:lnSpc>
+                <a:spcPct val="90000"/>
+              </a:lnSpc>
+            </a:pPr>
+            <a:r>
+              <a:rPr lang="en-US" sz="1400" dirty="0"/>
+              <a:t>Individual modelers –graduate students, practicing engineers and scientists. Anyone who builds coded models but is not full-time software engineer or member of software development team</a:t>
+            </a:r>
+          </a:p>
+          <a:p>
+            <a:pPr>
+              <a:lnSpc>
+                <a:spcPct val="90000"/>
+              </a:lnSpc>
+            </a:pPr>
+            <a:endParaRPr lang="en-US" sz="1600" dirty="0"/>
+          </a:p>
+          <a:p>
+            <a:pPr>
+              <a:lnSpc>
+                <a:spcPct val="90000"/>
+              </a:lnSpc>
+            </a:pPr>
+            <a:endParaRPr lang="en-US" sz="1600" dirty="0"/>
+          </a:p>
+          <a:p>
+            <a:pPr>
+              <a:lnSpc>
+                <a:spcPct val="90000"/>
+              </a:lnSpc>
+            </a:pPr>
+            <a:endParaRPr lang="en-US" sz="1600" dirty="0"/>
+          </a:p>
+          <a:p>
+            <a:pPr>
+              <a:lnSpc>
+                <a:spcPct val="90000"/>
+              </a:lnSpc>
+            </a:pPr>
+            <a:endParaRPr lang="en-US" sz="1600" dirty="0"/>
+          </a:p>
+          <a:p>
+            <a:pPr marL="0" indent="0">
+              <a:lnSpc>
+                <a:spcPct val="90000"/>
+              </a:lnSpc>
+              <a:buNone/>
+            </a:pPr>
+            <a:endParaRPr lang="en-US" sz="1600" b="1" u="sng" dirty="0"/>
+          </a:p>
+          <a:p>
+            <a:pPr>
+              <a:lnSpc>
+                <a:spcPct val="90000"/>
+              </a:lnSpc>
+            </a:pPr>
+            <a:endParaRPr lang="en-US" sz="1600" dirty="0"/>
+          </a:p>
+        </p:txBody>
+      </p:sp>
+      <p:pic>
+        <p:nvPicPr>
+          <p:cNvPr id="9" name="Picture 8" descr="A green circle with white text&#10;&#10;AI-generated content may be incorrect.">
+            <a:extLst>
+              <a:ext uri="{FF2B5EF4-FFF2-40B4-BE49-F238E27FC236}">
+                <a16:creationId xmlns:a16="http://schemas.microsoft.com/office/drawing/2014/main" id="{3285EF9E-53CF-C3D4-5706-EE71B6DEC592}"/>
+              </a:ext>
+            </a:extLst>
+          </p:cNvPr>
+          <p:cNvPicPr>
+            <a:picLocks noChangeAspect="1"/>
+          </p:cNvPicPr>
+          <p:nvPr/>
+        </p:nvPicPr>
+        <p:blipFill>
+          <a:blip r:embed="rId2">
+            <a:extLst>
+              <a:ext uri="{28A0092B-C50C-407E-A947-70E740481C1C}">
+                <a14:useLocalDpi xmlns:a14="http://schemas.microsoft.com/office/drawing/2010/main" val="0"/>
+              </a:ext>
+            </a:extLst>
+          </a:blip>
+          <a:stretch>
+            <a:fillRect/>
+          </a:stretch>
+        </p:blipFill>
+        <p:spPr>
+          <a:xfrm>
+            <a:off x="4823162" y="2946137"/>
+            <a:ext cx="6031304" cy="2303445"/>
           </a:xfrm>
           <a:prstGeom prst="rect">
             <a:avLst/>
@@ -6830,7 +8181,2388 @@
     </p:spTree>
     <p:extLst>
       <p:ext uri="{BB962C8B-B14F-4D97-AF65-F5344CB8AC3E}">
+        <p14:creationId xmlns:p14="http://schemas.microsoft.com/office/powerpoint/2010/main" val="4197475938"/>
+      </p:ext>
+    </p:extLst>
+  </p:cSld>
+  <p:clrMapOvr>
+    <a:masterClrMapping/>
+  </p:clrMapOvr>
+</p:sld>
+</file>
+
+<file path=ppt/slides/slide5.xml><?xml version="1.0" encoding="utf-8"?>
+<p:sld xmlns:a="http://schemas.openxmlformats.org/drawingml/2006/main" xmlns:r="http://schemas.openxmlformats.org/officeDocument/2006/relationships" xmlns:p="http://schemas.openxmlformats.org/presentationml/2006/main">
+  <p:cSld>
+    <p:bg>
+      <p:bgPr>
+        <a:solidFill>
+          <a:schemeClr val="bg1"/>
+        </a:solidFill>
+        <a:effectLst/>
+      </p:bgPr>
+    </p:bg>
+    <p:spTree>
+      <p:nvGrpSpPr>
+        <p:cNvPr id="1" name="">
+          <a:extLst>
+            <a:ext uri="{FF2B5EF4-FFF2-40B4-BE49-F238E27FC236}">
+              <a16:creationId xmlns:a16="http://schemas.microsoft.com/office/drawing/2014/main" id="{C4EECD3A-45DF-1033-D628-1516192870D7}"/>
+            </a:ext>
+          </a:extLst>
+        </p:cNvPr>
+        <p:cNvGrpSpPr/>
+        <p:nvPr/>
+      </p:nvGrpSpPr>
+      <p:grpSpPr>
+        <a:xfrm>
+          <a:off x="0" y="0"/>
+          <a:ext cx="0" cy="0"/>
+          <a:chOff x="0" y="0"/>
+          <a:chExt cx="0" cy="0"/>
+        </a:xfrm>
+      </p:grpSpPr>
+      <p:sp>
+        <p:nvSpPr>
+          <p:cNvPr id="2" name="Title 1">
+            <a:extLst>
+              <a:ext uri="{FF2B5EF4-FFF2-40B4-BE49-F238E27FC236}">
+                <a16:creationId xmlns:a16="http://schemas.microsoft.com/office/drawing/2014/main" id="{E2663FEF-95B2-F4D1-0BD0-3F71449186FD}"/>
+              </a:ext>
+            </a:extLst>
+          </p:cNvPr>
+          <p:cNvSpPr>
+            <a:spLocks noGrp="1"/>
+          </p:cNvSpPr>
+          <p:nvPr>
+            <p:ph type="title"/>
+          </p:nvPr>
+        </p:nvSpPr>
+        <p:spPr/>
+        <p:txBody>
+          <a:bodyPr anchor="ctr">
+            <a:normAutofit/>
+          </a:bodyPr>
+          <a:lstStyle/>
+          <a:p>
+            <a:r>
+              <a:rPr lang="en-US" dirty="0">
+                <a:solidFill>
+                  <a:srgbClr val="FFFFFF"/>
+                </a:solidFill>
+              </a:rPr>
+              <a:t>Why Best Practices for Coded Models?</a:t>
+            </a:r>
+          </a:p>
+        </p:txBody>
+      </p:sp>
+      <p:sp>
+        <p:nvSpPr>
+          <p:cNvPr id="3" name="Content Placeholder 2">
+            <a:extLst>
+              <a:ext uri="{FF2B5EF4-FFF2-40B4-BE49-F238E27FC236}">
+                <a16:creationId xmlns:a16="http://schemas.microsoft.com/office/drawing/2014/main" id="{34E62704-CDBF-ADED-6C57-4E651CAC306E}"/>
+              </a:ext>
+            </a:extLst>
+          </p:cNvPr>
+          <p:cNvSpPr>
+            <a:spLocks noGrp="1"/>
+          </p:cNvSpPr>
+          <p:nvPr>
+            <p:ph idx="1"/>
+          </p:nvPr>
+        </p:nvSpPr>
+        <p:spPr>
+          <a:xfrm>
+            <a:off x="4261950" y="685472"/>
+            <a:ext cx="7779486" cy="6023800"/>
+          </a:xfrm>
+        </p:spPr>
+        <p:txBody>
+          <a:bodyPr anchor="t" anchorCtr="0">
+            <a:normAutofit/>
+          </a:bodyPr>
+          <a:lstStyle/>
+          <a:p>
+            <a:pPr>
+              <a:lnSpc>
+                <a:spcPct val="90000"/>
+              </a:lnSpc>
+            </a:pPr>
+            <a:endParaRPr lang="en-US" sz="1600" dirty="0"/>
+          </a:p>
+          <a:p>
+            <a:pPr>
+              <a:lnSpc>
+                <a:spcPct val="90000"/>
+              </a:lnSpc>
+            </a:pPr>
+            <a:endParaRPr lang="en-US" sz="1600" dirty="0"/>
+          </a:p>
+          <a:p>
+            <a:pPr>
+              <a:lnSpc>
+                <a:spcPct val="90000"/>
+              </a:lnSpc>
+            </a:pPr>
+            <a:endParaRPr lang="en-US" sz="1600" dirty="0"/>
+          </a:p>
+          <a:p>
+            <a:pPr marL="0" indent="0">
+              <a:lnSpc>
+                <a:spcPct val="90000"/>
+              </a:lnSpc>
+              <a:buNone/>
+            </a:pPr>
+            <a:endParaRPr lang="en-US" sz="1600" b="1" u="sng" dirty="0"/>
+          </a:p>
+          <a:p>
+            <a:pPr marL="0" indent="0">
+              <a:lnSpc>
+                <a:spcPct val="90000"/>
+              </a:lnSpc>
+              <a:buNone/>
+            </a:pPr>
+            <a:endParaRPr lang="en-US" sz="1600" b="1" u="sng" dirty="0"/>
+          </a:p>
+          <a:p>
+            <a:pPr marL="0" indent="0">
+              <a:lnSpc>
+                <a:spcPct val="90000"/>
+              </a:lnSpc>
+              <a:buNone/>
+            </a:pPr>
+            <a:r>
+              <a:rPr lang="en-US" sz="1600" u="sng" dirty="0"/>
+              <a:t>Objectives of Implementing best practices</a:t>
+            </a:r>
+          </a:p>
+          <a:p>
+            <a:pPr marL="342900" indent="-342900">
+              <a:lnSpc>
+                <a:spcPct val="90000"/>
+              </a:lnSpc>
+              <a:buAutoNum type="arabicPeriod"/>
+            </a:pPr>
+            <a:r>
+              <a:rPr lang="en-US" sz="1600" dirty="0"/>
+              <a:t>Gain ability to create </a:t>
+            </a:r>
+            <a:r>
+              <a:rPr lang="en-US" sz="1600" u="sng" dirty="0"/>
+              <a:t>Curated</a:t>
+            </a:r>
+            <a:r>
+              <a:rPr lang="en-US" sz="1600" dirty="0"/>
+              <a:t> coded models personally and in your team </a:t>
+            </a:r>
+          </a:p>
+          <a:p>
+            <a:pPr marL="349250" indent="0">
+              <a:lnSpc>
+                <a:spcPct val="90000"/>
+              </a:lnSpc>
+              <a:buNone/>
+            </a:pPr>
+            <a:r>
+              <a:rPr lang="en-US" sz="1600" dirty="0"/>
+              <a:t>(see xxx, 2009)</a:t>
+            </a:r>
+          </a:p>
+          <a:p>
+            <a:pPr marL="342900" indent="-342900">
+              <a:lnSpc>
+                <a:spcPct val="90000"/>
+              </a:lnSpc>
+              <a:buFont typeface="+mj-lt"/>
+              <a:buAutoNum type="arabicPeriod" startAt="2"/>
+            </a:pPr>
+            <a:r>
+              <a:rPr lang="en-US" sz="1600" dirty="0"/>
+              <a:t>Validate with </a:t>
+            </a:r>
+            <a:r>
+              <a:rPr lang="en-US" sz="1600" u="sng" dirty="0"/>
+              <a:t>rerunnable tests</a:t>
+            </a:r>
+            <a:r>
+              <a:rPr lang="en-US" sz="1600" dirty="0"/>
+              <a:t> -- guard against future broken models </a:t>
+            </a:r>
+          </a:p>
+          <a:p>
+            <a:pPr marL="349250" indent="0">
+              <a:lnSpc>
+                <a:spcPct val="90000"/>
+              </a:lnSpc>
+              <a:buNone/>
+            </a:pPr>
+            <a:r>
+              <a:rPr lang="en-US" sz="1600" dirty="0"/>
+              <a:t>(see TDD for inspiration but keep it practical)</a:t>
+            </a:r>
+          </a:p>
+          <a:p>
+            <a:pPr marL="342900" indent="-342900">
+              <a:lnSpc>
+                <a:spcPct val="90000"/>
+              </a:lnSpc>
+              <a:buFont typeface="+mj-lt"/>
+              <a:buAutoNum type="arabicPeriod" startAt="3"/>
+            </a:pPr>
+            <a:r>
+              <a:rPr lang="en-US" sz="1600" dirty="0"/>
+              <a:t>Learn to develop efficiently </a:t>
+            </a:r>
+            <a:r>
+              <a:rPr lang="en-US" sz="1600" u="sng" dirty="0"/>
+              <a:t>using AI tools </a:t>
+            </a:r>
+            <a:r>
+              <a:rPr lang="en-US" sz="1600" dirty="0"/>
+              <a:t>to write the code (≈90%. Let’s be honest!) </a:t>
+            </a:r>
+          </a:p>
+          <a:p>
+            <a:pPr marL="0" indent="0">
+              <a:lnSpc>
+                <a:spcPct val="90000"/>
+              </a:lnSpc>
+              <a:buNone/>
+            </a:pPr>
+            <a:endParaRPr lang="en-US" sz="1600" dirty="0"/>
+          </a:p>
+          <a:p>
+            <a:pPr marL="0" indent="0">
+              <a:lnSpc>
+                <a:spcPct val="90000"/>
+              </a:lnSpc>
+              <a:buNone/>
+            </a:pPr>
+            <a:r>
+              <a:rPr lang="en-US" sz="1600" dirty="0"/>
+              <a:t>Full story and tutorials are at: xxx Github repo link xxx</a:t>
+            </a:r>
+          </a:p>
+          <a:p>
+            <a:pPr marL="0" indent="0">
+              <a:lnSpc>
+                <a:spcPct val="90000"/>
+              </a:lnSpc>
+              <a:buNone/>
+            </a:pPr>
+            <a:r>
+              <a:rPr lang="en-US" sz="1500" dirty="0"/>
+              <a:t>(If unfamiliar with Github, click on </a:t>
+            </a:r>
+            <a:r>
+              <a:rPr lang="en-US" sz="1500" b="1" dirty="0"/>
+              <a:t>Readme.</a:t>
+            </a:r>
+            <a:r>
+              <a:rPr lang="en-US" sz="1500" dirty="0"/>
+              <a:t>md doc for download instructions)</a:t>
+            </a:r>
+          </a:p>
+          <a:p>
+            <a:pPr marL="342900" indent="-342900">
+              <a:lnSpc>
+                <a:spcPct val="90000"/>
+              </a:lnSpc>
+              <a:buAutoNum type="arabicPeriod"/>
+            </a:pPr>
+            <a:endParaRPr lang="en-US" sz="1600" dirty="0"/>
+          </a:p>
+          <a:p>
+            <a:pPr>
+              <a:lnSpc>
+                <a:spcPct val="90000"/>
+              </a:lnSpc>
+            </a:pPr>
+            <a:endParaRPr lang="en-US" sz="1600" dirty="0"/>
+          </a:p>
+          <a:p>
+            <a:pPr>
+              <a:lnSpc>
+                <a:spcPct val="90000"/>
+              </a:lnSpc>
+            </a:pPr>
+            <a:endParaRPr lang="en-US" sz="1600" dirty="0"/>
+          </a:p>
+        </p:txBody>
+      </p:sp>
+      <p:grpSp>
+        <p:nvGrpSpPr>
+          <p:cNvPr id="8" name="Group 7">
+            <a:extLst>
+              <a:ext uri="{FF2B5EF4-FFF2-40B4-BE49-F238E27FC236}">
+                <a16:creationId xmlns:a16="http://schemas.microsoft.com/office/drawing/2014/main" id="{AA92A054-F2DB-C304-3BDA-535158E03DE7}"/>
+              </a:ext>
+            </a:extLst>
+          </p:cNvPr>
+          <p:cNvGrpSpPr/>
+          <p:nvPr/>
+        </p:nvGrpSpPr>
+        <p:grpSpPr>
+          <a:xfrm>
+            <a:off x="5620536" y="933450"/>
+            <a:ext cx="4797910" cy="1238034"/>
+            <a:chOff x="5185186" y="3270325"/>
+            <a:chExt cx="4797910" cy="1238034"/>
+          </a:xfrm>
+        </p:grpSpPr>
+        <p:sp>
+          <p:nvSpPr>
+            <p:cNvPr id="4" name="TextBox 3">
+              <a:extLst>
+                <a:ext uri="{FF2B5EF4-FFF2-40B4-BE49-F238E27FC236}">
+                  <a16:creationId xmlns:a16="http://schemas.microsoft.com/office/drawing/2014/main" id="{361E7E40-8FA2-2C12-E1C6-31FB00BAA196}"/>
+                </a:ext>
+              </a:extLst>
+            </p:cNvPr>
+            <p:cNvSpPr txBox="1"/>
+            <p:nvPr/>
+          </p:nvSpPr>
+          <p:spPr>
+            <a:xfrm>
+              <a:off x="5185186" y="3270325"/>
+              <a:ext cx="1376979" cy="923330"/>
+            </a:xfrm>
+            <a:prstGeom prst="rect">
+              <a:avLst/>
+            </a:prstGeom>
+            <a:noFill/>
+          </p:spPr>
+          <p:txBody>
+            <a:bodyPr wrap="square" rtlCol="0">
+              <a:spAutoFit/>
+            </a:bodyPr>
+            <a:lstStyle/>
+            <a:p>
+              <a:r>
+                <a:rPr lang="en-US" dirty="0"/>
+                <a:t>Best Practices for Models</a:t>
+              </a:r>
+            </a:p>
+          </p:txBody>
+        </p:sp>
+        <p:sp>
+          <p:nvSpPr>
+            <p:cNvPr id="5" name="Right Arrow 4">
+              <a:extLst>
+                <a:ext uri="{FF2B5EF4-FFF2-40B4-BE49-F238E27FC236}">
+                  <a16:creationId xmlns:a16="http://schemas.microsoft.com/office/drawing/2014/main" id="{9043EA15-5682-9121-C7B3-AC44A813A30D}"/>
+                </a:ext>
+              </a:extLst>
+            </p:cNvPr>
+            <p:cNvSpPr/>
+            <p:nvPr/>
+          </p:nvSpPr>
+          <p:spPr>
+            <a:xfrm>
+              <a:off x="6658984" y="3506079"/>
+              <a:ext cx="1065007" cy="451822"/>
+            </a:xfrm>
+            <a:prstGeom prst="rightArrow">
+              <a:avLst/>
+            </a:prstGeom>
+            <a:solidFill>
+              <a:schemeClr val="accent6"/>
+            </a:solidFill>
+          </p:spPr>
+          <p:style>
+            <a:lnRef idx="2">
+              <a:schemeClr val="accent1">
+                <a:shade val="15000"/>
+              </a:schemeClr>
+            </a:lnRef>
+            <a:fillRef idx="1">
+              <a:schemeClr val="accent1"/>
+            </a:fillRef>
+            <a:effectRef idx="0">
+              <a:schemeClr val="accent1"/>
+            </a:effectRef>
+            <a:fontRef idx="minor">
+              <a:schemeClr val="lt1"/>
+            </a:fontRef>
+          </p:style>
+          <p:txBody>
+            <a:bodyPr rtlCol="0" anchor="ctr"/>
+            <a:lstStyle/>
+            <a:p>
+              <a:pPr algn="ctr"/>
+              <a:endParaRPr lang="en-US"/>
+            </a:p>
+          </p:txBody>
+        </p:sp>
+        <p:sp>
+          <p:nvSpPr>
+            <p:cNvPr id="7" name="TextBox 6">
+              <a:extLst>
+                <a:ext uri="{FF2B5EF4-FFF2-40B4-BE49-F238E27FC236}">
+                  <a16:creationId xmlns:a16="http://schemas.microsoft.com/office/drawing/2014/main" id="{E7A5715A-5E82-870B-8ECB-644D9AC4073E}"/>
+                </a:ext>
+              </a:extLst>
+            </p:cNvPr>
+            <p:cNvSpPr txBox="1"/>
+            <p:nvPr/>
+          </p:nvSpPr>
+          <p:spPr>
+            <a:xfrm>
+              <a:off x="8317454" y="3308030"/>
+              <a:ext cx="1665642" cy="1200329"/>
+            </a:xfrm>
+            <a:prstGeom prst="rect">
+              <a:avLst/>
+            </a:prstGeom>
+            <a:noFill/>
+          </p:spPr>
+          <p:txBody>
+            <a:bodyPr wrap="square" rtlCol="0">
+              <a:spAutoFit/>
+            </a:bodyPr>
+            <a:lstStyle/>
+            <a:p>
+              <a:r>
+                <a:rPr lang="en-US" dirty="0"/>
+                <a:t>“This is how we do things around here”</a:t>
+              </a:r>
+            </a:p>
+            <a:p>
+              <a:r>
+                <a:rPr lang="en-US" dirty="0"/>
+                <a:t>aka TIHWDTAH</a:t>
+              </a:r>
+            </a:p>
+          </p:txBody>
+        </p:sp>
+      </p:grpSp>
+    </p:spTree>
+    <p:extLst>
+      <p:ext uri="{BB962C8B-B14F-4D97-AF65-F5344CB8AC3E}">
+        <p14:creationId xmlns:p14="http://schemas.microsoft.com/office/powerpoint/2010/main" val="190365730"/>
+      </p:ext>
+    </p:extLst>
+  </p:cSld>
+  <p:clrMapOvr>
+    <a:masterClrMapping/>
+  </p:clrMapOvr>
+</p:sld>
+</file>
+
+<file path=ppt/slides/slide6.xml><?xml version="1.0" encoding="utf-8"?>
+<p:sld xmlns:a="http://schemas.openxmlformats.org/drawingml/2006/main" xmlns:r="http://schemas.openxmlformats.org/officeDocument/2006/relationships" xmlns:p="http://schemas.openxmlformats.org/presentationml/2006/main">
+  <p:cSld>
+    <p:bg>
+      <p:bgPr>
+        <a:solidFill>
+          <a:schemeClr val="bg1"/>
+        </a:solidFill>
+        <a:effectLst/>
+      </p:bgPr>
+    </p:bg>
+    <p:spTree>
+      <p:nvGrpSpPr>
+        <p:cNvPr id="1" name=""/>
+        <p:cNvGrpSpPr/>
+        <p:nvPr/>
+      </p:nvGrpSpPr>
+      <p:grpSpPr>
+        <a:xfrm>
+          <a:off x="0" y="0"/>
+          <a:ext cx="0" cy="0"/>
+          <a:chOff x="0" y="0"/>
+          <a:chExt cx="0" cy="0"/>
+        </a:xfrm>
+      </p:grpSpPr>
+      <p:sp useBgFill="1">
+        <p:nvSpPr>
+          <p:cNvPr id="32" name="Rectangle 31">
+            <a:extLst>
+              <a:ext uri="{FF2B5EF4-FFF2-40B4-BE49-F238E27FC236}">
+                <a16:creationId xmlns:a16="http://schemas.microsoft.com/office/drawing/2014/main" id="{504BED40-EAF7-4E55-AFF7-2CD840EBD3AA}"/>
+              </a:ext>
+              <a:ext uri="{C183D7F6-B498-43B3-948B-1728B52AA6E4}">
+                <adec:decorative xmlns:adec="http://schemas.microsoft.com/office/drawing/2017/decorative" val="1"/>
+              </a:ext>
+            </a:extLst>
+          </p:cNvPr>
+          <p:cNvSpPr>
+            <a:spLocks noGrp="1" noRot="1" noChangeAspect="1" noMove="1" noResize="1" noEditPoints="1" noAdjustHandles="1" noChangeArrowheads="1" noChangeShapeType="1" noTextEdit="1"/>
+          </p:cNvSpPr>
+          <p:nvPr>
+            <p:extLst>
+              <p:ext uri="{386F3935-93C4-4BCD-93E2-E3B085C9AB24}">
+                <p16:designElem xmlns:p16="http://schemas.microsoft.com/office/powerpoint/2015/main" val="1"/>
+              </p:ext>
+            </p:extLst>
+          </p:nvPr>
+        </p:nvSpPr>
+        <p:spPr>
+          <a:xfrm>
+            <a:off x="0" y="0"/>
+            <a:ext cx="12192000" cy="6858000"/>
+          </a:xfrm>
+          <a:prstGeom prst="rect">
+            <a:avLst/>
+          </a:prstGeom>
+          <a:ln>
+            <a:noFill/>
+          </a:ln>
+        </p:spPr>
+        <p:style>
+          <a:lnRef idx="2">
+            <a:schemeClr val="accent1">
+              <a:shade val="50000"/>
+            </a:schemeClr>
+          </a:lnRef>
+          <a:fillRef idx="1">
+            <a:schemeClr val="accent1"/>
+          </a:fillRef>
+          <a:effectRef idx="0">
+            <a:schemeClr val="accent1"/>
+          </a:effectRef>
+          <a:fontRef idx="minor">
+            <a:schemeClr val="lt1"/>
+          </a:fontRef>
+        </p:style>
+        <p:txBody>
+          <a:bodyPr rtlCol="0" anchor="ctr"/>
+          <a:lstStyle/>
+          <a:p>
+            <a:pPr algn="ctr"/>
+            <a:endParaRPr lang="en-US"/>
+          </a:p>
+        </p:txBody>
+      </p:sp>
+      <p:sp>
+        <p:nvSpPr>
+          <p:cNvPr id="2" name="Title 1">
+            <a:extLst>
+              <a:ext uri="{FF2B5EF4-FFF2-40B4-BE49-F238E27FC236}">
+                <a16:creationId xmlns:a16="http://schemas.microsoft.com/office/drawing/2014/main" id="{54EE378A-F88D-4129-A984-BE9F8C7B2BC5}"/>
+              </a:ext>
+            </a:extLst>
+          </p:cNvPr>
+          <p:cNvSpPr>
+            <a:spLocks noGrp="1"/>
+          </p:cNvSpPr>
+          <p:nvPr>
+            <p:ph type="title"/>
+          </p:nvPr>
+        </p:nvSpPr>
+        <p:spPr>
+          <a:xfrm>
+            <a:off x="581193" y="702156"/>
+            <a:ext cx="6309003" cy="1013800"/>
+          </a:xfrm>
+        </p:spPr>
+        <p:txBody>
+          <a:bodyPr>
+            <a:normAutofit/>
+          </a:bodyPr>
+          <a:lstStyle/>
+          <a:p>
+            <a:r>
+              <a:rPr lang="en-US" dirty="0">
+                <a:solidFill>
+                  <a:schemeClr val="tx2"/>
+                </a:solidFill>
+              </a:rPr>
+              <a:t>Best Practices – Python Model </a:t>
+            </a:r>
+          </a:p>
+        </p:txBody>
+      </p:sp>
+      <p:sp>
+        <p:nvSpPr>
+          <p:cNvPr id="34" name="Rectangle 33">
+            <a:extLst>
+              <a:ext uri="{FF2B5EF4-FFF2-40B4-BE49-F238E27FC236}">
+                <a16:creationId xmlns:a16="http://schemas.microsoft.com/office/drawing/2014/main" id="{F367CCF1-BB1E-41CF-8499-94A870C33EFA}"/>
+              </a:ext>
+              <a:ext uri="{C183D7F6-B498-43B3-948B-1728B52AA6E4}">
+                <adec:decorative xmlns:adec="http://schemas.microsoft.com/office/drawing/2017/decorative" val="1"/>
+              </a:ext>
+            </a:extLst>
+          </p:cNvPr>
+          <p:cNvSpPr>
+            <a:spLocks noGrp="1" noRot="1" noChangeAspect="1" noMove="1" noResize="1" noEditPoints="1" noAdjustHandles="1" noChangeArrowheads="1" noChangeShapeType="1" noTextEdit="1"/>
+          </p:cNvSpPr>
+          <p:nvPr>
+            <p:extLst>
+              <p:ext uri="{386F3935-93C4-4BCD-93E2-E3B085C9AB24}">
+                <p16:designElem xmlns:p16="http://schemas.microsoft.com/office/powerpoint/2015/main" val="1"/>
+              </p:ext>
+            </p:extLst>
+          </p:nvPr>
+        </p:nvSpPr>
+        <p:spPr>
+          <a:xfrm>
+            <a:off x="446534" y="457200"/>
+            <a:ext cx="6675120" cy="94997"/>
+          </a:xfrm>
+          <a:prstGeom prst="rect">
+            <a:avLst/>
+          </a:prstGeom>
+          <a:solidFill>
+            <a:schemeClr val="accent1"/>
+          </a:solidFill>
+          <a:ln>
+            <a:noFill/>
+          </a:ln>
+          <a:effectLst/>
+        </p:spPr>
+        <p:style>
+          <a:lnRef idx="1">
+            <a:schemeClr val="accent1"/>
+          </a:lnRef>
+          <a:fillRef idx="3">
+            <a:schemeClr val="accent1"/>
+          </a:fillRef>
+          <a:effectRef idx="2">
+            <a:schemeClr val="accent1"/>
+          </a:effectRef>
+          <a:fontRef idx="minor">
+            <a:schemeClr val="lt1"/>
+          </a:fontRef>
+        </p:style>
+        <p:txBody>
+          <a:bodyPr/>
+          <a:lstStyle/>
+          <a:p>
+            <a:endParaRPr lang="en-US"/>
+          </a:p>
+        </p:txBody>
+      </p:sp>
+      <p:sp>
+        <p:nvSpPr>
+          <p:cNvPr id="3" name="Content Placeholder 2">
+            <a:extLst>
+              <a:ext uri="{FF2B5EF4-FFF2-40B4-BE49-F238E27FC236}">
+                <a16:creationId xmlns:a16="http://schemas.microsoft.com/office/drawing/2014/main" id="{F6CC5DE2-2678-4F40-A49A-D84BF4E75F4F}"/>
+              </a:ext>
+            </a:extLst>
+          </p:cNvPr>
+          <p:cNvSpPr>
+            <a:spLocks noGrp="1"/>
+          </p:cNvSpPr>
+          <p:nvPr>
+            <p:ph idx="1"/>
+          </p:nvPr>
+        </p:nvSpPr>
+        <p:spPr>
+          <a:xfrm>
+            <a:off x="581194" y="1896533"/>
+            <a:ext cx="6675120" cy="3962266"/>
+          </a:xfrm>
+        </p:spPr>
+        <p:txBody>
+          <a:bodyPr anchorCtr="0">
+            <a:normAutofit/>
+          </a:bodyPr>
+          <a:lstStyle/>
+          <a:p>
+            <a:r>
+              <a:rPr lang="en-US" dirty="0">
+                <a:solidFill>
+                  <a:schemeClr val="tx2"/>
+                </a:solidFill>
+              </a:rPr>
+              <a:t>Github has full tutorial to build, curate and validate an industrially useful model for calculating roll properties (Length, L vs. Diam., D)</a:t>
+            </a:r>
+          </a:p>
+          <a:p>
+            <a:r>
+              <a:rPr lang="en-US" dirty="0">
+                <a:solidFill>
+                  <a:schemeClr val="tx2"/>
+                </a:solidFill>
+              </a:rPr>
+              <a:t>Tutorial keeps to a simple example to teach software practices</a:t>
+            </a:r>
+          </a:p>
+          <a:p>
+            <a:r>
+              <a:rPr lang="en-US" dirty="0">
+                <a:solidFill>
+                  <a:schemeClr val="tx2"/>
+                </a:solidFill>
+              </a:rPr>
+              <a:t>Tutorial includes how to use AI to write the code for the model and for rerunnable Python (Pytest) tests in separate files</a:t>
+            </a:r>
+          </a:p>
+          <a:p>
+            <a:pPr marL="0" indent="0">
+              <a:buNone/>
+            </a:pPr>
+            <a:endParaRPr lang="en-US" dirty="0">
+              <a:solidFill>
+                <a:schemeClr val="tx2"/>
+              </a:solidFill>
+            </a:endParaRPr>
+          </a:p>
+          <a:p>
+            <a:endParaRPr lang="en-US" dirty="0">
+              <a:solidFill>
+                <a:schemeClr val="tx2"/>
+              </a:solidFill>
+            </a:endParaRPr>
+          </a:p>
+        </p:txBody>
+      </p:sp>
+      <p:pic>
+        <p:nvPicPr>
+          <p:cNvPr id="9" name="Picture 8" descr="A group of toilet paper rolls&#10;&#10;Description automatically generated with low confidence">
+            <a:extLst>
+              <a:ext uri="{FF2B5EF4-FFF2-40B4-BE49-F238E27FC236}">
+                <a16:creationId xmlns:a16="http://schemas.microsoft.com/office/drawing/2014/main" id="{39A69505-089E-B6FF-8E64-31C5EAD3A7EE}"/>
+              </a:ext>
+            </a:extLst>
+          </p:cNvPr>
+          <p:cNvPicPr>
+            <a:picLocks noChangeAspect="1"/>
+          </p:cNvPicPr>
+          <p:nvPr/>
+        </p:nvPicPr>
+        <p:blipFill>
+          <a:blip r:embed="rId2">
+            <a:extLst>
+              <a:ext uri="{28A0092B-C50C-407E-A947-70E740481C1C}">
+                <a14:useLocalDpi xmlns:a14="http://schemas.microsoft.com/office/drawing/2010/main" val="0"/>
+              </a:ext>
+            </a:extLst>
+          </a:blip>
+          <a:srcRect t="1991" r="-2" b="-2"/>
+          <a:stretch/>
+        </p:blipFill>
+        <p:spPr>
+          <a:xfrm>
+            <a:off x="7256314" y="244008"/>
+            <a:ext cx="2250945" cy="3305050"/>
+          </a:xfrm>
+          <a:prstGeom prst="rect">
+            <a:avLst/>
+          </a:prstGeom>
+        </p:spPr>
+      </p:pic>
+      <p:pic>
+        <p:nvPicPr>
+          <p:cNvPr id="13" name="Picture 12" descr="Chart&#10;&#10;Description automatically generated">
+            <a:extLst>
+              <a:ext uri="{FF2B5EF4-FFF2-40B4-BE49-F238E27FC236}">
+                <a16:creationId xmlns:a16="http://schemas.microsoft.com/office/drawing/2014/main" id="{7AD1E2E4-22D8-5F52-EEF8-6875C1B99446}"/>
+              </a:ext>
+            </a:extLst>
+          </p:cNvPr>
+          <p:cNvPicPr>
+            <a:picLocks noChangeAspect="1"/>
+          </p:cNvPicPr>
+          <p:nvPr/>
+        </p:nvPicPr>
+        <p:blipFill>
+          <a:blip r:embed="rId3">
+            <a:extLst>
+              <a:ext uri="{28A0092B-C50C-407E-A947-70E740481C1C}">
+                <a14:useLocalDpi xmlns:a14="http://schemas.microsoft.com/office/drawing/2010/main" val="0"/>
+              </a:ext>
+            </a:extLst>
+          </a:blip>
+          <a:stretch>
+            <a:fillRect/>
+          </a:stretch>
+        </p:blipFill>
+        <p:spPr>
+          <a:xfrm>
+            <a:off x="9239496" y="2234067"/>
+            <a:ext cx="2808390" cy="4444410"/>
+          </a:xfrm>
+          <a:prstGeom prst="rect">
+            <a:avLst/>
+          </a:prstGeom>
+        </p:spPr>
+      </p:pic>
+      <p:grpSp>
+        <p:nvGrpSpPr>
+          <p:cNvPr id="19" name="Group 18">
+            <a:extLst>
+              <a:ext uri="{FF2B5EF4-FFF2-40B4-BE49-F238E27FC236}">
+                <a16:creationId xmlns:a16="http://schemas.microsoft.com/office/drawing/2014/main" id="{4518BADD-9110-7179-7457-BE1B893D5B05}"/>
+              </a:ext>
+            </a:extLst>
+          </p:cNvPr>
+          <p:cNvGrpSpPr/>
+          <p:nvPr/>
+        </p:nvGrpSpPr>
+        <p:grpSpPr>
+          <a:xfrm>
+            <a:off x="331475" y="5169670"/>
+            <a:ext cx="8576547" cy="706411"/>
+            <a:chOff x="790512" y="5142045"/>
+            <a:chExt cx="8576547" cy="706411"/>
+          </a:xfrm>
+        </p:grpSpPr>
+        <p:pic>
+          <p:nvPicPr>
+            <p:cNvPr id="11" name="Picture 10">
+              <a:extLst>
+                <a:ext uri="{FF2B5EF4-FFF2-40B4-BE49-F238E27FC236}">
+                  <a16:creationId xmlns:a16="http://schemas.microsoft.com/office/drawing/2014/main" id="{E0481433-7221-B35F-00EA-228CC020E242}"/>
+                </a:ext>
+              </a:extLst>
+            </p:cNvPr>
+            <p:cNvPicPr>
+              <a:picLocks noChangeAspect="1"/>
+            </p:cNvPicPr>
+            <p:nvPr/>
+          </p:nvPicPr>
+          <p:blipFill>
+            <a:blip r:embed="rId4">
+              <a:extLst>
+                <a:ext uri="{28A0092B-C50C-407E-A947-70E740481C1C}">
+                  <a14:useLocalDpi xmlns:a14="http://schemas.microsoft.com/office/drawing/2010/main" val="0"/>
+                </a:ext>
+              </a:extLst>
+            </a:blip>
+            <a:stretch>
+              <a:fillRect/>
+            </a:stretch>
+          </p:blipFill>
+          <p:spPr>
+            <a:xfrm>
+              <a:off x="790512" y="5142045"/>
+              <a:ext cx="8576547" cy="706411"/>
+            </a:xfrm>
+            <a:prstGeom prst="rect">
+              <a:avLst/>
+            </a:prstGeom>
+          </p:spPr>
+        </p:pic>
+        <p:sp>
+          <p:nvSpPr>
+            <p:cNvPr id="15" name="Right Arrow 14">
+              <a:extLst>
+                <a:ext uri="{FF2B5EF4-FFF2-40B4-BE49-F238E27FC236}">
+                  <a16:creationId xmlns:a16="http://schemas.microsoft.com/office/drawing/2014/main" id="{64D52FB4-D7F7-AF06-3ECB-ECBCFC85685D}"/>
+                </a:ext>
+              </a:extLst>
+            </p:cNvPr>
+            <p:cNvSpPr/>
+            <p:nvPr/>
+          </p:nvSpPr>
+          <p:spPr>
+            <a:xfrm>
+              <a:off x="3062689" y="5464366"/>
+              <a:ext cx="649995" cy="253388"/>
+            </a:xfrm>
+            <a:prstGeom prst="rightArrow">
+              <a:avLst/>
+            </a:prstGeom>
+            <a:solidFill>
+              <a:schemeClr val="accent6"/>
+            </a:solidFill>
+          </p:spPr>
+          <p:style>
+            <a:lnRef idx="2">
+              <a:schemeClr val="accent1">
+                <a:shade val="15000"/>
+              </a:schemeClr>
+            </a:lnRef>
+            <a:fillRef idx="1">
+              <a:schemeClr val="accent1"/>
+            </a:fillRef>
+            <a:effectRef idx="0">
+              <a:schemeClr val="accent1"/>
+            </a:effectRef>
+            <a:fontRef idx="minor">
+              <a:schemeClr val="lt1"/>
+            </a:fontRef>
+          </p:style>
+          <p:txBody>
+            <a:bodyPr rtlCol="0" anchor="ctr"/>
+            <a:lstStyle/>
+            <a:p>
+              <a:pPr algn="ctr"/>
+              <a:endParaRPr lang="en-US"/>
+            </a:p>
+          </p:txBody>
+        </p:sp>
+        <p:sp>
+          <p:nvSpPr>
+            <p:cNvPr id="17" name="Right Arrow 16">
+              <a:extLst>
+                <a:ext uri="{FF2B5EF4-FFF2-40B4-BE49-F238E27FC236}">
+                  <a16:creationId xmlns:a16="http://schemas.microsoft.com/office/drawing/2014/main" id="{8A4C624F-A8BD-F97B-1EC2-CFD8E2F626D8}"/>
+                </a:ext>
+              </a:extLst>
+            </p:cNvPr>
+            <p:cNvSpPr/>
+            <p:nvPr/>
+          </p:nvSpPr>
+          <p:spPr>
+            <a:xfrm>
+              <a:off x="6890196" y="5407803"/>
+              <a:ext cx="649995" cy="253388"/>
+            </a:xfrm>
+            <a:prstGeom prst="rightArrow">
+              <a:avLst/>
+            </a:prstGeom>
+            <a:solidFill>
+              <a:schemeClr val="accent6"/>
+            </a:solidFill>
+          </p:spPr>
+          <p:style>
+            <a:lnRef idx="2">
+              <a:schemeClr val="accent1">
+                <a:shade val="15000"/>
+              </a:schemeClr>
+            </a:lnRef>
+            <a:fillRef idx="1">
+              <a:schemeClr val="accent1"/>
+            </a:fillRef>
+            <a:effectRef idx="0">
+              <a:schemeClr val="accent1"/>
+            </a:effectRef>
+            <a:fontRef idx="minor">
+              <a:schemeClr val="lt1"/>
+            </a:fontRef>
+          </p:style>
+          <p:txBody>
+            <a:bodyPr rtlCol="0" anchor="ctr"/>
+            <a:lstStyle/>
+            <a:p>
+              <a:pPr algn="ctr"/>
+              <a:endParaRPr lang="en-US"/>
+            </a:p>
+          </p:txBody>
+        </p:sp>
+      </p:grpSp>
+      <p:sp>
+        <p:nvSpPr>
+          <p:cNvPr id="4" name="TextBox 3">
+            <a:extLst>
+              <a:ext uri="{FF2B5EF4-FFF2-40B4-BE49-F238E27FC236}">
+                <a16:creationId xmlns:a16="http://schemas.microsoft.com/office/drawing/2014/main" id="{7C48E5DA-5CEC-24F6-2C3D-E060B232D87E}"/>
+              </a:ext>
+            </a:extLst>
+          </p:cNvPr>
+          <p:cNvSpPr txBox="1"/>
+          <p:nvPr/>
+        </p:nvSpPr>
+        <p:spPr>
+          <a:xfrm>
+            <a:off x="446534" y="6152419"/>
+            <a:ext cx="2395784" cy="276999"/>
+          </a:xfrm>
+          <a:prstGeom prst="rect">
+            <a:avLst/>
+          </a:prstGeom>
+          <a:noFill/>
+        </p:spPr>
+        <p:txBody>
+          <a:bodyPr wrap="none" rtlCol="0">
+            <a:spAutoFit/>
+          </a:bodyPr>
+          <a:lstStyle/>
+          <a:p>
+            <a:r>
+              <a:rPr lang="en-US" sz="1200" dirty="0"/>
+              <a:t>C = material’s caliper or thickness</a:t>
+            </a:r>
+          </a:p>
+        </p:txBody>
+      </p:sp>
+    </p:spTree>
+    <p:extLst>
+      <p:ext uri="{BB962C8B-B14F-4D97-AF65-F5344CB8AC3E}">
         <p14:creationId xmlns:p14="http://schemas.microsoft.com/office/powerpoint/2010/main" val="1551401310"/>
+      </p:ext>
+    </p:extLst>
+  </p:cSld>
+  <p:clrMapOvr>
+    <a:masterClrMapping/>
+  </p:clrMapOvr>
+</p:sld>
+</file>
+
+<file path=ppt/slides/slide7.xml><?xml version="1.0" encoding="utf-8"?>
+<p:sld xmlns:a="http://schemas.openxmlformats.org/drawingml/2006/main" xmlns:r="http://schemas.openxmlformats.org/officeDocument/2006/relationships" xmlns:p="http://schemas.openxmlformats.org/presentationml/2006/main">
+  <p:cSld>
+    <p:bg>
+      <p:bgPr>
+        <a:solidFill>
+          <a:schemeClr val="bg1"/>
+        </a:solidFill>
+        <a:effectLst/>
+      </p:bgPr>
+    </p:bg>
+    <p:spTree>
+      <p:nvGrpSpPr>
+        <p:cNvPr id="1" name="">
+          <a:extLst>
+            <a:ext uri="{FF2B5EF4-FFF2-40B4-BE49-F238E27FC236}">
+              <a16:creationId xmlns:a16="http://schemas.microsoft.com/office/drawing/2014/main" id="{3599F7A0-4085-D891-1FC4-60B889B3D6B0}"/>
+            </a:ext>
+          </a:extLst>
+        </p:cNvPr>
+        <p:cNvGrpSpPr/>
+        <p:nvPr/>
+      </p:nvGrpSpPr>
+      <p:grpSpPr>
+        <a:xfrm>
+          <a:off x="0" y="0"/>
+          <a:ext cx="0" cy="0"/>
+          <a:chOff x="0" y="0"/>
+          <a:chExt cx="0" cy="0"/>
+        </a:xfrm>
+      </p:grpSpPr>
+      <p:sp useBgFill="1">
+        <p:nvSpPr>
+          <p:cNvPr id="32" name="Rectangle 31">
+            <a:extLst>
+              <a:ext uri="{FF2B5EF4-FFF2-40B4-BE49-F238E27FC236}">
+                <a16:creationId xmlns:a16="http://schemas.microsoft.com/office/drawing/2014/main" id="{501C4B06-77B5-3C45-937F-51756382290E}"/>
+              </a:ext>
+              <a:ext uri="{C183D7F6-B498-43B3-948B-1728B52AA6E4}">
+                <adec:decorative xmlns:adec="http://schemas.microsoft.com/office/drawing/2017/decorative" val="1"/>
+              </a:ext>
+            </a:extLst>
+          </p:cNvPr>
+          <p:cNvSpPr>
+            <a:spLocks noGrp="1" noRot="1" noChangeAspect="1" noMove="1" noResize="1" noEditPoints="1" noAdjustHandles="1" noChangeArrowheads="1" noChangeShapeType="1" noTextEdit="1"/>
+          </p:cNvSpPr>
+          <p:nvPr>
+            <p:extLst>
+              <p:ext uri="{386F3935-93C4-4BCD-93E2-E3B085C9AB24}">
+                <p16:designElem xmlns:p16="http://schemas.microsoft.com/office/powerpoint/2015/main" val="1"/>
+              </p:ext>
+            </p:extLst>
+          </p:nvPr>
+        </p:nvSpPr>
+        <p:spPr>
+          <a:xfrm>
+            <a:off x="0" y="0"/>
+            <a:ext cx="12192000" cy="6858000"/>
+          </a:xfrm>
+          <a:prstGeom prst="rect">
+            <a:avLst/>
+          </a:prstGeom>
+          <a:ln>
+            <a:noFill/>
+          </a:ln>
+        </p:spPr>
+        <p:style>
+          <a:lnRef idx="2">
+            <a:schemeClr val="accent1">
+              <a:shade val="50000"/>
+            </a:schemeClr>
+          </a:lnRef>
+          <a:fillRef idx="1">
+            <a:schemeClr val="accent1"/>
+          </a:fillRef>
+          <a:effectRef idx="0">
+            <a:schemeClr val="accent1"/>
+          </a:effectRef>
+          <a:fontRef idx="minor">
+            <a:schemeClr val="lt1"/>
+          </a:fontRef>
+        </p:style>
+        <p:txBody>
+          <a:bodyPr rtlCol="0" anchor="ctr"/>
+          <a:lstStyle/>
+          <a:p>
+            <a:pPr algn="ctr"/>
+            <a:endParaRPr lang="en-US"/>
+          </a:p>
+        </p:txBody>
+      </p:sp>
+      <p:sp>
+        <p:nvSpPr>
+          <p:cNvPr id="2" name="Title 1">
+            <a:extLst>
+              <a:ext uri="{FF2B5EF4-FFF2-40B4-BE49-F238E27FC236}">
+                <a16:creationId xmlns:a16="http://schemas.microsoft.com/office/drawing/2014/main" id="{AEF1B0F5-6187-465B-A591-EE339F01FEAA}"/>
+              </a:ext>
+            </a:extLst>
+          </p:cNvPr>
+          <p:cNvSpPr>
+            <a:spLocks noGrp="1"/>
+          </p:cNvSpPr>
+          <p:nvPr>
+            <p:ph type="title"/>
+          </p:nvPr>
+        </p:nvSpPr>
+        <p:spPr>
+          <a:xfrm>
+            <a:off x="581193" y="702156"/>
+            <a:ext cx="6822142" cy="1013800"/>
+          </a:xfrm>
+        </p:spPr>
+        <p:txBody>
+          <a:bodyPr anchor="t" anchorCtr="0">
+            <a:normAutofit/>
+          </a:bodyPr>
+          <a:lstStyle/>
+          <a:p>
+            <a:r>
+              <a:rPr lang="en-US" dirty="0">
+                <a:solidFill>
+                  <a:schemeClr val="tx2"/>
+                </a:solidFill>
+              </a:rPr>
+              <a:t>Curating – Python Model Example</a:t>
+            </a:r>
+          </a:p>
+        </p:txBody>
+      </p:sp>
+      <p:sp>
+        <p:nvSpPr>
+          <p:cNvPr id="34" name="Rectangle 33">
+            <a:extLst>
+              <a:ext uri="{FF2B5EF4-FFF2-40B4-BE49-F238E27FC236}">
+                <a16:creationId xmlns:a16="http://schemas.microsoft.com/office/drawing/2014/main" id="{6635DB8D-5AF4-9C23-EB01-E8BEB96F35B4}"/>
+              </a:ext>
+              <a:ext uri="{C183D7F6-B498-43B3-948B-1728B52AA6E4}">
+                <adec:decorative xmlns:adec="http://schemas.microsoft.com/office/drawing/2017/decorative" val="1"/>
+              </a:ext>
+            </a:extLst>
+          </p:cNvPr>
+          <p:cNvSpPr>
+            <a:spLocks noGrp="1" noRot="1" noChangeAspect="1" noMove="1" noResize="1" noEditPoints="1" noAdjustHandles="1" noChangeArrowheads="1" noChangeShapeType="1" noTextEdit="1"/>
+          </p:cNvSpPr>
+          <p:nvPr>
+            <p:extLst>
+              <p:ext uri="{386F3935-93C4-4BCD-93E2-E3B085C9AB24}">
+                <p16:designElem xmlns:p16="http://schemas.microsoft.com/office/powerpoint/2015/main" val="1"/>
+              </p:ext>
+            </p:extLst>
+          </p:nvPr>
+        </p:nvSpPr>
+        <p:spPr>
+          <a:xfrm>
+            <a:off x="446534" y="457200"/>
+            <a:ext cx="6675120" cy="94997"/>
+          </a:xfrm>
+          <a:prstGeom prst="rect">
+            <a:avLst/>
+          </a:prstGeom>
+          <a:solidFill>
+            <a:schemeClr val="accent1"/>
+          </a:solidFill>
+          <a:ln>
+            <a:noFill/>
+          </a:ln>
+          <a:effectLst/>
+        </p:spPr>
+        <p:style>
+          <a:lnRef idx="1">
+            <a:schemeClr val="accent1"/>
+          </a:lnRef>
+          <a:fillRef idx="3">
+            <a:schemeClr val="accent1"/>
+          </a:fillRef>
+          <a:effectRef idx="2">
+            <a:schemeClr val="accent1"/>
+          </a:effectRef>
+          <a:fontRef idx="minor">
+            <a:schemeClr val="lt1"/>
+          </a:fontRef>
+        </p:style>
+        <p:txBody>
+          <a:bodyPr/>
+          <a:lstStyle/>
+          <a:p>
+            <a:endParaRPr lang="en-US"/>
+          </a:p>
+        </p:txBody>
+      </p:sp>
+      <p:sp>
+        <p:nvSpPr>
+          <p:cNvPr id="3" name="Content Placeholder 2">
+            <a:extLst>
+              <a:ext uri="{FF2B5EF4-FFF2-40B4-BE49-F238E27FC236}">
+                <a16:creationId xmlns:a16="http://schemas.microsoft.com/office/drawing/2014/main" id="{DE2E05FF-CCC2-9064-E44B-D535BBA4E558}"/>
+              </a:ext>
+            </a:extLst>
+          </p:cNvPr>
+          <p:cNvSpPr>
+            <a:spLocks noGrp="1"/>
+          </p:cNvSpPr>
+          <p:nvPr>
+            <p:ph idx="1"/>
+          </p:nvPr>
+        </p:nvSpPr>
+        <p:spPr>
+          <a:xfrm>
+            <a:off x="581193" y="1371779"/>
+            <a:ext cx="7123863" cy="3091477"/>
+          </a:xfrm>
+        </p:spPr>
+        <p:txBody>
+          <a:bodyPr anchor="t" anchorCtr="0">
+            <a:normAutofit/>
+          </a:bodyPr>
+          <a:lstStyle/>
+          <a:p>
+            <a:pPr marL="0" indent="0">
+              <a:buNone/>
+            </a:pPr>
+            <a:r>
+              <a:rPr lang="en-US" dirty="0">
+                <a:solidFill>
+                  <a:schemeClr val="tx2"/>
+                </a:solidFill>
+              </a:rPr>
+              <a:t>Curating ≠ long, multi-step code with obscure names</a:t>
+            </a:r>
+          </a:p>
+          <a:p>
+            <a:pPr lvl="1"/>
+            <a:r>
+              <a:rPr lang="en-US" dirty="0">
+                <a:solidFill>
+                  <a:schemeClr val="tx2"/>
+                </a:solidFill>
+              </a:rPr>
+              <a:t>Code should be </a:t>
+            </a:r>
+            <a:r>
+              <a:rPr lang="en-US" u="sng" dirty="0">
+                <a:solidFill>
+                  <a:schemeClr val="tx2"/>
+                </a:solidFill>
+              </a:rPr>
+              <a:t>easily</a:t>
+            </a:r>
+            <a:r>
+              <a:rPr lang="en-US" dirty="0">
+                <a:solidFill>
+                  <a:schemeClr val="tx2"/>
+                </a:solidFill>
+              </a:rPr>
+              <a:t> inspectable by non-coding leader/manager</a:t>
+            </a:r>
+          </a:p>
+          <a:p>
+            <a:pPr lvl="1"/>
+            <a:r>
+              <a:rPr lang="en-US" dirty="0">
+                <a:solidFill>
+                  <a:schemeClr val="tx2"/>
+                </a:solidFill>
+              </a:rPr>
+              <a:t>Macroscopic, predictable architecture helps curate</a:t>
+            </a:r>
+          </a:p>
+          <a:p>
+            <a:pPr lvl="1"/>
+            <a:r>
+              <a:rPr lang="en-US" dirty="0">
+                <a:solidFill>
+                  <a:schemeClr val="tx2"/>
+                </a:solidFill>
+              </a:rPr>
+              <a:t>Single-action functions (</a:t>
+            </a:r>
+            <a:r>
+              <a:rPr lang="en-US" sz="1000" dirty="0">
+                <a:solidFill>
+                  <a:schemeClr val="tx2"/>
+                </a:solidFill>
+              </a:rPr>
+              <a:t>Clean Code: A Handbook of Agile Software Craftsmanship”, R. Martin, 2008)</a:t>
+            </a:r>
+          </a:p>
+          <a:p>
+            <a:pPr lvl="2"/>
+            <a:r>
+              <a:rPr lang="en-US" dirty="0">
+                <a:solidFill>
+                  <a:schemeClr val="tx2"/>
+                </a:solidFill>
+              </a:rPr>
+              <a:t>Easy to test</a:t>
+            </a:r>
+          </a:p>
+          <a:p>
+            <a:pPr lvl="2"/>
+            <a:r>
+              <a:rPr lang="en-US" dirty="0">
+                <a:solidFill>
+                  <a:schemeClr val="tx2"/>
+                </a:solidFill>
+              </a:rPr>
+              <a:t>Easy for AI tool to write the code and write rerunnable test(s)</a:t>
+            </a:r>
+          </a:p>
+          <a:p>
+            <a:pPr lvl="1"/>
+            <a:r>
+              <a:rPr lang="en-US" dirty="0">
+                <a:solidFill>
+                  <a:schemeClr val="tx2"/>
+                </a:solidFill>
+              </a:rPr>
+              <a:t>Object-oriented “Class-based”</a:t>
+            </a:r>
+          </a:p>
+          <a:p>
+            <a:pPr lvl="2"/>
+            <a:r>
+              <a:rPr lang="en-US" dirty="0">
+                <a:solidFill>
+                  <a:schemeClr val="tx2"/>
+                </a:solidFill>
+              </a:rPr>
+              <a:t>Easy to bring in trusted, helper libraries for working with data etc.</a:t>
+            </a:r>
+          </a:p>
+          <a:p>
+            <a:pPr lvl="2"/>
+            <a:r>
+              <a:rPr lang="en-US" dirty="0">
+                <a:solidFill>
+                  <a:schemeClr val="tx2"/>
+                </a:solidFill>
+              </a:rPr>
+              <a:t>Model’s instanced code objects are easy to inspect and debug</a:t>
+            </a:r>
+          </a:p>
+          <a:p>
+            <a:endParaRPr lang="en-US" dirty="0">
+              <a:solidFill>
+                <a:schemeClr val="tx2"/>
+              </a:solidFill>
+            </a:endParaRPr>
+          </a:p>
+        </p:txBody>
+      </p:sp>
+      <p:sp>
+        <p:nvSpPr>
+          <p:cNvPr id="4" name="TextBox 3">
+            <a:extLst>
+              <a:ext uri="{FF2B5EF4-FFF2-40B4-BE49-F238E27FC236}">
+                <a16:creationId xmlns:a16="http://schemas.microsoft.com/office/drawing/2014/main" id="{24AC7A60-C216-CFD9-B5EE-8428B83A4E45}"/>
+              </a:ext>
+            </a:extLst>
+          </p:cNvPr>
+          <p:cNvSpPr txBox="1"/>
+          <p:nvPr/>
+        </p:nvSpPr>
+        <p:spPr>
+          <a:xfrm>
+            <a:off x="179596" y="5291296"/>
+            <a:ext cx="1120888" cy="954107"/>
+          </a:xfrm>
+          <a:prstGeom prst="rect">
+            <a:avLst/>
+          </a:prstGeom>
+          <a:noFill/>
+        </p:spPr>
+        <p:txBody>
+          <a:bodyPr wrap="square" rtlCol="0">
+            <a:spAutoFit/>
+          </a:bodyPr>
+          <a:lstStyle/>
+          <a:p>
+            <a:pPr algn="r"/>
+            <a:r>
+              <a:rPr lang="en-US" sz="1400" dirty="0"/>
+              <a:t>A Good Architecture for Model Code</a:t>
+            </a:r>
+          </a:p>
+        </p:txBody>
+      </p:sp>
+      <p:sp>
+        <p:nvSpPr>
+          <p:cNvPr id="5" name="TextBox 4">
+            <a:extLst>
+              <a:ext uri="{FF2B5EF4-FFF2-40B4-BE49-F238E27FC236}">
+                <a16:creationId xmlns:a16="http://schemas.microsoft.com/office/drawing/2014/main" id="{AFFE1FE4-B64C-8F67-B2D6-1321392D883E}"/>
+              </a:ext>
+            </a:extLst>
+          </p:cNvPr>
+          <p:cNvSpPr txBox="1"/>
+          <p:nvPr/>
+        </p:nvSpPr>
+        <p:spPr>
+          <a:xfrm>
+            <a:off x="9055030" y="2165836"/>
+            <a:ext cx="1707583" cy="307777"/>
+          </a:xfrm>
+          <a:prstGeom prst="rect">
+            <a:avLst/>
+          </a:prstGeom>
+          <a:noFill/>
+        </p:spPr>
+        <p:txBody>
+          <a:bodyPr wrap="none" rtlCol="0">
+            <a:spAutoFit/>
+          </a:bodyPr>
+          <a:lstStyle/>
+          <a:p>
+            <a:r>
+              <a:rPr lang="en-US" sz="1400" dirty="0"/>
+              <a:t>Multistep Procedure</a:t>
+            </a:r>
+          </a:p>
+        </p:txBody>
+      </p:sp>
+      <p:pic>
+        <p:nvPicPr>
+          <p:cNvPr id="14" name="Picture 13" descr="A screenshot of a computer screen&#10;&#10;AI-generated content may be incorrect.">
+            <a:extLst>
+              <a:ext uri="{FF2B5EF4-FFF2-40B4-BE49-F238E27FC236}">
+                <a16:creationId xmlns:a16="http://schemas.microsoft.com/office/drawing/2014/main" id="{7E4F27A0-211B-6ECE-D987-DEE7990035F5}"/>
+              </a:ext>
+            </a:extLst>
+          </p:cNvPr>
+          <p:cNvPicPr>
+            <a:picLocks noChangeAspect="1"/>
+          </p:cNvPicPr>
+          <p:nvPr/>
+        </p:nvPicPr>
+        <p:blipFill>
+          <a:blip r:embed="rId2">
+            <a:extLst>
+              <a:ext uri="{28A0092B-C50C-407E-A947-70E740481C1C}">
+                <a14:useLocalDpi xmlns:a14="http://schemas.microsoft.com/office/drawing/2010/main" val="0"/>
+              </a:ext>
+            </a:extLst>
+          </a:blip>
+          <a:stretch>
+            <a:fillRect/>
+          </a:stretch>
+        </p:blipFill>
+        <p:spPr>
+          <a:xfrm>
+            <a:off x="8166410" y="4574778"/>
+            <a:ext cx="3251835" cy="2171700"/>
+          </a:xfrm>
+          <a:prstGeom prst="rect">
+            <a:avLst/>
+          </a:prstGeom>
+        </p:spPr>
+      </p:pic>
+      <p:pic>
+        <p:nvPicPr>
+          <p:cNvPr id="16" name="Picture 15" descr="A screenshot of a computer code&#10;&#10;AI-generated content may be incorrect.">
+            <a:extLst>
+              <a:ext uri="{FF2B5EF4-FFF2-40B4-BE49-F238E27FC236}">
+                <a16:creationId xmlns:a16="http://schemas.microsoft.com/office/drawing/2014/main" id="{1DEFD184-E3E4-581D-EC7D-55C256BFB13C}"/>
+              </a:ext>
+            </a:extLst>
+          </p:cNvPr>
+          <p:cNvPicPr>
+            <a:picLocks noChangeAspect="1"/>
+          </p:cNvPicPr>
+          <p:nvPr/>
+        </p:nvPicPr>
+        <p:blipFill>
+          <a:blip r:embed="rId3">
+            <a:extLst>
+              <a:ext uri="{28A0092B-C50C-407E-A947-70E740481C1C}">
+                <a14:useLocalDpi xmlns:a14="http://schemas.microsoft.com/office/drawing/2010/main" val="0"/>
+              </a:ext>
+            </a:extLst>
+          </a:blip>
+          <a:stretch>
+            <a:fillRect/>
+          </a:stretch>
+        </p:blipFill>
+        <p:spPr>
+          <a:xfrm>
+            <a:off x="8052191" y="2488318"/>
+            <a:ext cx="3743325" cy="1674495"/>
+          </a:xfrm>
+          <a:prstGeom prst="rect">
+            <a:avLst/>
+          </a:prstGeom>
+        </p:spPr>
+      </p:pic>
+      <p:sp>
+        <p:nvSpPr>
+          <p:cNvPr id="17" name="TextBox 16">
+            <a:extLst>
+              <a:ext uri="{FF2B5EF4-FFF2-40B4-BE49-F238E27FC236}">
+                <a16:creationId xmlns:a16="http://schemas.microsoft.com/office/drawing/2014/main" id="{584581BA-C323-7FE2-BF02-7D0949A91F2C}"/>
+              </a:ext>
+            </a:extLst>
+          </p:cNvPr>
+          <p:cNvSpPr txBox="1"/>
+          <p:nvPr/>
+        </p:nvSpPr>
+        <p:spPr>
+          <a:xfrm>
+            <a:off x="8864701" y="4205556"/>
+            <a:ext cx="1855251" cy="307777"/>
+          </a:xfrm>
+          <a:prstGeom prst="rect">
+            <a:avLst/>
+          </a:prstGeom>
+          <a:noFill/>
+        </p:spPr>
+        <p:txBody>
+          <a:bodyPr wrap="none" rtlCol="0">
+            <a:spAutoFit/>
+          </a:bodyPr>
+          <a:lstStyle/>
+          <a:p>
+            <a:r>
+              <a:rPr lang="en-US" sz="1400" dirty="0"/>
+              <a:t>Single-action Function</a:t>
+            </a:r>
+          </a:p>
+        </p:txBody>
+      </p:sp>
+      <p:sp>
+        <p:nvSpPr>
+          <p:cNvPr id="18" name="TextBox 17">
+            <a:extLst>
+              <a:ext uri="{FF2B5EF4-FFF2-40B4-BE49-F238E27FC236}">
+                <a16:creationId xmlns:a16="http://schemas.microsoft.com/office/drawing/2014/main" id="{C78E02BE-FDCC-EC5E-FBC7-32A711616B0D}"/>
+              </a:ext>
+            </a:extLst>
+          </p:cNvPr>
+          <p:cNvSpPr txBox="1"/>
+          <p:nvPr/>
+        </p:nvSpPr>
+        <p:spPr>
+          <a:xfrm>
+            <a:off x="10617963" y="558379"/>
+            <a:ext cx="1401995" cy="738664"/>
+          </a:xfrm>
+          <a:prstGeom prst="rect">
+            <a:avLst/>
+          </a:prstGeom>
+          <a:noFill/>
+        </p:spPr>
+        <p:txBody>
+          <a:bodyPr wrap="square" rtlCol="0">
+            <a:spAutoFit/>
+          </a:bodyPr>
+          <a:lstStyle/>
+          <a:p>
+            <a:r>
+              <a:rPr lang="en-US" sz="1400" dirty="0"/>
+              <a:t>Meandering, “spaghetti” code</a:t>
+            </a:r>
+          </a:p>
+        </p:txBody>
+      </p:sp>
+      <p:pic>
+        <p:nvPicPr>
+          <p:cNvPr id="9" name="Picture 8" descr="A screen shot of a computer screen&#10;&#10;AI-generated content may be incorrect.">
+            <a:extLst>
+              <a:ext uri="{FF2B5EF4-FFF2-40B4-BE49-F238E27FC236}">
+                <a16:creationId xmlns:a16="http://schemas.microsoft.com/office/drawing/2014/main" id="{95E61F5F-49AF-011F-8B1E-417B10932D8F}"/>
+              </a:ext>
+            </a:extLst>
+          </p:cNvPr>
+          <p:cNvPicPr>
+            <a:picLocks noChangeAspect="1"/>
+          </p:cNvPicPr>
+          <p:nvPr/>
+        </p:nvPicPr>
+        <p:blipFill>
+          <a:blip r:embed="rId4">
+            <a:extLst>
+              <a:ext uri="{28A0092B-C50C-407E-A947-70E740481C1C}">
+                <a14:useLocalDpi xmlns:a14="http://schemas.microsoft.com/office/drawing/2010/main" val="0"/>
+              </a:ext>
+            </a:extLst>
+          </a:blip>
+          <a:stretch>
+            <a:fillRect/>
+          </a:stretch>
+        </p:blipFill>
+        <p:spPr>
+          <a:xfrm>
+            <a:off x="8508475" y="117924"/>
+            <a:ext cx="2106424" cy="2047912"/>
+          </a:xfrm>
+          <a:prstGeom prst="rect">
+            <a:avLst/>
+          </a:prstGeom>
+        </p:spPr>
+      </p:pic>
+      <p:pic>
+        <p:nvPicPr>
+          <p:cNvPr id="7" name="Picture 6" descr="A diagram of a function&#10;&#10;AI-generated content may be incorrect.">
+            <a:extLst>
+              <a:ext uri="{FF2B5EF4-FFF2-40B4-BE49-F238E27FC236}">
+                <a16:creationId xmlns:a16="http://schemas.microsoft.com/office/drawing/2014/main" id="{A4FE3C29-21D6-BAEF-241D-33BB34EDFA09}"/>
+              </a:ext>
+            </a:extLst>
+          </p:cNvPr>
+          <p:cNvPicPr>
+            <a:picLocks noChangeAspect="1"/>
+          </p:cNvPicPr>
+          <p:nvPr/>
+        </p:nvPicPr>
+        <p:blipFill>
+          <a:blip r:embed="rId5">
+            <a:extLst>
+              <a:ext uri="{28A0092B-C50C-407E-A947-70E740481C1C}">
+                <a14:useLocalDpi xmlns:a14="http://schemas.microsoft.com/office/drawing/2010/main" val="0"/>
+              </a:ext>
+            </a:extLst>
+          </a:blip>
+          <a:stretch>
+            <a:fillRect/>
+          </a:stretch>
+        </p:blipFill>
+        <p:spPr>
+          <a:xfrm>
+            <a:off x="1442991" y="4400625"/>
+            <a:ext cx="6285675" cy="2254781"/>
+          </a:xfrm>
+          <a:prstGeom prst="rect">
+            <a:avLst/>
+          </a:prstGeom>
+        </p:spPr>
+      </p:pic>
+    </p:spTree>
+    <p:extLst>
+      <p:ext uri="{BB962C8B-B14F-4D97-AF65-F5344CB8AC3E}">
+        <p14:creationId xmlns:p14="http://schemas.microsoft.com/office/powerpoint/2010/main" val="3926686275"/>
+      </p:ext>
+    </p:extLst>
+  </p:cSld>
+  <p:clrMapOvr>
+    <a:masterClrMapping/>
+  </p:clrMapOvr>
+</p:sld>
+</file>
+
+<file path=ppt/slides/slide8.xml><?xml version="1.0" encoding="utf-8"?>
+<p:sld xmlns:a="http://schemas.openxmlformats.org/drawingml/2006/main" xmlns:r="http://schemas.openxmlformats.org/officeDocument/2006/relationships" xmlns:p="http://schemas.openxmlformats.org/presentationml/2006/main">
+  <p:cSld>
+    <p:bg>
+      <p:bgPr>
+        <a:solidFill>
+          <a:schemeClr val="bg1"/>
+        </a:solidFill>
+        <a:effectLst/>
+      </p:bgPr>
+    </p:bg>
+    <p:spTree>
+      <p:nvGrpSpPr>
+        <p:cNvPr id="1" name="">
+          <a:extLst>
+            <a:ext uri="{FF2B5EF4-FFF2-40B4-BE49-F238E27FC236}">
+              <a16:creationId xmlns:a16="http://schemas.microsoft.com/office/drawing/2014/main" id="{FE1A41AA-4FBE-86D2-8F24-B4AF33A729B6}"/>
+            </a:ext>
+          </a:extLst>
+        </p:cNvPr>
+        <p:cNvGrpSpPr/>
+        <p:nvPr/>
+      </p:nvGrpSpPr>
+      <p:grpSpPr>
+        <a:xfrm>
+          <a:off x="0" y="0"/>
+          <a:ext cx="0" cy="0"/>
+          <a:chOff x="0" y="0"/>
+          <a:chExt cx="0" cy="0"/>
+        </a:xfrm>
+      </p:grpSpPr>
+      <p:sp useBgFill="1">
+        <p:nvSpPr>
+          <p:cNvPr id="32" name="Rectangle 31">
+            <a:extLst>
+              <a:ext uri="{FF2B5EF4-FFF2-40B4-BE49-F238E27FC236}">
+                <a16:creationId xmlns:a16="http://schemas.microsoft.com/office/drawing/2014/main" id="{0FFD52CA-35E5-DF47-5401-54675776A55E}"/>
+              </a:ext>
+              <a:ext uri="{C183D7F6-B498-43B3-948B-1728B52AA6E4}">
+                <adec:decorative xmlns:adec="http://schemas.microsoft.com/office/drawing/2017/decorative" val="1"/>
+              </a:ext>
+            </a:extLst>
+          </p:cNvPr>
+          <p:cNvSpPr>
+            <a:spLocks noGrp="1" noRot="1" noChangeAspect="1" noMove="1" noResize="1" noEditPoints="1" noAdjustHandles="1" noChangeArrowheads="1" noChangeShapeType="1" noTextEdit="1"/>
+          </p:cNvSpPr>
+          <p:nvPr>
+            <p:extLst>
+              <p:ext uri="{386F3935-93C4-4BCD-93E2-E3B085C9AB24}">
+                <p16:designElem xmlns:p16="http://schemas.microsoft.com/office/powerpoint/2015/main" val="1"/>
+              </p:ext>
+            </p:extLst>
+          </p:nvPr>
+        </p:nvSpPr>
+        <p:spPr>
+          <a:xfrm>
+            <a:off x="0" y="0"/>
+            <a:ext cx="12192000" cy="6858000"/>
+          </a:xfrm>
+          <a:prstGeom prst="rect">
+            <a:avLst/>
+          </a:prstGeom>
+          <a:ln>
+            <a:noFill/>
+          </a:ln>
+        </p:spPr>
+        <p:style>
+          <a:lnRef idx="2">
+            <a:schemeClr val="accent1">
+              <a:shade val="50000"/>
+            </a:schemeClr>
+          </a:lnRef>
+          <a:fillRef idx="1">
+            <a:schemeClr val="accent1"/>
+          </a:fillRef>
+          <a:effectRef idx="0">
+            <a:schemeClr val="accent1"/>
+          </a:effectRef>
+          <a:fontRef idx="minor">
+            <a:schemeClr val="lt1"/>
+          </a:fontRef>
+        </p:style>
+        <p:txBody>
+          <a:bodyPr rtlCol="0" anchor="ctr"/>
+          <a:lstStyle/>
+          <a:p>
+            <a:pPr algn="ctr"/>
+            <a:endParaRPr lang="en-US"/>
+          </a:p>
+        </p:txBody>
+      </p:sp>
+      <p:sp>
+        <p:nvSpPr>
+          <p:cNvPr id="2" name="Title 1">
+            <a:extLst>
+              <a:ext uri="{FF2B5EF4-FFF2-40B4-BE49-F238E27FC236}">
+                <a16:creationId xmlns:a16="http://schemas.microsoft.com/office/drawing/2014/main" id="{EDDB61D1-8E4F-4227-4AC3-254BBA3C56E7}"/>
+              </a:ext>
+            </a:extLst>
+          </p:cNvPr>
+          <p:cNvSpPr>
+            <a:spLocks noGrp="1"/>
+          </p:cNvSpPr>
+          <p:nvPr>
+            <p:ph type="title"/>
+          </p:nvPr>
+        </p:nvSpPr>
+        <p:spPr>
+          <a:xfrm>
+            <a:off x="581193" y="702156"/>
+            <a:ext cx="6822142" cy="1013800"/>
+          </a:xfrm>
+        </p:spPr>
+        <p:txBody>
+          <a:bodyPr anchor="t" anchorCtr="0">
+            <a:normAutofit/>
+          </a:bodyPr>
+          <a:lstStyle/>
+          <a:p>
+            <a:r>
+              <a:rPr lang="en-US" dirty="0">
+                <a:solidFill>
+                  <a:schemeClr val="tx2"/>
+                </a:solidFill>
+              </a:rPr>
+              <a:t>Testing/Validation</a:t>
+            </a:r>
+          </a:p>
+        </p:txBody>
+      </p:sp>
+      <p:sp>
+        <p:nvSpPr>
+          <p:cNvPr id="34" name="Rectangle 33">
+            <a:extLst>
+              <a:ext uri="{FF2B5EF4-FFF2-40B4-BE49-F238E27FC236}">
+                <a16:creationId xmlns:a16="http://schemas.microsoft.com/office/drawing/2014/main" id="{8D9481C9-2A32-E436-2CB1-19C0F20EF717}"/>
+              </a:ext>
+              <a:ext uri="{C183D7F6-B498-43B3-948B-1728B52AA6E4}">
+                <adec:decorative xmlns:adec="http://schemas.microsoft.com/office/drawing/2017/decorative" val="1"/>
+              </a:ext>
+            </a:extLst>
+          </p:cNvPr>
+          <p:cNvSpPr>
+            <a:spLocks noGrp="1" noRot="1" noChangeAspect="1" noMove="1" noResize="1" noEditPoints="1" noAdjustHandles="1" noChangeArrowheads="1" noChangeShapeType="1" noTextEdit="1"/>
+          </p:cNvSpPr>
+          <p:nvPr>
+            <p:extLst>
+              <p:ext uri="{386F3935-93C4-4BCD-93E2-E3B085C9AB24}">
+                <p16:designElem xmlns:p16="http://schemas.microsoft.com/office/powerpoint/2015/main" val="1"/>
+              </p:ext>
+            </p:extLst>
+          </p:nvPr>
+        </p:nvSpPr>
+        <p:spPr>
+          <a:xfrm>
+            <a:off x="446534" y="457200"/>
+            <a:ext cx="6675120" cy="94997"/>
+          </a:xfrm>
+          <a:prstGeom prst="rect">
+            <a:avLst/>
+          </a:prstGeom>
+          <a:solidFill>
+            <a:schemeClr val="accent1"/>
+          </a:solidFill>
+          <a:ln>
+            <a:noFill/>
+          </a:ln>
+          <a:effectLst/>
+        </p:spPr>
+        <p:style>
+          <a:lnRef idx="1">
+            <a:schemeClr val="accent1"/>
+          </a:lnRef>
+          <a:fillRef idx="3">
+            <a:schemeClr val="accent1"/>
+          </a:fillRef>
+          <a:effectRef idx="2">
+            <a:schemeClr val="accent1"/>
+          </a:effectRef>
+          <a:fontRef idx="minor">
+            <a:schemeClr val="lt1"/>
+          </a:fontRef>
+        </p:style>
+        <p:txBody>
+          <a:bodyPr/>
+          <a:lstStyle/>
+          <a:p>
+            <a:endParaRPr lang="en-US"/>
+          </a:p>
+        </p:txBody>
+      </p:sp>
+      <p:sp>
+        <p:nvSpPr>
+          <p:cNvPr id="3" name="Content Placeholder 2">
+            <a:extLst>
+              <a:ext uri="{FF2B5EF4-FFF2-40B4-BE49-F238E27FC236}">
+                <a16:creationId xmlns:a16="http://schemas.microsoft.com/office/drawing/2014/main" id="{DF15DA52-72EF-B1D5-A958-6DC1D1D0E5B3}"/>
+              </a:ext>
+            </a:extLst>
+          </p:cNvPr>
+          <p:cNvSpPr>
+            <a:spLocks noGrp="1"/>
+          </p:cNvSpPr>
+          <p:nvPr>
+            <p:ph idx="1"/>
+          </p:nvPr>
+        </p:nvSpPr>
+        <p:spPr>
+          <a:xfrm>
+            <a:off x="222163" y="1319879"/>
+            <a:ext cx="5980334" cy="4309739"/>
+          </a:xfrm>
+        </p:spPr>
+        <p:txBody>
+          <a:bodyPr anchor="t" anchorCtr="0">
+            <a:normAutofit/>
+          </a:bodyPr>
+          <a:lstStyle/>
+          <a:p>
+            <a:pPr marL="324000" lvl="1" indent="0">
+              <a:buNone/>
+            </a:pPr>
+            <a:r>
+              <a:rPr lang="en-US" sz="1600" dirty="0">
+                <a:solidFill>
+                  <a:schemeClr val="tx2"/>
+                </a:solidFill>
+              </a:rPr>
+              <a:t>Testing is completely under-utilized by engineers/scientists; yet easy to learn</a:t>
+            </a:r>
+          </a:p>
+          <a:p>
+            <a:pPr lvl="1"/>
+            <a:r>
+              <a:rPr lang="en-US" dirty="0">
+                <a:solidFill>
+                  <a:schemeClr val="tx2"/>
+                </a:solidFill>
+              </a:rPr>
+              <a:t>Standard Python Pytest library manages testing from separate file from model code</a:t>
+            </a:r>
+          </a:p>
+          <a:p>
+            <a:pPr lvl="1"/>
+            <a:r>
+              <a:rPr lang="en-US" dirty="0">
+                <a:solidFill>
+                  <a:schemeClr val="tx2"/>
+                </a:solidFill>
+              </a:rPr>
+              <a:t>Standard should be minimum one test per model function</a:t>
+            </a:r>
+          </a:p>
+          <a:p>
+            <a:pPr lvl="1"/>
+            <a:r>
+              <a:rPr lang="en-US" dirty="0">
+                <a:solidFill>
+                  <a:schemeClr val="tx2"/>
+                </a:solidFill>
+              </a:rPr>
+              <a:t>Tests = rerunnable proof that future changes don’t break the model</a:t>
+            </a:r>
+          </a:p>
+          <a:p>
+            <a:pPr lvl="1"/>
+            <a:r>
+              <a:rPr lang="en-US" dirty="0">
+                <a:solidFill>
+                  <a:schemeClr val="tx2"/>
+                </a:solidFill>
+              </a:rPr>
+              <a:t>Tests are documentation that explains how </a:t>
+            </a:r>
+            <a:r>
+              <a:rPr lang="en-US" u="sng" dirty="0">
+                <a:solidFill>
+                  <a:schemeClr val="tx2"/>
+                </a:solidFill>
+              </a:rPr>
+              <a:t>each function</a:t>
+            </a:r>
+            <a:r>
+              <a:rPr lang="en-US" dirty="0">
+                <a:solidFill>
+                  <a:schemeClr val="tx2"/>
+                </a:solidFill>
+              </a:rPr>
+              <a:t> works</a:t>
+            </a:r>
+          </a:p>
+        </p:txBody>
+      </p:sp>
+      <p:sp>
+        <p:nvSpPr>
+          <p:cNvPr id="5" name="TextBox 4">
+            <a:extLst>
+              <a:ext uri="{FF2B5EF4-FFF2-40B4-BE49-F238E27FC236}">
+                <a16:creationId xmlns:a16="http://schemas.microsoft.com/office/drawing/2014/main" id="{90C4A527-E782-1681-1708-8D27E198579A}"/>
+              </a:ext>
+            </a:extLst>
+          </p:cNvPr>
+          <p:cNvSpPr txBox="1"/>
+          <p:nvPr/>
+        </p:nvSpPr>
+        <p:spPr>
+          <a:xfrm>
+            <a:off x="8219061" y="552197"/>
+            <a:ext cx="2164375" cy="307777"/>
+          </a:xfrm>
+          <a:prstGeom prst="rect">
+            <a:avLst/>
+          </a:prstGeom>
+          <a:noFill/>
+        </p:spPr>
+        <p:txBody>
+          <a:bodyPr wrap="none" rtlCol="0">
+            <a:spAutoFit/>
+          </a:bodyPr>
+          <a:lstStyle/>
+          <a:p>
+            <a:r>
+              <a:rPr lang="en-US" sz="1400" dirty="0" err="1"/>
+              <a:t>test_FitRawData</a:t>
+            </a:r>
+            <a:r>
+              <a:rPr lang="en-US" sz="1400" dirty="0"/>
+              <a:t> Function </a:t>
+            </a:r>
+          </a:p>
+        </p:txBody>
+      </p:sp>
+      <p:pic>
+        <p:nvPicPr>
+          <p:cNvPr id="9" name="Picture 8" descr="A screenshot of a computer code&#10;&#10;AI-generated content may be incorrect.">
+            <a:extLst>
+              <a:ext uri="{FF2B5EF4-FFF2-40B4-BE49-F238E27FC236}">
+                <a16:creationId xmlns:a16="http://schemas.microsoft.com/office/drawing/2014/main" id="{2681D9DA-0294-B9FB-E19F-64052D22CAB4}"/>
+              </a:ext>
+            </a:extLst>
+          </p:cNvPr>
+          <p:cNvPicPr>
+            <a:picLocks noChangeAspect="1"/>
+          </p:cNvPicPr>
+          <p:nvPr/>
+        </p:nvPicPr>
+        <p:blipFill>
+          <a:blip r:embed="rId2">
+            <a:extLst>
+              <a:ext uri="{28A0092B-C50C-407E-A947-70E740481C1C}">
+                <a14:useLocalDpi xmlns:a14="http://schemas.microsoft.com/office/drawing/2010/main" val="0"/>
+              </a:ext>
+            </a:extLst>
+          </a:blip>
+          <a:stretch>
+            <a:fillRect/>
+          </a:stretch>
+        </p:blipFill>
+        <p:spPr>
+          <a:xfrm>
+            <a:off x="6561526" y="1009396"/>
+            <a:ext cx="5335229" cy="4309739"/>
+          </a:xfrm>
+          <a:prstGeom prst="rect">
+            <a:avLst/>
+          </a:prstGeom>
+        </p:spPr>
+      </p:pic>
+      <p:sp>
+        <p:nvSpPr>
+          <p:cNvPr id="11" name="TextBox 10">
+            <a:extLst>
+              <a:ext uri="{FF2B5EF4-FFF2-40B4-BE49-F238E27FC236}">
+                <a16:creationId xmlns:a16="http://schemas.microsoft.com/office/drawing/2014/main" id="{BEB58256-471C-5507-76AD-E443C37E70AF}"/>
+              </a:ext>
+            </a:extLst>
+          </p:cNvPr>
+          <p:cNvSpPr txBox="1"/>
+          <p:nvPr/>
+        </p:nvSpPr>
+        <p:spPr>
+          <a:xfrm>
+            <a:off x="2036823" y="4274062"/>
+            <a:ext cx="2212593" cy="307777"/>
+          </a:xfrm>
+          <a:prstGeom prst="rect">
+            <a:avLst/>
+          </a:prstGeom>
+          <a:noFill/>
+        </p:spPr>
+        <p:txBody>
+          <a:bodyPr wrap="none" rtlCol="0">
+            <a:spAutoFit/>
+          </a:bodyPr>
+          <a:lstStyle/>
+          <a:p>
+            <a:r>
+              <a:rPr lang="en-US" sz="1400" dirty="0"/>
+              <a:t>Screen pic of Pytest output</a:t>
+            </a:r>
+          </a:p>
+        </p:txBody>
+      </p:sp>
+    </p:spTree>
+    <p:extLst>
+      <p:ext uri="{BB962C8B-B14F-4D97-AF65-F5344CB8AC3E}">
+        <p14:creationId xmlns:p14="http://schemas.microsoft.com/office/powerpoint/2010/main" val="1843536061"/>
+      </p:ext>
+    </p:extLst>
+  </p:cSld>
+  <p:clrMapOvr>
+    <a:masterClrMapping/>
+  </p:clrMapOvr>
+</p:sld>
+</file>
+
+<file path=ppt/slides/slide9.xml><?xml version="1.0" encoding="utf-8"?>
+<p:sld xmlns:a="http://schemas.openxmlformats.org/drawingml/2006/main" xmlns:r="http://schemas.openxmlformats.org/officeDocument/2006/relationships" xmlns:p="http://schemas.openxmlformats.org/presentationml/2006/main">
+  <p:cSld>
+    <p:bg>
+      <p:bgPr>
+        <a:solidFill>
+          <a:schemeClr val="bg1"/>
+        </a:solidFill>
+        <a:effectLst/>
+      </p:bgPr>
+    </p:bg>
+    <p:spTree>
+      <p:nvGrpSpPr>
+        <p:cNvPr id="1" name="">
+          <a:extLst>
+            <a:ext uri="{FF2B5EF4-FFF2-40B4-BE49-F238E27FC236}">
+              <a16:creationId xmlns:a16="http://schemas.microsoft.com/office/drawing/2014/main" id="{222A2A7F-7913-F556-46E1-DAE3BCA58607}"/>
+            </a:ext>
+          </a:extLst>
+        </p:cNvPr>
+        <p:cNvGrpSpPr/>
+        <p:nvPr/>
+      </p:nvGrpSpPr>
+      <p:grpSpPr>
+        <a:xfrm>
+          <a:off x="0" y="0"/>
+          <a:ext cx="0" cy="0"/>
+          <a:chOff x="0" y="0"/>
+          <a:chExt cx="0" cy="0"/>
+        </a:xfrm>
+      </p:grpSpPr>
+      <p:sp useBgFill="1">
+        <p:nvSpPr>
+          <p:cNvPr id="32" name="Rectangle 31">
+            <a:extLst>
+              <a:ext uri="{FF2B5EF4-FFF2-40B4-BE49-F238E27FC236}">
+                <a16:creationId xmlns:a16="http://schemas.microsoft.com/office/drawing/2014/main" id="{38624205-A9EF-2B52-DED4-731B59A7EDE0}"/>
+              </a:ext>
+              <a:ext uri="{C183D7F6-B498-43B3-948B-1728B52AA6E4}">
+                <adec:decorative xmlns:adec="http://schemas.microsoft.com/office/drawing/2017/decorative" val="1"/>
+              </a:ext>
+            </a:extLst>
+          </p:cNvPr>
+          <p:cNvSpPr>
+            <a:spLocks noGrp="1" noRot="1" noChangeAspect="1" noMove="1" noResize="1" noEditPoints="1" noAdjustHandles="1" noChangeArrowheads="1" noChangeShapeType="1" noTextEdit="1"/>
+          </p:cNvSpPr>
+          <p:nvPr>
+            <p:extLst>
+              <p:ext uri="{386F3935-93C4-4BCD-93E2-E3B085C9AB24}">
+                <p16:designElem xmlns:p16="http://schemas.microsoft.com/office/powerpoint/2015/main" val="1"/>
+              </p:ext>
+            </p:extLst>
+          </p:nvPr>
+        </p:nvSpPr>
+        <p:spPr>
+          <a:xfrm>
+            <a:off x="0" y="0"/>
+            <a:ext cx="12192000" cy="6858000"/>
+          </a:xfrm>
+          <a:prstGeom prst="rect">
+            <a:avLst/>
+          </a:prstGeom>
+          <a:ln>
+            <a:noFill/>
+          </a:ln>
+        </p:spPr>
+        <p:style>
+          <a:lnRef idx="2">
+            <a:schemeClr val="accent1">
+              <a:shade val="50000"/>
+            </a:schemeClr>
+          </a:lnRef>
+          <a:fillRef idx="1">
+            <a:schemeClr val="accent1"/>
+          </a:fillRef>
+          <a:effectRef idx="0">
+            <a:schemeClr val="accent1"/>
+          </a:effectRef>
+          <a:fontRef idx="minor">
+            <a:schemeClr val="lt1"/>
+          </a:fontRef>
+        </p:style>
+        <p:txBody>
+          <a:bodyPr rtlCol="0" anchor="ctr"/>
+          <a:lstStyle/>
+          <a:p>
+            <a:pPr algn="ctr"/>
+            <a:endParaRPr lang="en-US"/>
+          </a:p>
+        </p:txBody>
+      </p:sp>
+      <p:sp>
+        <p:nvSpPr>
+          <p:cNvPr id="2" name="Title 1">
+            <a:extLst>
+              <a:ext uri="{FF2B5EF4-FFF2-40B4-BE49-F238E27FC236}">
+                <a16:creationId xmlns:a16="http://schemas.microsoft.com/office/drawing/2014/main" id="{F21C0C48-E511-C83D-4547-D862D97BC25A}"/>
+              </a:ext>
+            </a:extLst>
+          </p:cNvPr>
+          <p:cNvSpPr>
+            <a:spLocks noGrp="1"/>
+          </p:cNvSpPr>
+          <p:nvPr>
+            <p:ph type="title"/>
+          </p:nvPr>
+        </p:nvSpPr>
+        <p:spPr>
+          <a:xfrm>
+            <a:off x="581193" y="702156"/>
+            <a:ext cx="6822142" cy="1013800"/>
+          </a:xfrm>
+        </p:spPr>
+        <p:txBody>
+          <a:bodyPr anchor="t" anchorCtr="0">
+            <a:normAutofit/>
+          </a:bodyPr>
+          <a:lstStyle/>
+          <a:p>
+            <a:r>
+              <a:rPr lang="en-US" dirty="0">
+                <a:solidFill>
+                  <a:schemeClr val="tx2"/>
+                </a:solidFill>
+              </a:rPr>
+              <a:t>AI Tools For Coded Models</a:t>
+            </a:r>
+          </a:p>
+        </p:txBody>
+      </p:sp>
+      <p:sp>
+        <p:nvSpPr>
+          <p:cNvPr id="34" name="Rectangle 33">
+            <a:extLst>
+              <a:ext uri="{FF2B5EF4-FFF2-40B4-BE49-F238E27FC236}">
+                <a16:creationId xmlns:a16="http://schemas.microsoft.com/office/drawing/2014/main" id="{5ECE5442-1030-2596-2F16-B05E09BE1A86}"/>
+              </a:ext>
+              <a:ext uri="{C183D7F6-B498-43B3-948B-1728B52AA6E4}">
+                <adec:decorative xmlns:adec="http://schemas.microsoft.com/office/drawing/2017/decorative" val="1"/>
+              </a:ext>
+            </a:extLst>
+          </p:cNvPr>
+          <p:cNvSpPr>
+            <a:spLocks noGrp="1" noRot="1" noChangeAspect="1" noMove="1" noResize="1" noEditPoints="1" noAdjustHandles="1" noChangeArrowheads="1" noChangeShapeType="1" noTextEdit="1"/>
+          </p:cNvSpPr>
+          <p:nvPr>
+            <p:extLst>
+              <p:ext uri="{386F3935-93C4-4BCD-93E2-E3B085C9AB24}">
+                <p16:designElem xmlns:p16="http://schemas.microsoft.com/office/powerpoint/2015/main" val="1"/>
+              </p:ext>
+            </p:extLst>
+          </p:nvPr>
+        </p:nvSpPr>
+        <p:spPr>
+          <a:xfrm>
+            <a:off x="446534" y="457200"/>
+            <a:ext cx="6675120" cy="94997"/>
+          </a:xfrm>
+          <a:prstGeom prst="rect">
+            <a:avLst/>
+          </a:prstGeom>
+          <a:solidFill>
+            <a:schemeClr val="accent1"/>
+          </a:solidFill>
+          <a:ln>
+            <a:noFill/>
+          </a:ln>
+          <a:effectLst/>
+        </p:spPr>
+        <p:style>
+          <a:lnRef idx="1">
+            <a:schemeClr val="accent1"/>
+          </a:lnRef>
+          <a:fillRef idx="3">
+            <a:schemeClr val="accent1"/>
+          </a:fillRef>
+          <a:effectRef idx="2">
+            <a:schemeClr val="accent1"/>
+          </a:effectRef>
+          <a:fontRef idx="minor">
+            <a:schemeClr val="lt1"/>
+          </a:fontRef>
+        </p:style>
+        <p:txBody>
+          <a:bodyPr/>
+          <a:lstStyle/>
+          <a:p>
+            <a:endParaRPr lang="en-US"/>
+          </a:p>
+        </p:txBody>
+      </p:sp>
+      <p:sp>
+        <p:nvSpPr>
+          <p:cNvPr id="3" name="Content Placeholder 2">
+            <a:extLst>
+              <a:ext uri="{FF2B5EF4-FFF2-40B4-BE49-F238E27FC236}">
+                <a16:creationId xmlns:a16="http://schemas.microsoft.com/office/drawing/2014/main" id="{11A1CCFC-016E-EAD7-752C-6B494E3B1CF8}"/>
+              </a:ext>
+            </a:extLst>
+          </p:cNvPr>
+          <p:cNvSpPr>
+            <a:spLocks noGrp="1"/>
+          </p:cNvSpPr>
+          <p:nvPr>
+            <p:ph idx="1"/>
+          </p:nvPr>
+        </p:nvSpPr>
+        <p:spPr>
+          <a:xfrm>
+            <a:off x="222162" y="1319879"/>
+            <a:ext cx="6204037" cy="4309739"/>
+          </a:xfrm>
+        </p:spPr>
+        <p:txBody>
+          <a:bodyPr anchor="t" anchorCtr="0">
+            <a:normAutofit/>
+          </a:bodyPr>
+          <a:lstStyle/>
+          <a:p>
+            <a:pPr lvl="1"/>
+            <a:r>
+              <a:rPr lang="en-US" dirty="0">
+                <a:solidFill>
+                  <a:schemeClr val="tx2"/>
+                </a:solidFill>
+              </a:rPr>
+              <a:t>Organization should provide subscription and not-so-subtly encourage use (“Can you send me a link to an AI chat that explains your code?”)</a:t>
+            </a:r>
+          </a:p>
+          <a:p>
+            <a:pPr lvl="1"/>
+            <a:r>
+              <a:rPr lang="en-US" dirty="0">
+                <a:solidFill>
+                  <a:schemeClr val="tx2"/>
+                </a:solidFill>
+              </a:rPr>
+              <a:t>Github Copilot Chat + Microsoft VS Code is one, strong option</a:t>
+            </a:r>
+          </a:p>
+          <a:p>
+            <a:pPr lvl="1"/>
+            <a:r>
+              <a:rPr lang="en-US" dirty="0">
+                <a:solidFill>
+                  <a:schemeClr val="tx2"/>
+                </a:solidFill>
+              </a:rPr>
+              <a:t>[Typical] Use Case 1 = one-time queries like “How to write a custom, Python iterator for to iterate over a range of DataFrame cells?”</a:t>
+            </a:r>
+          </a:p>
+          <a:p>
+            <a:pPr lvl="1"/>
+            <a:r>
+              <a:rPr lang="en-US" dirty="0">
+                <a:solidFill>
+                  <a:schemeClr val="tx2"/>
+                </a:solidFill>
+              </a:rPr>
+              <a:t>[More valuable] Use Case 2 = “Write the FitRawData function and its Pytest test_FitRawData that creates mockup data…”</a:t>
+            </a:r>
+          </a:p>
+          <a:p>
+            <a:pPr lvl="2"/>
+            <a:r>
+              <a:rPr lang="en-US" b="1" dirty="0">
+                <a:solidFill>
+                  <a:schemeClr val="tx2"/>
+                </a:solidFill>
+              </a:rPr>
+              <a:t>Previous best practices of object-oriented and modular, single-action functions + tests are an ideal fit with using current AI chat tools</a:t>
+            </a:r>
+          </a:p>
+          <a:p>
+            <a:pPr lvl="2"/>
+            <a:r>
+              <a:rPr lang="en-US" dirty="0">
+                <a:solidFill>
+                  <a:schemeClr val="tx2"/>
+                </a:solidFill>
+              </a:rPr>
+              <a:t>Need to supply tool with background to explain “how life works.” This can be standard/pasteable text file (tutorial example)</a:t>
+            </a:r>
+          </a:p>
+          <a:p>
+            <a:pPr lvl="2"/>
+            <a:r>
+              <a:rPr lang="en-US" dirty="0">
+                <a:solidFill>
+                  <a:schemeClr val="tx2"/>
+                </a:solidFill>
+              </a:rPr>
+              <a:t>For many modelers, requires more pre-planning than historical practices</a:t>
+            </a:r>
+          </a:p>
+          <a:p>
+            <a:pPr lvl="2"/>
+            <a:r>
+              <a:rPr lang="en-US" dirty="0">
+                <a:solidFill>
+                  <a:schemeClr val="tx2"/>
+                </a:solidFill>
+              </a:rPr>
+              <a:t>Does not eliminate need for knowing coding –AI tools make mistakes and/or can stray from background intent</a:t>
+            </a:r>
+          </a:p>
+        </p:txBody>
+      </p:sp>
+    </p:spTree>
+    <p:extLst>
+      <p:ext uri="{BB962C8B-B14F-4D97-AF65-F5344CB8AC3E}">
+        <p14:creationId xmlns:p14="http://schemas.microsoft.com/office/powerpoint/2010/main" val="1812486255"/>
       </p:ext>
     </p:extLst>
   </p:cSld>

</xml_diff>

<commit_message>
delete unneeded files; updates to slides
</commit_message>
<xml_diff>
--- a/Best_Practices_Coded_Models.pptx
+++ b/Best_Practices_Coded_Models.pptx
@@ -2074,7 +2074,7 @@
           <a:p>
             <a:fld id="{ED291B17-9318-49DB-B28B-6E5994AE9581}" type="datetime1">
               <a:rPr lang="en-US" smtClean="0"/>
-              <a:t>2/18/25</a:t>
+              <a:t>2/19/25</a:t>
             </a:fld>
             <a:endParaRPr lang="en-US" dirty="0"/>
           </a:p>
@@ -2277,7 +2277,7 @@
           <a:p>
             <a:fld id="{2CED4963-E985-44C4-B8C4-FDD613B7C2F8}" type="datetime1">
               <a:rPr lang="en-US" smtClean="0"/>
-              <a:t>2/18/25</a:t>
+              <a:t>2/19/25</a:t>
             </a:fld>
             <a:endParaRPr lang="en-US" dirty="0"/>
           </a:p>
@@ -2639,7 +2639,7 @@
           <a:p>
             <a:fld id="{ED291B17-9318-49DB-B28B-6E5994AE9581}" type="datetime1">
               <a:rPr lang="en-US" smtClean="0"/>
-              <a:t>2/18/25</a:t>
+              <a:t>2/19/25</a:t>
             </a:fld>
             <a:endParaRPr lang="en-US" dirty="0"/>
           </a:p>
@@ -2837,7 +2837,7 @@
           <a:p>
             <a:fld id="{78DD82B9-B8EE-4375-B6FF-88FA6ABB15D9}" type="datetime1">
               <a:rPr lang="en-US" smtClean="0"/>
-              <a:t>2/18/25</a:t>
+              <a:t>2/19/25</a:t>
             </a:fld>
             <a:endParaRPr lang="en-US" dirty="0"/>
           </a:p>
@@ -3149,7 +3149,7 @@
           <a:p>
             <a:fld id="{B2497495-0637-405E-AE64-5CC7506D51F5}" type="datetime1">
               <a:rPr lang="en-US" smtClean="0"/>
-              <a:t>2/18/25</a:t>
+              <a:t>2/19/25</a:t>
             </a:fld>
             <a:endParaRPr lang="en-US" dirty="0"/>
           </a:p>
@@ -3402,7 +3402,7 @@
           <a:p>
             <a:fld id="{7BFFD690-9426-415D-8B65-26881E07B2D4}" type="datetime1">
               <a:rPr lang="en-US" smtClean="0"/>
-              <a:t>2/18/25</a:t>
+              <a:t>2/19/25</a:t>
             </a:fld>
             <a:endParaRPr lang="en-US" dirty="0"/>
           </a:p>
@@ -3832,7 +3832,7 @@
           <a:p>
             <a:fld id="{04C4989A-474C-40DE-95B9-011C28B71673}" type="datetime1">
               <a:rPr lang="en-US" smtClean="0"/>
-              <a:t>2/18/25</a:t>
+              <a:t>2/19/25</a:t>
             </a:fld>
             <a:endParaRPr lang="en-US" dirty="0"/>
           </a:p>
@@ -3955,7 +3955,7 @@
           <a:p>
             <a:fld id="{5DB4ED54-5B5E-4A04-93D3-5772E3CE3818}" type="datetime1">
               <a:rPr lang="en-US" smtClean="0"/>
-              <a:t>2/18/25</a:t>
+              <a:t>2/19/25</a:t>
             </a:fld>
             <a:endParaRPr lang="en-US" dirty="0"/>
           </a:p>
@@ -4050,7 +4050,7 @@
           <a:p>
             <a:fld id="{4EDE50D6-574B-40AF-946F-D52A04ADE379}" type="datetime1">
               <a:rPr lang="en-US" smtClean="0"/>
-              <a:t>2/18/25</a:t>
+              <a:t>2/19/25</a:t>
             </a:fld>
             <a:endParaRPr lang="en-US" dirty="0"/>
           </a:p>
@@ -4427,7 +4427,7 @@
           <a:p>
             <a:fld id="{D82884F1-FFEA-405F-9602-3DCA865EDA4E}" type="datetime1">
               <a:rPr lang="en-US" smtClean="0"/>
-              <a:t>2/18/25</a:t>
+              <a:t>2/19/25</a:t>
             </a:fld>
             <a:endParaRPr lang="en-US" dirty="0"/>
           </a:p>
@@ -4723,7 +4723,7 @@
           <a:p>
             <a:fld id="{7E18DB4A-8810-4A10-AD5C-D5E2C667F5B3}" type="datetime1">
               <a:rPr lang="en-US" smtClean="0"/>
-              <a:t>2/18/25</a:t>
+              <a:t>2/19/25</a:t>
             </a:fld>
             <a:endParaRPr lang="en-US" dirty="0"/>
           </a:p>
@@ -4938,7 +4938,7 @@
           <a:p>
             <a:fld id="{ED291B17-9318-49DB-B28B-6E5994AE9581}" type="datetime1">
               <a:rPr lang="en-US" smtClean="0"/>
-              <a:t>2/18/25</a:t>
+              <a:t>2/19/25</a:t>
             </a:fld>
             <a:endParaRPr lang="en-US" dirty="0"/>
           </a:p>
@@ -5792,24 +5792,24 @@
         <p:spPr>
           <a:xfrm>
             <a:off x="8109236" y="4739780"/>
-            <a:ext cx="3982359" cy="1661020"/>
+            <a:ext cx="3982359" cy="1985542"/>
           </a:xfrm>
         </p:spPr>
         <p:txBody>
           <a:bodyPr anchor="t">
-            <a:normAutofit fontScale="92500" lnSpcReduction="10000"/>
+            <a:normAutofit/>
           </a:bodyPr>
           <a:lstStyle/>
           <a:p>
             <a:r>
               <a:rPr lang="en-US" sz="2000" dirty="0"/>
-              <a:t>J.D. Landgrebe </a:t>
-            </a:r>
-          </a:p>
-          <a:p>
-            <a:r>
-              <a:rPr lang="en-US" sz="2000" dirty="0"/>
-              <a:t>Data-Delve LLC</a:t>
+              <a:t>J.D. Landgrebe, Data-Delve LLC</a:t>
+            </a:r>
+          </a:p>
+          <a:p>
+            <a:r>
+              <a:rPr lang="en-US" sz="2000" cap="none" dirty="0"/>
+              <a:t>jdlandgrebe@data-delve.com </a:t>
             </a:r>
           </a:p>
           <a:p>
@@ -5844,7 +5844,7 @@
         </p:blipFill>
         <p:spPr>
           <a:xfrm>
-            <a:off x="20" y="10"/>
+            <a:off x="20" y="8102"/>
             <a:ext cx="7537685" cy="6857990"/>
           </a:xfrm>
           <a:prstGeom prst="rect">
@@ -6182,7 +6182,7 @@
                   </a:schemeClr>
                 </a:solidFill>
               </a:rPr>
-              <a:t>February 26, 2025</a:t>
+              <a:t>Particle Technology Laboratory. Department of Mechanical &amp; Process Engineering, ETH Zürich, Switzerland</a:t>
             </a:r>
           </a:p>
           <a:p>
@@ -6195,8 +6195,18 @@
                   </a:schemeClr>
                 </a:solidFill>
               </a:rPr>
-              <a:t>Particle Technology Laboratory. Department of Mechanical &amp; Process Engineering, ETH Zürich, Switzerland</a:t>
-            </a:r>
+              <a:t>February 26, 2025</a:t>
+            </a:r>
+          </a:p>
+          <a:p>
+            <a:endParaRPr lang="en-US" sz="2000" cap="none" dirty="0">
+              <a:solidFill>
+                <a:schemeClr val="accent5">
+                  <a:lumMod val="20000"/>
+                  <a:lumOff val="80000"/>
+                </a:schemeClr>
+              </a:solidFill>
+            </a:endParaRPr>
           </a:p>
         </p:txBody>
       </p:sp>
@@ -6599,8 +6609,8 @@
         </p:nvSpPr>
         <p:spPr>
           <a:xfrm>
-            <a:off x="4561870" y="723898"/>
-            <a:ext cx="4828375" cy="5569325"/>
+            <a:off x="4227753" y="723898"/>
+            <a:ext cx="5033398" cy="5569325"/>
           </a:xfrm>
         </p:spPr>
         <p:txBody>
@@ -6635,7 +6645,7 @@
             </a:pPr>
             <a:r>
               <a:rPr lang="en-US" sz="1500" dirty="0"/>
-              <a:t>BS ChE (Purdue University 1984)</a:t>
+              <a:t>BS ChE (Purdue University USA 1984)</a:t>
             </a:r>
           </a:p>
           <a:p>
@@ -6646,7 +6656,7 @@
             </a:pPr>
             <a:r>
               <a:rPr lang="en-US" sz="1500" dirty="0"/>
-              <a:t>MS ChE (U. of Cincinnati/Pratsinis 1989) </a:t>
+              <a:t>MS ChE (U. of Cincinnati USA/Pratsinis 1989) </a:t>
             </a:r>
           </a:p>
           <a:p>
@@ -6658,7 +6668,7 @@
             </a:pPr>
             <a:r>
               <a:rPr lang="en-US" sz="1500" dirty="0"/>
-              <a:t>[xxx title xxx]</a:t>
+              <a:t>Thesis: Gas-phase Particulate Manufacture: The Interplay of Chemical Reaction and Aerosol Coagulation </a:t>
             </a:r>
           </a:p>
           <a:p>
@@ -6739,7 +6749,7 @@
         </p:blipFill>
         <p:spPr>
           <a:xfrm>
-            <a:off x="9095024" y="3441723"/>
+            <a:off x="9728578" y="3386639"/>
             <a:ext cx="2016889" cy="231018"/>
           </a:xfrm>
           <a:prstGeom prst="rect">
@@ -6775,7 +6785,7 @@
         </p:blipFill>
         <p:spPr>
           <a:xfrm>
-            <a:off x="8947253" y="3874120"/>
+            <a:off x="9269985" y="3874120"/>
             <a:ext cx="2650443" cy="2650443"/>
           </a:xfrm>
           <a:prstGeom prst="rect">
@@ -7292,7 +7302,7 @@
             </a:pPr>
             <a:r>
               <a:rPr lang="en-US" sz="1500" dirty="0"/>
-              <a:t>Research is a team sport. Be friends with your colleagues wherever they may be</a:t>
+              <a:t>Research is a team sport. Be collaborative and even friends with your colleagues wherever they may be</a:t>
             </a:r>
           </a:p>
           <a:p>
@@ -7626,7 +7636,7 @@
                   <a:schemeClr val="bg1"/>
                 </a:solidFill>
               </a:rPr>
-              <a:t> My newlywed wife’s name for Sotiris circa 1987</a:t>
+              <a:t> My then newlywed wife’s name for Sotiris circa 1987</a:t>
             </a:r>
           </a:p>
         </p:txBody>
@@ -7754,7 +7764,7 @@
         <p:spPr>
           <a:xfrm>
             <a:off x="4292741" y="5329684"/>
-            <a:ext cx="7717369" cy="1366528"/>
+            <a:ext cx="7717369" cy="1117229"/>
           </a:xfrm>
           <a:prstGeom prst="rect">
             <a:avLst/>
@@ -7775,23 +7785,7 @@
             </a:pPr>
             <a:r>
               <a:rPr lang="en-US" sz="1800" dirty="0"/>
-              <a:t>Blog: </a:t>
-            </a:r>
-            <a:r>
-              <a:rPr lang="en-US" sz="1800" u="sng" dirty="0"/>
-              <a:t>What I Learned from Dr. P.</a:t>
-            </a:r>
-          </a:p>
-          <a:p>
-            <a:pPr marL="9525" lvl="1" indent="0">
-              <a:lnSpc>
-                <a:spcPct val="90000"/>
-              </a:lnSpc>
-              <a:buNone/>
-            </a:pPr>
-            <a:r>
-              <a:rPr lang="en-US" sz="1800" dirty="0"/>
-              <a:t>With congratulations, gratitude and warmest best wishes to Sotiris and Eleni!!</a:t>
+              <a:t>With congratulations, gratitude, and warmest best wishes to Sotiris and Eleni!!</a:t>
             </a:r>
           </a:p>
           <a:p>
@@ -7834,6 +7828,424 @@
   <p:clrMapOvr>
     <a:masterClrMapping/>
   </p:clrMapOvr>
+  <p:timing>
+    <p:tnLst>
+      <p:par>
+        <p:cTn id="1" dur="indefinite" restart="never" nodeType="tmRoot">
+          <p:childTnLst>
+            <p:seq concurrent="1" nextAc="seek">
+              <p:cTn id="2" dur="indefinite" nodeType="mainSeq">
+                <p:childTnLst>
+                  <p:par>
+                    <p:cTn id="3" fill="hold">
+                      <p:stCondLst>
+                        <p:cond delay="indefinite"/>
+                      </p:stCondLst>
+                      <p:childTnLst>
+                        <p:par>
+                          <p:cTn id="4" fill="hold">
+                            <p:stCondLst>
+                              <p:cond delay="0"/>
+                            </p:stCondLst>
+                            <p:childTnLst>
+                              <p:par>
+                                <p:cTn id="5" presetID="1" presetClass="entr" presetSubtype="0" fill="hold" nodeType="clickEffect">
+                                  <p:stCondLst>
+                                    <p:cond delay="0"/>
+                                  </p:stCondLst>
+                                  <p:childTnLst>
+                                    <p:set>
+                                      <p:cBhvr>
+                                        <p:cTn id="6" dur="1" fill="hold">
+                                          <p:stCondLst>
+                                            <p:cond delay="0"/>
+                                          </p:stCondLst>
+                                        </p:cTn>
+                                        <p:tgtEl>
+                                          <p:spTgt spid="3">
+                                            <p:txEl>
+                                              <p:pRg st="0" end="0"/>
+                                            </p:txEl>
+                                          </p:spTgt>
+                                        </p:tgtEl>
+                                        <p:attrNameLst>
+                                          <p:attrName>style.visibility</p:attrName>
+                                        </p:attrNameLst>
+                                      </p:cBhvr>
+                                      <p:to>
+                                        <p:strVal val="visible"/>
+                                      </p:to>
+                                    </p:set>
+                                  </p:childTnLst>
+                                </p:cTn>
+                              </p:par>
+                            </p:childTnLst>
+                          </p:cTn>
+                        </p:par>
+                      </p:childTnLst>
+                    </p:cTn>
+                  </p:par>
+                  <p:par>
+                    <p:cTn id="7" fill="hold">
+                      <p:stCondLst>
+                        <p:cond delay="indefinite"/>
+                      </p:stCondLst>
+                      <p:childTnLst>
+                        <p:par>
+                          <p:cTn id="8" fill="hold">
+                            <p:stCondLst>
+                              <p:cond delay="0"/>
+                            </p:stCondLst>
+                            <p:childTnLst>
+                              <p:par>
+                                <p:cTn id="9" presetID="1" presetClass="entr" presetSubtype="0" fill="hold" nodeType="clickEffect">
+                                  <p:stCondLst>
+                                    <p:cond delay="0"/>
+                                  </p:stCondLst>
+                                  <p:childTnLst>
+                                    <p:set>
+                                      <p:cBhvr>
+                                        <p:cTn id="10" dur="1" fill="hold">
+                                          <p:stCondLst>
+                                            <p:cond delay="0"/>
+                                          </p:stCondLst>
+                                        </p:cTn>
+                                        <p:tgtEl>
+                                          <p:spTgt spid="6"/>
+                                        </p:tgtEl>
+                                        <p:attrNameLst>
+                                          <p:attrName>style.visibility</p:attrName>
+                                        </p:attrNameLst>
+                                      </p:cBhvr>
+                                      <p:to>
+                                        <p:strVal val="visible"/>
+                                      </p:to>
+                                    </p:set>
+                                  </p:childTnLst>
+                                </p:cTn>
+                              </p:par>
+                              <p:par>
+                                <p:cTn id="11" presetID="1" presetClass="entr" presetSubtype="0" fill="hold" nodeType="withEffect">
+                                  <p:stCondLst>
+                                    <p:cond delay="0"/>
+                                  </p:stCondLst>
+                                  <p:childTnLst>
+                                    <p:set>
+                                      <p:cBhvr>
+                                        <p:cTn id="12" dur="1" fill="hold">
+                                          <p:stCondLst>
+                                            <p:cond delay="0"/>
+                                          </p:stCondLst>
+                                        </p:cTn>
+                                        <p:tgtEl>
+                                          <p:spTgt spid="8"/>
+                                        </p:tgtEl>
+                                        <p:attrNameLst>
+                                          <p:attrName>style.visibility</p:attrName>
+                                        </p:attrNameLst>
+                                      </p:cBhvr>
+                                      <p:to>
+                                        <p:strVal val="visible"/>
+                                      </p:to>
+                                    </p:set>
+                                  </p:childTnLst>
+                                </p:cTn>
+                              </p:par>
+                            </p:childTnLst>
+                          </p:cTn>
+                        </p:par>
+                      </p:childTnLst>
+                    </p:cTn>
+                  </p:par>
+                  <p:par>
+                    <p:cTn id="13" fill="hold">
+                      <p:stCondLst>
+                        <p:cond delay="indefinite"/>
+                      </p:stCondLst>
+                      <p:childTnLst>
+                        <p:par>
+                          <p:cTn id="14" fill="hold">
+                            <p:stCondLst>
+                              <p:cond delay="0"/>
+                            </p:stCondLst>
+                            <p:childTnLst>
+                              <p:par>
+                                <p:cTn id="15" presetID="1" presetClass="entr" presetSubtype="0" fill="hold" nodeType="clickEffect">
+                                  <p:stCondLst>
+                                    <p:cond delay="0"/>
+                                  </p:stCondLst>
+                                  <p:childTnLst>
+                                    <p:set>
+                                      <p:cBhvr>
+                                        <p:cTn id="16" dur="1" fill="hold">
+                                          <p:stCondLst>
+                                            <p:cond delay="0"/>
+                                          </p:stCondLst>
+                                        </p:cTn>
+                                        <p:tgtEl>
+                                          <p:spTgt spid="3">
+                                            <p:txEl>
+                                              <p:pRg st="4" end="4"/>
+                                            </p:txEl>
+                                          </p:spTgt>
+                                        </p:tgtEl>
+                                        <p:attrNameLst>
+                                          <p:attrName>style.visibility</p:attrName>
+                                        </p:attrNameLst>
+                                      </p:cBhvr>
+                                      <p:to>
+                                        <p:strVal val="visible"/>
+                                      </p:to>
+                                    </p:set>
+                                  </p:childTnLst>
+                                </p:cTn>
+                              </p:par>
+                              <p:par>
+                                <p:cTn id="17" presetID="1" presetClass="entr" presetSubtype="0" fill="hold" nodeType="withEffect">
+                                  <p:stCondLst>
+                                    <p:cond delay="0"/>
+                                  </p:stCondLst>
+                                  <p:childTnLst>
+                                    <p:set>
+                                      <p:cBhvr>
+                                        <p:cTn id="18" dur="1" fill="hold">
+                                          <p:stCondLst>
+                                            <p:cond delay="0"/>
+                                          </p:stCondLst>
+                                        </p:cTn>
+                                        <p:tgtEl>
+                                          <p:spTgt spid="3">
+                                            <p:txEl>
+                                              <p:pRg st="5" end="5"/>
+                                            </p:txEl>
+                                          </p:spTgt>
+                                        </p:tgtEl>
+                                        <p:attrNameLst>
+                                          <p:attrName>style.visibility</p:attrName>
+                                        </p:attrNameLst>
+                                      </p:cBhvr>
+                                      <p:to>
+                                        <p:strVal val="visible"/>
+                                      </p:to>
+                                    </p:set>
+                                  </p:childTnLst>
+                                </p:cTn>
+                              </p:par>
+                            </p:childTnLst>
+                          </p:cTn>
+                        </p:par>
+                      </p:childTnLst>
+                    </p:cTn>
+                  </p:par>
+                  <p:par>
+                    <p:cTn id="19" fill="hold">
+                      <p:stCondLst>
+                        <p:cond delay="indefinite"/>
+                      </p:stCondLst>
+                      <p:childTnLst>
+                        <p:par>
+                          <p:cTn id="20" fill="hold">
+                            <p:stCondLst>
+                              <p:cond delay="0"/>
+                            </p:stCondLst>
+                            <p:childTnLst>
+                              <p:par>
+                                <p:cTn id="21" presetID="1" presetClass="entr" presetSubtype="0" fill="hold" nodeType="clickEffect">
+                                  <p:stCondLst>
+                                    <p:cond delay="0"/>
+                                  </p:stCondLst>
+                                  <p:childTnLst>
+                                    <p:set>
+                                      <p:cBhvr>
+                                        <p:cTn id="22" dur="1" fill="hold">
+                                          <p:stCondLst>
+                                            <p:cond delay="0"/>
+                                          </p:stCondLst>
+                                        </p:cTn>
+                                        <p:tgtEl>
+                                          <p:spTgt spid="11"/>
+                                        </p:tgtEl>
+                                        <p:attrNameLst>
+                                          <p:attrName>style.visibility</p:attrName>
+                                        </p:attrNameLst>
+                                      </p:cBhvr>
+                                      <p:to>
+                                        <p:strVal val="visible"/>
+                                      </p:to>
+                                    </p:set>
+                                  </p:childTnLst>
+                                </p:cTn>
+                              </p:par>
+                            </p:childTnLst>
+                          </p:cTn>
+                        </p:par>
+                      </p:childTnLst>
+                    </p:cTn>
+                  </p:par>
+                  <p:par>
+                    <p:cTn id="23" fill="hold">
+                      <p:stCondLst>
+                        <p:cond delay="indefinite"/>
+                      </p:stCondLst>
+                      <p:childTnLst>
+                        <p:par>
+                          <p:cTn id="24" fill="hold">
+                            <p:stCondLst>
+                              <p:cond delay="0"/>
+                            </p:stCondLst>
+                            <p:childTnLst>
+                              <p:par>
+                                <p:cTn id="25" presetID="1" presetClass="entr" presetSubtype="0" fill="hold" nodeType="clickEffect">
+                                  <p:stCondLst>
+                                    <p:cond delay="0"/>
+                                  </p:stCondLst>
+                                  <p:childTnLst>
+                                    <p:set>
+                                      <p:cBhvr>
+                                        <p:cTn id="26" dur="1" fill="hold">
+                                          <p:stCondLst>
+                                            <p:cond delay="0"/>
+                                          </p:stCondLst>
+                                        </p:cTn>
+                                        <p:tgtEl>
+                                          <p:spTgt spid="3">
+                                            <p:txEl>
+                                              <p:pRg st="7" end="7"/>
+                                            </p:txEl>
+                                          </p:spTgt>
+                                        </p:tgtEl>
+                                        <p:attrNameLst>
+                                          <p:attrName>style.visibility</p:attrName>
+                                        </p:attrNameLst>
+                                      </p:cBhvr>
+                                      <p:to>
+                                        <p:strVal val="visible"/>
+                                      </p:to>
+                                    </p:set>
+                                  </p:childTnLst>
+                                </p:cTn>
+                              </p:par>
+                              <p:par>
+                                <p:cTn id="27" presetID="1" presetClass="entr" presetSubtype="0" fill="hold" nodeType="withEffect">
+                                  <p:stCondLst>
+                                    <p:cond delay="0"/>
+                                  </p:stCondLst>
+                                  <p:childTnLst>
+                                    <p:set>
+                                      <p:cBhvr>
+                                        <p:cTn id="28" dur="1" fill="hold">
+                                          <p:stCondLst>
+                                            <p:cond delay="0"/>
+                                          </p:stCondLst>
+                                        </p:cTn>
+                                        <p:tgtEl>
+                                          <p:spTgt spid="3">
+                                            <p:txEl>
+                                              <p:pRg st="8" end="8"/>
+                                            </p:txEl>
+                                          </p:spTgt>
+                                        </p:tgtEl>
+                                        <p:attrNameLst>
+                                          <p:attrName>style.visibility</p:attrName>
+                                        </p:attrNameLst>
+                                      </p:cBhvr>
+                                      <p:to>
+                                        <p:strVal val="visible"/>
+                                      </p:to>
+                                    </p:set>
+                                  </p:childTnLst>
+                                </p:cTn>
+                              </p:par>
+                              <p:par>
+                                <p:cTn id="29" presetID="1" presetClass="entr" presetSubtype="0" fill="hold" nodeType="withEffect">
+                                  <p:stCondLst>
+                                    <p:cond delay="0"/>
+                                  </p:stCondLst>
+                                  <p:childTnLst>
+                                    <p:set>
+                                      <p:cBhvr>
+                                        <p:cTn id="30" dur="1" fill="hold">
+                                          <p:stCondLst>
+                                            <p:cond delay="0"/>
+                                          </p:stCondLst>
+                                        </p:cTn>
+                                        <p:tgtEl>
+                                          <p:spTgt spid="3">
+                                            <p:txEl>
+                                              <p:pRg st="9" end="9"/>
+                                            </p:txEl>
+                                          </p:spTgt>
+                                        </p:tgtEl>
+                                        <p:attrNameLst>
+                                          <p:attrName>style.visibility</p:attrName>
+                                        </p:attrNameLst>
+                                      </p:cBhvr>
+                                      <p:to>
+                                        <p:strVal val="visible"/>
+                                      </p:to>
+                                    </p:set>
+                                  </p:childTnLst>
+                                </p:cTn>
+                              </p:par>
+                              <p:par>
+                                <p:cTn id="31" presetID="1" presetClass="entr" presetSubtype="0" fill="hold" nodeType="withEffect">
+                                  <p:stCondLst>
+                                    <p:cond delay="0"/>
+                                  </p:stCondLst>
+                                  <p:childTnLst>
+                                    <p:set>
+                                      <p:cBhvr>
+                                        <p:cTn id="32" dur="1" fill="hold">
+                                          <p:stCondLst>
+                                            <p:cond delay="0"/>
+                                          </p:stCondLst>
+                                        </p:cTn>
+                                        <p:tgtEl>
+                                          <p:spTgt spid="3">
+                                            <p:txEl>
+                                              <p:pRg st="10" end="10"/>
+                                            </p:txEl>
+                                          </p:spTgt>
+                                        </p:tgtEl>
+                                        <p:attrNameLst>
+                                          <p:attrName>style.visibility</p:attrName>
+                                        </p:attrNameLst>
+                                      </p:cBhvr>
+                                      <p:to>
+                                        <p:strVal val="visible"/>
+                                      </p:to>
+                                    </p:set>
+                                  </p:childTnLst>
+                                </p:cTn>
+                              </p:par>
+                            </p:childTnLst>
+                          </p:cTn>
+                        </p:par>
+                      </p:childTnLst>
+                    </p:cTn>
+                  </p:par>
+                </p:childTnLst>
+              </p:cTn>
+              <p:prevCondLst>
+                <p:cond evt="onPrev" delay="0">
+                  <p:tgtEl>
+                    <p:sldTgt/>
+                  </p:tgtEl>
+                </p:cond>
+              </p:prevCondLst>
+              <p:nextCondLst>
+                <p:cond evt="onNext" delay="0">
+                  <p:tgtEl>
+                    <p:sldTgt/>
+                  </p:tgtEl>
+                </p:cond>
+              </p:nextCondLst>
+            </p:seq>
+          </p:childTnLst>
+        </p:cTn>
+      </p:par>
+    </p:tnLst>
+  </p:timing>
 </p:sld>
 </file>
 
@@ -7969,7 +8381,7 @@
             </a:pPr>
             <a:r>
               <a:rPr lang="en-US" sz="1500" dirty="0"/>
-              <a:t>Been unable or had difficulty running someone’s previous model?</a:t>
+              <a:t>Had doubts/uncertainty about the validity of someone else’s model?</a:t>
             </a:r>
           </a:p>
           <a:p>
@@ -7980,7 +8392,7 @@
             </a:pPr>
             <a:r>
               <a:rPr lang="en-US" sz="1500" dirty="0"/>
-              <a:t>Had difficulty extending or scaling a previous model (your own or someone else’s?</a:t>
+              <a:t>Had difficulty extending or scaling a previous model (your own or someone else’s?)</a:t>
             </a:r>
           </a:p>
           <a:p>
@@ -7991,7 +8403,7 @@
             </a:pPr>
             <a:r>
               <a:rPr lang="en-US" sz="1600" dirty="0"/>
-              <a:t>HUGE opportunity to set best practices individually, in research groups and corporate teams –it’s a leadership job!!!</a:t>
+              <a:t>HUGE opportunity exists to set best practices individually, in research groups and corporate teams –it’s a leadership job!!!</a:t>
             </a:r>
           </a:p>
           <a:p>
@@ -8051,14 +8463,19 @@
             <a:endParaRPr lang="en-US" sz="1600" dirty="0"/>
           </a:p>
           <a:p>
-            <a:pPr>
+            <a:pPr marL="0" indent="0">
               <a:lnSpc>
                 <a:spcPct val="90000"/>
               </a:lnSpc>
+              <a:buNone/>
             </a:pPr>
             <a:r>
+              <a:rPr lang="en-US" sz="1600" u="sng" dirty="0"/>
+              <a:t>Target audience:</a:t>
+            </a:r>
+            <a:r>
               <a:rPr lang="en-US" sz="1600" dirty="0"/>
-              <a:t>Target audience: </a:t>
+              <a:t> </a:t>
             </a:r>
           </a:p>
           <a:p>
@@ -8069,15 +8486,7 @@
             </a:pPr>
             <a:r>
               <a:rPr lang="en-US" sz="1400" dirty="0"/>
-              <a:t>Leaders of groups who want to lead setting culture </a:t>
-            </a:r>
-            <a:r>
-              <a:rPr lang="en-US" sz="1400" dirty="0" err="1"/>
-              <a:t>fpr</a:t>
-            </a:r>
-            <a:r>
-              <a:rPr lang="en-US" sz="1400" dirty="0"/>
-              <a:t> how things are done under their watch</a:t>
+              <a:t>Leaders of groups who want to lead setting culture for how things are done under their watch</a:t>
             </a:r>
           </a:p>
           <a:p>
@@ -8188,6 +8597,241 @@
   <p:clrMapOvr>
     <a:masterClrMapping/>
   </p:clrMapOvr>
+  <p:timing>
+    <p:tnLst>
+      <p:par>
+        <p:cTn id="1" dur="indefinite" restart="never" nodeType="tmRoot">
+          <p:childTnLst>
+            <p:seq concurrent="1" nextAc="seek">
+              <p:cTn id="2" dur="indefinite" nodeType="mainSeq">
+                <p:childTnLst>
+                  <p:par>
+                    <p:cTn id="3" fill="hold">
+                      <p:stCondLst>
+                        <p:cond delay="indefinite"/>
+                      </p:stCondLst>
+                      <p:childTnLst>
+                        <p:par>
+                          <p:cTn id="4" fill="hold">
+                            <p:stCondLst>
+                              <p:cond delay="0"/>
+                            </p:stCondLst>
+                            <p:childTnLst>
+                              <p:par>
+                                <p:cTn id="5" presetID="1" presetClass="entr" presetSubtype="0" fill="hold" nodeType="clickEffect">
+                                  <p:stCondLst>
+                                    <p:cond delay="0"/>
+                                  </p:stCondLst>
+                                  <p:childTnLst>
+                                    <p:set>
+                                      <p:cBhvr>
+                                        <p:cTn id="6" dur="1" fill="hold">
+                                          <p:stCondLst>
+                                            <p:cond delay="0"/>
+                                          </p:stCondLst>
+                                        </p:cTn>
+                                        <p:tgtEl>
+                                          <p:spTgt spid="3">
+                                            <p:txEl>
+                                              <p:pRg st="4" end="4"/>
+                                            </p:txEl>
+                                          </p:spTgt>
+                                        </p:tgtEl>
+                                        <p:attrNameLst>
+                                          <p:attrName>style.visibility</p:attrName>
+                                        </p:attrNameLst>
+                                      </p:cBhvr>
+                                      <p:to>
+                                        <p:strVal val="visible"/>
+                                      </p:to>
+                                    </p:set>
+                                  </p:childTnLst>
+                                </p:cTn>
+                              </p:par>
+                            </p:childTnLst>
+                          </p:cTn>
+                        </p:par>
+                      </p:childTnLst>
+                    </p:cTn>
+                  </p:par>
+                  <p:par>
+                    <p:cTn id="7" fill="hold">
+                      <p:stCondLst>
+                        <p:cond delay="indefinite"/>
+                      </p:stCondLst>
+                      <p:childTnLst>
+                        <p:par>
+                          <p:cTn id="8" fill="hold">
+                            <p:stCondLst>
+                              <p:cond delay="0"/>
+                            </p:stCondLst>
+                            <p:childTnLst>
+                              <p:par>
+                                <p:cTn id="9" presetID="1" presetClass="entr" presetSubtype="0" fill="hold" nodeType="clickEffect">
+                                  <p:stCondLst>
+                                    <p:cond delay="0"/>
+                                  </p:stCondLst>
+                                  <p:childTnLst>
+                                    <p:set>
+                                      <p:cBhvr>
+                                        <p:cTn id="10" dur="1" fill="hold">
+                                          <p:stCondLst>
+                                            <p:cond delay="0"/>
+                                          </p:stCondLst>
+                                        </p:cTn>
+                                        <p:tgtEl>
+                                          <p:spTgt spid="9"/>
+                                        </p:tgtEl>
+                                        <p:attrNameLst>
+                                          <p:attrName>style.visibility</p:attrName>
+                                        </p:attrNameLst>
+                                      </p:cBhvr>
+                                      <p:to>
+                                        <p:strVal val="visible"/>
+                                      </p:to>
+                                    </p:set>
+                                  </p:childTnLst>
+                                </p:cTn>
+                              </p:par>
+                            </p:childTnLst>
+                          </p:cTn>
+                        </p:par>
+                      </p:childTnLst>
+                    </p:cTn>
+                  </p:par>
+                  <p:par>
+                    <p:cTn id="11" fill="hold">
+                      <p:stCondLst>
+                        <p:cond delay="indefinite"/>
+                      </p:stCondLst>
+                      <p:childTnLst>
+                        <p:par>
+                          <p:cTn id="12" fill="hold">
+                            <p:stCondLst>
+                              <p:cond delay="0"/>
+                            </p:stCondLst>
+                            <p:childTnLst>
+                              <p:par>
+                                <p:cTn id="13" presetID="1" presetClass="entr" presetSubtype="0" fill="hold" nodeType="clickEffect">
+                                  <p:stCondLst>
+                                    <p:cond delay="0"/>
+                                  </p:stCondLst>
+                                  <p:childTnLst>
+                                    <p:set>
+                                      <p:cBhvr>
+                                        <p:cTn id="14" dur="1" fill="hold">
+                                          <p:stCondLst>
+                                            <p:cond delay="0"/>
+                                          </p:stCondLst>
+                                        </p:cTn>
+                                        <p:tgtEl>
+                                          <p:spTgt spid="3">
+                                            <p:txEl>
+                                              <p:pRg st="12" end="12"/>
+                                            </p:txEl>
+                                          </p:spTgt>
+                                        </p:tgtEl>
+                                        <p:attrNameLst>
+                                          <p:attrName>style.visibility</p:attrName>
+                                        </p:attrNameLst>
+                                      </p:cBhvr>
+                                      <p:to>
+                                        <p:strVal val="visible"/>
+                                      </p:to>
+                                    </p:set>
+                                  </p:childTnLst>
+                                </p:cTn>
+                              </p:par>
+                              <p:par>
+                                <p:cTn id="15" presetID="1" presetClass="entr" presetSubtype="0" fill="hold" nodeType="withEffect">
+                                  <p:stCondLst>
+                                    <p:cond delay="0"/>
+                                  </p:stCondLst>
+                                  <p:childTnLst>
+                                    <p:set>
+                                      <p:cBhvr>
+                                        <p:cTn id="16" dur="1" fill="hold">
+                                          <p:stCondLst>
+                                            <p:cond delay="0"/>
+                                          </p:stCondLst>
+                                        </p:cTn>
+                                        <p:tgtEl>
+                                          <p:spTgt spid="3">
+                                            <p:txEl>
+                                              <p:pRg st="13" end="13"/>
+                                            </p:txEl>
+                                          </p:spTgt>
+                                        </p:tgtEl>
+                                        <p:attrNameLst>
+                                          <p:attrName>style.visibility</p:attrName>
+                                        </p:attrNameLst>
+                                      </p:cBhvr>
+                                      <p:to>
+                                        <p:strVal val="visible"/>
+                                      </p:to>
+                                    </p:set>
+                                  </p:childTnLst>
+                                </p:cTn>
+                              </p:par>
+                              <p:par>
+                                <p:cTn id="17" presetID="1" presetClass="entr" presetSubtype="0" fill="hold" nodeType="withEffect">
+                                  <p:stCondLst>
+                                    <p:cond delay="0"/>
+                                  </p:stCondLst>
+                                  <p:childTnLst>
+                                    <p:set>
+                                      <p:cBhvr>
+                                        <p:cTn id="18" dur="1" fill="hold">
+                                          <p:stCondLst>
+                                            <p:cond delay="0"/>
+                                          </p:stCondLst>
+                                        </p:cTn>
+                                        <p:tgtEl>
+                                          <p:spTgt spid="3">
+                                            <p:txEl>
+                                              <p:pRg st="14" end="14"/>
+                                            </p:txEl>
+                                          </p:spTgt>
+                                        </p:tgtEl>
+                                        <p:attrNameLst>
+                                          <p:attrName>style.visibility</p:attrName>
+                                        </p:attrNameLst>
+                                      </p:cBhvr>
+                                      <p:to>
+                                        <p:strVal val="visible"/>
+                                      </p:to>
+                                    </p:set>
+                                  </p:childTnLst>
+                                </p:cTn>
+                              </p:par>
+                            </p:childTnLst>
+                          </p:cTn>
+                        </p:par>
+                      </p:childTnLst>
+                    </p:cTn>
+                  </p:par>
+                </p:childTnLst>
+              </p:cTn>
+              <p:prevCondLst>
+                <p:cond evt="onPrev" delay="0">
+                  <p:tgtEl>
+                    <p:sldTgt/>
+                  </p:tgtEl>
+                </p:cond>
+              </p:prevCondLst>
+              <p:nextCondLst>
+                <p:cond evt="onNext" delay="0">
+                  <p:tgtEl>
+                    <p:sldTgt/>
+                  </p:tgtEl>
+                </p:cond>
+              </p:nextCondLst>
+            </p:seq>
+          </p:childTnLst>
+        </p:cTn>
+      </p:par>
+    </p:tnLst>
+  </p:timing>
 </p:sld>
 </file>
 
@@ -8274,8 +8918,8 @@
         </p:nvSpPr>
         <p:spPr>
           <a:xfrm>
-            <a:off x="4261950" y="685472"/>
-            <a:ext cx="7779486" cy="6023800"/>
+            <a:off x="4261949" y="685472"/>
+            <a:ext cx="7851161" cy="6023800"/>
           </a:xfrm>
         </p:spPr>
         <p:txBody>
@@ -8365,9 +9009,25 @@
               <a:buNone/>
             </a:pPr>
             <a:r>
-              <a:rPr lang="en-US" sz="1600" dirty="0"/>
-              <a:t>(see xxx, 2009)</a:t>
-            </a:r>
+              <a:rPr lang="en-US" sz="1400" dirty="0"/>
+              <a:t>(see </a:t>
+            </a:r>
+            <a:r>
+              <a:rPr lang="en-US" sz="1200" dirty="0">
+                <a:effectLst/>
+                <a:latin typeface="Helvetica Neue" panose="02000503000000020004" pitchFamily="2" charset="0"/>
+                <a:hlinkClick r:id="rId2"/>
+              </a:rPr>
+              <a:t>The Fourth Paradigm: Data-Intensive Scientific Discovery</a:t>
+            </a:r>
+            <a:r>
+              <a:rPr lang="en-US" sz="1200" dirty="0">
+                <a:effectLst/>
+                <a:latin typeface="Helvetica Neue" panose="02000503000000020004" pitchFamily="2" charset="0"/>
+              </a:rPr>
+              <a:t>, Hey et al., Microsoft Research, 2009)</a:t>
+            </a:r>
+            <a:endParaRPr lang="en-US" sz="1600" dirty="0"/>
           </a:p>
           <a:p>
             <a:pPr marL="342900" indent="-342900">
@@ -8398,8 +9058,28 @@
               <a:buNone/>
             </a:pPr>
             <a:r>
-              <a:rPr lang="en-US" sz="1600" dirty="0"/>
-              <a:t>(see TDD for inspiration but keep it practical)</a:t>
+              <a:rPr lang="en-US" sz="1400" dirty="0"/>
+              <a:t>(see </a:t>
+            </a:r>
+            <a:r>
+              <a:rPr lang="en-US" sz="1400" dirty="0">
+                <a:hlinkClick r:id="rId3"/>
+              </a:rPr>
+              <a:t>Test-Driven Design</a:t>
+            </a:r>
+            <a:r>
+              <a:rPr lang="en-US" sz="1400" dirty="0"/>
+              <a:t> and </a:t>
+            </a:r>
+            <a:r>
+              <a:rPr lang="en-US" sz="1400" dirty="0">
+                <a:hlinkClick r:id="rId4"/>
+              </a:rPr>
+              <a:t>here</a:t>
+            </a:r>
+            <a:r>
+              <a:rPr lang="en-US" sz="1400" dirty="0"/>
+              <a:t> inspiration but that’s a deep and debated topic. Keep it practical!)</a:t>
             </a:r>
           </a:p>
           <a:p>
@@ -8420,7 +9100,7 @@
             </a:r>
             <a:r>
               <a:rPr lang="en-US" sz="1600" dirty="0"/>
-              <a:t>to write the code (≈90%. Let’s be honest!) </a:t>
+              <a:t>to write the code and tests (≈90%) </a:t>
             </a:r>
           </a:p>
           <a:p>
@@ -8441,8 +9121,15 @@
             </a:pPr>
             <a:r>
               <a:rPr lang="en-US" sz="1600" dirty="0"/>
-              <a:t>Full story and tutorials are at: xxx Github repo link xxx</a:t>
-            </a:r>
+              <a:t>See full story/tutorial at: </a:t>
+            </a:r>
+            <a:r>
+              <a:rPr lang="en-US" sz="1600" dirty="0">
+                <a:hlinkClick r:id="rId5"/>
+              </a:rPr>
+              <a:t>https://github.com/jlandgre/Engineering_Model_Best_Practices</a:t>
+            </a:r>
+            <a:endParaRPr lang="en-US" sz="1600" dirty="0"/>
           </a:p>
           <a:p>
             <a:pPr marL="0" indent="0">
@@ -8505,10 +9192,10 @@
         </p:nvGrpSpPr>
         <p:grpSpPr>
           <a:xfrm>
-            <a:off x="5620536" y="933450"/>
-            <a:ext cx="4797910" cy="1238034"/>
-            <a:chOff x="5185186" y="3270325"/>
-            <a:chExt cx="4797910" cy="1238034"/>
+            <a:off x="5620536" y="882362"/>
+            <a:ext cx="4731760" cy="1477328"/>
+            <a:chOff x="5185186" y="3219237"/>
+            <a:chExt cx="4731760" cy="1477328"/>
           </a:xfrm>
         </p:grpSpPr>
         <p:sp>
@@ -8609,8 +9296,8 @@
           </p:nvSpPr>
           <p:spPr>
             <a:xfrm>
-              <a:off x="8317454" y="3308030"/>
-              <a:ext cx="1665642" cy="1200329"/>
+              <a:off x="8251304" y="3219237"/>
+              <a:ext cx="1665642" cy="1477328"/>
             </a:xfrm>
             <a:prstGeom prst="rect">
               <a:avLst/>
@@ -8622,6 +9309,12 @@
               <a:spAutoFit/>
             </a:bodyPr>
             <a:lstStyle/>
+            <a:p>
+              <a:r>
+                <a:rPr lang="en-US" dirty="0"/>
+                <a:t>Culture:</a:t>
+              </a:r>
+            </a:p>
             <a:p>
               <a:r>
                 <a:rPr lang="en-US" dirty="0"/>
@@ -8647,6 +9340,285 @@
   <p:clrMapOvr>
     <a:masterClrMapping/>
   </p:clrMapOvr>
+  <p:timing>
+    <p:tnLst>
+      <p:par>
+        <p:cTn id="1" dur="indefinite" restart="never" nodeType="tmRoot">
+          <p:childTnLst>
+            <p:seq concurrent="1" nextAc="seek">
+              <p:cTn id="2" dur="indefinite" nodeType="mainSeq">
+                <p:childTnLst>
+                  <p:par>
+                    <p:cTn id="3" fill="hold">
+                      <p:stCondLst>
+                        <p:cond delay="indefinite"/>
+                      </p:stCondLst>
+                      <p:childTnLst>
+                        <p:par>
+                          <p:cTn id="4" fill="hold">
+                            <p:stCondLst>
+                              <p:cond delay="0"/>
+                            </p:stCondLst>
+                            <p:childTnLst>
+                              <p:par>
+                                <p:cTn id="5" presetID="1" presetClass="entr" presetSubtype="0" fill="hold" nodeType="clickEffect">
+                                  <p:stCondLst>
+                                    <p:cond delay="0"/>
+                                  </p:stCondLst>
+                                  <p:childTnLst>
+                                    <p:set>
+                                      <p:cBhvr>
+                                        <p:cTn id="6" dur="1" fill="hold">
+                                          <p:stCondLst>
+                                            <p:cond delay="0"/>
+                                          </p:stCondLst>
+                                        </p:cTn>
+                                        <p:tgtEl>
+                                          <p:spTgt spid="8"/>
+                                        </p:tgtEl>
+                                        <p:attrNameLst>
+                                          <p:attrName>style.visibility</p:attrName>
+                                        </p:attrNameLst>
+                                      </p:cBhvr>
+                                      <p:to>
+                                        <p:strVal val="visible"/>
+                                      </p:to>
+                                    </p:set>
+                                  </p:childTnLst>
+                                </p:cTn>
+                              </p:par>
+                            </p:childTnLst>
+                          </p:cTn>
+                        </p:par>
+                      </p:childTnLst>
+                    </p:cTn>
+                  </p:par>
+                  <p:par>
+                    <p:cTn id="7" fill="hold">
+                      <p:stCondLst>
+                        <p:cond delay="indefinite"/>
+                      </p:stCondLst>
+                      <p:childTnLst>
+                        <p:par>
+                          <p:cTn id="8" fill="hold">
+                            <p:stCondLst>
+                              <p:cond delay="0"/>
+                            </p:stCondLst>
+                            <p:childTnLst>
+                              <p:par>
+                                <p:cTn id="9" presetID="1" presetClass="entr" presetSubtype="0" fill="hold" nodeType="clickEffect">
+                                  <p:stCondLst>
+                                    <p:cond delay="0"/>
+                                  </p:stCondLst>
+                                  <p:childTnLst>
+                                    <p:set>
+                                      <p:cBhvr>
+                                        <p:cTn id="10" dur="1" fill="hold">
+                                          <p:stCondLst>
+                                            <p:cond delay="0"/>
+                                          </p:stCondLst>
+                                        </p:cTn>
+                                        <p:tgtEl>
+                                          <p:spTgt spid="3">
+                                            <p:txEl>
+                                              <p:pRg st="5" end="5"/>
+                                            </p:txEl>
+                                          </p:spTgt>
+                                        </p:tgtEl>
+                                        <p:attrNameLst>
+                                          <p:attrName>style.visibility</p:attrName>
+                                        </p:attrNameLst>
+                                      </p:cBhvr>
+                                      <p:to>
+                                        <p:strVal val="visible"/>
+                                      </p:to>
+                                    </p:set>
+                                  </p:childTnLst>
+                                </p:cTn>
+                              </p:par>
+                              <p:par>
+                                <p:cTn id="11" presetID="1" presetClass="entr" presetSubtype="0" fill="hold" nodeType="withEffect">
+                                  <p:stCondLst>
+                                    <p:cond delay="0"/>
+                                  </p:stCondLst>
+                                  <p:childTnLst>
+                                    <p:set>
+                                      <p:cBhvr>
+                                        <p:cTn id="12" dur="1" fill="hold">
+                                          <p:stCondLst>
+                                            <p:cond delay="0"/>
+                                          </p:stCondLst>
+                                        </p:cTn>
+                                        <p:tgtEl>
+                                          <p:spTgt spid="3">
+                                            <p:txEl>
+                                              <p:pRg st="6" end="6"/>
+                                            </p:txEl>
+                                          </p:spTgt>
+                                        </p:tgtEl>
+                                        <p:attrNameLst>
+                                          <p:attrName>style.visibility</p:attrName>
+                                        </p:attrNameLst>
+                                      </p:cBhvr>
+                                      <p:to>
+                                        <p:strVal val="visible"/>
+                                      </p:to>
+                                    </p:set>
+                                  </p:childTnLst>
+                                </p:cTn>
+                              </p:par>
+                              <p:par>
+                                <p:cTn id="13" presetID="1" presetClass="entr" presetSubtype="0" fill="hold" nodeType="withEffect">
+                                  <p:stCondLst>
+                                    <p:cond delay="0"/>
+                                  </p:stCondLst>
+                                  <p:childTnLst>
+                                    <p:set>
+                                      <p:cBhvr>
+                                        <p:cTn id="14" dur="1" fill="hold">
+                                          <p:stCondLst>
+                                            <p:cond delay="0"/>
+                                          </p:stCondLst>
+                                        </p:cTn>
+                                        <p:tgtEl>
+                                          <p:spTgt spid="3">
+                                            <p:txEl>
+                                              <p:pRg st="7" end="7"/>
+                                            </p:txEl>
+                                          </p:spTgt>
+                                        </p:tgtEl>
+                                        <p:attrNameLst>
+                                          <p:attrName>style.visibility</p:attrName>
+                                        </p:attrNameLst>
+                                      </p:cBhvr>
+                                      <p:to>
+                                        <p:strVal val="visible"/>
+                                      </p:to>
+                                    </p:set>
+                                  </p:childTnLst>
+                                </p:cTn>
+                              </p:par>
+                              <p:par>
+                                <p:cTn id="15" presetID="1" presetClass="entr" presetSubtype="0" fill="hold" nodeType="withEffect">
+                                  <p:stCondLst>
+                                    <p:cond delay="0"/>
+                                  </p:stCondLst>
+                                  <p:childTnLst>
+                                    <p:set>
+                                      <p:cBhvr>
+                                        <p:cTn id="16" dur="1" fill="hold">
+                                          <p:stCondLst>
+                                            <p:cond delay="0"/>
+                                          </p:stCondLst>
+                                        </p:cTn>
+                                        <p:tgtEl>
+                                          <p:spTgt spid="3">
+                                            <p:txEl>
+                                              <p:pRg st="8" end="8"/>
+                                            </p:txEl>
+                                          </p:spTgt>
+                                        </p:tgtEl>
+                                        <p:attrNameLst>
+                                          <p:attrName>style.visibility</p:attrName>
+                                        </p:attrNameLst>
+                                      </p:cBhvr>
+                                      <p:to>
+                                        <p:strVal val="visible"/>
+                                      </p:to>
+                                    </p:set>
+                                  </p:childTnLst>
+                                </p:cTn>
+                              </p:par>
+                              <p:par>
+                                <p:cTn id="17" presetID="1" presetClass="entr" presetSubtype="0" fill="hold" nodeType="withEffect">
+                                  <p:stCondLst>
+                                    <p:cond delay="0"/>
+                                  </p:stCondLst>
+                                  <p:childTnLst>
+                                    <p:set>
+                                      <p:cBhvr>
+                                        <p:cTn id="18" dur="1" fill="hold">
+                                          <p:stCondLst>
+                                            <p:cond delay="0"/>
+                                          </p:stCondLst>
+                                        </p:cTn>
+                                        <p:tgtEl>
+                                          <p:spTgt spid="3">
+                                            <p:txEl>
+                                              <p:pRg st="9" end="9"/>
+                                            </p:txEl>
+                                          </p:spTgt>
+                                        </p:tgtEl>
+                                        <p:attrNameLst>
+                                          <p:attrName>style.visibility</p:attrName>
+                                        </p:attrNameLst>
+                                      </p:cBhvr>
+                                      <p:to>
+                                        <p:strVal val="visible"/>
+                                      </p:to>
+                                    </p:set>
+                                  </p:childTnLst>
+                                </p:cTn>
+                              </p:par>
+                              <p:par>
+                                <p:cTn id="19" presetID="1" presetClass="entr" presetSubtype="0" fill="hold" nodeType="withEffect">
+                                  <p:stCondLst>
+                                    <p:cond delay="0"/>
+                                  </p:stCondLst>
+                                  <p:childTnLst>
+                                    <p:set>
+                                      <p:cBhvr>
+                                        <p:cTn id="20" dur="1" fill="hold">
+                                          <p:stCondLst>
+                                            <p:cond delay="0"/>
+                                          </p:stCondLst>
+                                        </p:cTn>
+                                        <p:tgtEl>
+                                          <p:spTgt spid="3">
+                                            <p:txEl>
+                                              <p:pRg st="10" end="10"/>
+                                            </p:txEl>
+                                          </p:spTgt>
+                                        </p:tgtEl>
+                                        <p:attrNameLst>
+                                          <p:attrName>style.visibility</p:attrName>
+                                        </p:attrNameLst>
+                                      </p:cBhvr>
+                                      <p:to>
+                                        <p:strVal val="visible"/>
+                                      </p:to>
+                                    </p:set>
+                                  </p:childTnLst>
+                                </p:cTn>
+                              </p:par>
+                            </p:childTnLst>
+                          </p:cTn>
+                        </p:par>
+                      </p:childTnLst>
+                    </p:cTn>
+                  </p:par>
+                </p:childTnLst>
+              </p:cTn>
+              <p:prevCondLst>
+                <p:cond evt="onPrev" delay="0">
+                  <p:tgtEl>
+                    <p:sldTgt/>
+                  </p:tgtEl>
+                </p:cond>
+              </p:prevCondLst>
+              <p:nextCondLst>
+                <p:cond evt="onNext" delay="0">
+                  <p:tgtEl>
+                    <p:sldTgt/>
+                  </p:tgtEl>
+                </p:cond>
+              </p:nextCondLst>
+            </p:seq>
+          </p:childTnLst>
+        </p:cTn>
+      </p:par>
+    </p:tnLst>
+  </p:timing>
 </p:sld>
 </file>
 
@@ -8869,7 +9841,7 @@
                   <a:schemeClr val="tx2"/>
                 </a:solidFill>
               </a:rPr>
-              <a:t>Github has full tutorial to build, curate and validate an industrially useful model for calculating roll properties (Length, L vs. Diam., D)</a:t>
+              <a:t>Github has tutorial to build, curate and validate an industrially useful model for calculating substrate roll properties (Length, L vs. Diam., D)</a:t>
             </a:r>
           </a:p>
           <a:p>
@@ -8879,7 +9851,7 @@
                   <a:schemeClr val="tx2"/>
                 </a:solidFill>
               </a:rPr>
-              <a:t>Tutorial keeps to a simple example to teach software practices</a:t>
+              <a:t>A simple, technical example to teach software practices</a:t>
             </a:r>
           </a:p>
           <a:p>
@@ -8889,7 +9861,7 @@
                   <a:schemeClr val="tx2"/>
                 </a:solidFill>
               </a:rPr>
-              <a:t>Tutorial includes how to use AI to write the code for the model and for rerunnable Python (Pytest) tests in separate files</a:t>
+              <a:t>Tutorial includes how to use AI to write code for the model and for rerunnable Python (Pytest) tests in separate files</a:t>
             </a:r>
           </a:p>
           <a:p>
@@ -9152,7 +10124,7 @@
         <p:spPr>
           <a:xfrm>
             <a:off x="446534" y="6152419"/>
-            <a:ext cx="2395784" cy="276999"/>
+            <a:ext cx="2754408" cy="307777"/>
           </a:xfrm>
           <a:prstGeom prst="rect">
             <a:avLst/>
@@ -9166,7 +10138,7 @@
           <a:lstStyle/>
           <a:p>
             <a:r>
-              <a:rPr lang="en-US" sz="1200" dirty="0"/>
+              <a:rPr lang="en-US" sz="1400" dirty="0"/>
               <a:t>C = material’s caliper or thickness</a:t>
             </a:r>
           </a:p>
@@ -9588,7 +10560,7 @@
         <p:spPr>
           <a:xfrm>
             <a:off x="9055030" y="2165836"/>
-            <a:ext cx="1707583" cy="307777"/>
+            <a:ext cx="1835824" cy="307777"/>
           </a:xfrm>
           <a:prstGeom prst="rect">
             <a:avLst/>
@@ -9603,47 +10575,11 @@
           <a:p>
             <a:r>
               <a:rPr lang="en-US" sz="1400" dirty="0"/>
-              <a:t>Multistep Procedure</a:t>
+              <a:t>Multistep “Procedure”</a:t>
             </a:r>
           </a:p>
         </p:txBody>
       </p:sp>
-      <p:pic>
-        <p:nvPicPr>
-          <p:cNvPr id="14" name="Picture 13" descr="A screenshot of a computer screen&#10;&#10;AI-generated content may be incorrect.">
-            <a:extLst>
-              <a:ext uri="{FF2B5EF4-FFF2-40B4-BE49-F238E27FC236}">
-                <a16:creationId xmlns:a16="http://schemas.microsoft.com/office/drawing/2014/main" id="{7E4F27A0-211B-6ECE-D987-DEE7990035F5}"/>
-              </a:ext>
-            </a:extLst>
-          </p:cNvPr>
-          <p:cNvPicPr>
-            <a:picLocks noChangeAspect="1"/>
-          </p:cNvPicPr>
-          <p:nvPr/>
-        </p:nvPicPr>
-        <p:blipFill>
-          <a:blip r:embed="rId2">
-            <a:extLst>
-              <a:ext uri="{28A0092B-C50C-407E-A947-70E740481C1C}">
-                <a14:useLocalDpi xmlns:a14="http://schemas.microsoft.com/office/drawing/2010/main" val="0"/>
-              </a:ext>
-            </a:extLst>
-          </a:blip>
-          <a:stretch>
-            <a:fillRect/>
-          </a:stretch>
-        </p:blipFill>
-        <p:spPr>
-          <a:xfrm>
-            <a:off x="8166410" y="4574778"/>
-            <a:ext cx="3251835" cy="2171700"/>
-          </a:xfrm>
-          <a:prstGeom prst="rect">
-            <a:avLst/>
-          </a:prstGeom>
-        </p:spPr>
-      </p:pic>
       <p:pic>
         <p:nvPicPr>
           <p:cNvPr id="16" name="Picture 15" descr="A screenshot of a computer code&#10;&#10;AI-generated content may be incorrect.">
@@ -9659,7 +10595,7 @@
           <p:nvPr/>
         </p:nvPicPr>
         <p:blipFill>
-          <a:blip r:embed="rId3">
+          <a:blip r:embed="rId2">
             <a:extLst>
               <a:ext uri="{28A0092B-C50C-407E-A947-70E740481C1C}">
                 <a14:useLocalDpi xmlns:a14="http://schemas.microsoft.com/office/drawing/2010/main" val="0"/>
@@ -9694,7 +10630,7 @@
         </p:nvSpPr>
         <p:spPr>
           <a:xfrm>
-            <a:off x="8864701" y="4205556"/>
+            <a:off x="8864701" y="4351212"/>
             <a:ext cx="1855251" cy="307777"/>
           </a:xfrm>
           <a:prstGeom prst="rect">
@@ -9765,7 +10701,7 @@
           <p:nvPr/>
         </p:nvPicPr>
         <p:blipFill>
-          <a:blip r:embed="rId4">
+          <a:blip r:embed="rId3">
             <a:extLst>
               <a:ext uri="{28A0092B-C50C-407E-A947-70E740481C1C}">
                 <a14:useLocalDpi xmlns:a14="http://schemas.microsoft.com/office/drawing/2010/main" val="0"/>
@@ -9801,7 +10737,7 @@
           <p:nvPr/>
         </p:nvPicPr>
         <p:blipFill>
-          <a:blip r:embed="rId5">
+          <a:blip r:embed="rId4">
             <a:extLst>
               <a:ext uri="{28A0092B-C50C-407E-A947-70E740481C1C}">
                 <a14:useLocalDpi xmlns:a14="http://schemas.microsoft.com/office/drawing/2010/main" val="0"/>
@@ -9822,6 +10758,42 @@
           </a:prstGeom>
         </p:spPr>
       </p:pic>
+      <p:pic>
+        <p:nvPicPr>
+          <p:cNvPr id="8" name="Picture 7" descr="A screenshot of a computer code&#10;&#10;AI-generated content may be incorrect.">
+            <a:extLst>
+              <a:ext uri="{FF2B5EF4-FFF2-40B4-BE49-F238E27FC236}">
+                <a16:creationId xmlns:a16="http://schemas.microsoft.com/office/drawing/2014/main" id="{AD376F78-7867-9F59-5262-630AEBD9E023}"/>
+              </a:ext>
+            </a:extLst>
+          </p:cNvPr>
+          <p:cNvPicPr>
+            <a:picLocks noChangeAspect="1"/>
+          </p:cNvPicPr>
+          <p:nvPr/>
+        </p:nvPicPr>
+        <p:blipFill>
+          <a:blip r:embed="rId5">
+            <a:extLst>
+              <a:ext uri="{28A0092B-C50C-407E-A947-70E740481C1C}">
+                <a14:useLocalDpi xmlns:a14="http://schemas.microsoft.com/office/drawing/2010/main" val="0"/>
+              </a:ext>
+            </a:extLst>
+          </a:blip>
+          <a:stretch>
+            <a:fillRect/>
+          </a:stretch>
+        </p:blipFill>
+        <p:spPr>
+          <a:xfrm>
+            <a:off x="8094604" y="4723631"/>
+            <a:ext cx="4097396" cy="1686481"/>
+          </a:xfrm>
+          <a:prstGeom prst="rect">
+            <a:avLst/>
+          </a:prstGeom>
+        </p:spPr>
+      </p:pic>
     </p:spTree>
     <p:extLst>
       <p:ext uri="{BB962C8B-B14F-4D97-AF65-F5344CB8AC3E}">
@@ -9832,6 +10804,516 @@
   <p:clrMapOvr>
     <a:masterClrMapping/>
   </p:clrMapOvr>
+  <p:timing>
+    <p:tnLst>
+      <p:par>
+        <p:cTn id="1" dur="indefinite" restart="never" nodeType="tmRoot">
+          <p:childTnLst>
+            <p:seq concurrent="1" nextAc="seek">
+              <p:cTn id="2" dur="indefinite" nodeType="mainSeq">
+                <p:childTnLst>
+                  <p:par>
+                    <p:cTn id="3" fill="hold">
+                      <p:stCondLst>
+                        <p:cond delay="indefinite"/>
+                      </p:stCondLst>
+                      <p:childTnLst>
+                        <p:par>
+                          <p:cTn id="4" fill="hold">
+                            <p:stCondLst>
+                              <p:cond delay="0"/>
+                            </p:stCondLst>
+                            <p:childTnLst>
+                              <p:par>
+                                <p:cTn id="5" presetID="1" presetClass="entr" presetSubtype="0" fill="hold" grpId="0" nodeType="clickEffect">
+                                  <p:stCondLst>
+                                    <p:cond delay="0"/>
+                                  </p:stCondLst>
+                                  <p:childTnLst>
+                                    <p:set>
+                                      <p:cBhvr>
+                                        <p:cTn id="6" dur="1" fill="hold">
+                                          <p:stCondLst>
+                                            <p:cond delay="0"/>
+                                          </p:stCondLst>
+                                        </p:cTn>
+                                        <p:tgtEl>
+                                          <p:spTgt spid="4"/>
+                                        </p:tgtEl>
+                                        <p:attrNameLst>
+                                          <p:attrName>style.visibility</p:attrName>
+                                        </p:attrNameLst>
+                                      </p:cBhvr>
+                                      <p:to>
+                                        <p:strVal val="visible"/>
+                                      </p:to>
+                                    </p:set>
+                                  </p:childTnLst>
+                                </p:cTn>
+                              </p:par>
+                              <p:par>
+                                <p:cTn id="7" presetID="1" presetClass="entr" presetSubtype="0" fill="hold" nodeType="withEffect">
+                                  <p:stCondLst>
+                                    <p:cond delay="0"/>
+                                  </p:stCondLst>
+                                  <p:childTnLst>
+                                    <p:set>
+                                      <p:cBhvr>
+                                        <p:cTn id="8" dur="1" fill="hold">
+                                          <p:stCondLst>
+                                            <p:cond delay="0"/>
+                                          </p:stCondLst>
+                                        </p:cTn>
+                                        <p:tgtEl>
+                                          <p:spTgt spid="7"/>
+                                        </p:tgtEl>
+                                        <p:attrNameLst>
+                                          <p:attrName>style.visibility</p:attrName>
+                                        </p:attrNameLst>
+                                      </p:cBhvr>
+                                      <p:to>
+                                        <p:strVal val="visible"/>
+                                      </p:to>
+                                    </p:set>
+                                  </p:childTnLst>
+                                </p:cTn>
+                              </p:par>
+                              <p:par>
+                                <p:cTn id="9" presetID="1" presetClass="entr" presetSubtype="0" fill="hold" nodeType="withEffect">
+                                  <p:stCondLst>
+                                    <p:cond delay="0"/>
+                                  </p:stCondLst>
+                                  <p:childTnLst>
+                                    <p:set>
+                                      <p:cBhvr>
+                                        <p:cTn id="10" dur="1" fill="hold">
+                                          <p:stCondLst>
+                                            <p:cond delay="0"/>
+                                          </p:stCondLst>
+                                        </p:cTn>
+                                        <p:tgtEl>
+                                          <p:spTgt spid="9"/>
+                                        </p:tgtEl>
+                                        <p:attrNameLst>
+                                          <p:attrName>style.visibility</p:attrName>
+                                        </p:attrNameLst>
+                                      </p:cBhvr>
+                                      <p:to>
+                                        <p:strVal val="visible"/>
+                                      </p:to>
+                                    </p:set>
+                                  </p:childTnLst>
+                                </p:cTn>
+                              </p:par>
+                              <p:par>
+                                <p:cTn id="11" presetID="1" presetClass="entr" presetSubtype="0" fill="hold" grpId="0" nodeType="withEffect">
+                                  <p:stCondLst>
+                                    <p:cond delay="0"/>
+                                  </p:stCondLst>
+                                  <p:childTnLst>
+                                    <p:set>
+                                      <p:cBhvr>
+                                        <p:cTn id="12" dur="1" fill="hold">
+                                          <p:stCondLst>
+                                            <p:cond delay="0"/>
+                                          </p:stCondLst>
+                                        </p:cTn>
+                                        <p:tgtEl>
+                                          <p:spTgt spid="18"/>
+                                        </p:tgtEl>
+                                        <p:attrNameLst>
+                                          <p:attrName>style.visibility</p:attrName>
+                                        </p:attrNameLst>
+                                      </p:cBhvr>
+                                      <p:to>
+                                        <p:strVal val="visible"/>
+                                      </p:to>
+                                    </p:set>
+                                  </p:childTnLst>
+                                </p:cTn>
+                              </p:par>
+                            </p:childTnLst>
+                          </p:cTn>
+                        </p:par>
+                      </p:childTnLst>
+                    </p:cTn>
+                  </p:par>
+                  <p:par>
+                    <p:cTn id="13" fill="hold">
+                      <p:stCondLst>
+                        <p:cond delay="indefinite"/>
+                      </p:stCondLst>
+                      <p:childTnLst>
+                        <p:par>
+                          <p:cTn id="14" fill="hold">
+                            <p:stCondLst>
+                              <p:cond delay="0"/>
+                            </p:stCondLst>
+                            <p:childTnLst>
+                              <p:par>
+                                <p:cTn id="15" presetID="1" presetClass="entr" presetSubtype="0" fill="hold" nodeType="clickEffect">
+                                  <p:stCondLst>
+                                    <p:cond delay="0"/>
+                                  </p:stCondLst>
+                                  <p:childTnLst>
+                                    <p:set>
+                                      <p:cBhvr>
+                                        <p:cTn id="16" dur="1" fill="hold">
+                                          <p:stCondLst>
+                                            <p:cond delay="0"/>
+                                          </p:stCondLst>
+                                        </p:cTn>
+                                        <p:tgtEl>
+                                          <p:spTgt spid="3">
+                                            <p:txEl>
+                                              <p:pRg st="3" end="3"/>
+                                            </p:txEl>
+                                          </p:spTgt>
+                                        </p:tgtEl>
+                                        <p:attrNameLst>
+                                          <p:attrName>style.visibility</p:attrName>
+                                        </p:attrNameLst>
+                                      </p:cBhvr>
+                                      <p:to>
+                                        <p:strVal val="visible"/>
+                                      </p:to>
+                                    </p:set>
+                                  </p:childTnLst>
+                                </p:cTn>
+                              </p:par>
+                              <p:par>
+                                <p:cTn id="17" presetID="1" presetClass="entr" presetSubtype="0" fill="hold" nodeType="withEffect">
+                                  <p:stCondLst>
+                                    <p:cond delay="0"/>
+                                  </p:stCondLst>
+                                  <p:childTnLst>
+                                    <p:set>
+                                      <p:cBhvr>
+                                        <p:cTn id="18" dur="1" fill="hold">
+                                          <p:stCondLst>
+                                            <p:cond delay="0"/>
+                                          </p:stCondLst>
+                                        </p:cTn>
+                                        <p:tgtEl>
+                                          <p:spTgt spid="3">
+                                            <p:txEl>
+                                              <p:pRg st="4" end="4"/>
+                                            </p:txEl>
+                                          </p:spTgt>
+                                        </p:tgtEl>
+                                        <p:attrNameLst>
+                                          <p:attrName>style.visibility</p:attrName>
+                                        </p:attrNameLst>
+                                      </p:cBhvr>
+                                      <p:to>
+                                        <p:strVal val="visible"/>
+                                      </p:to>
+                                    </p:set>
+                                  </p:childTnLst>
+                                </p:cTn>
+                              </p:par>
+                              <p:par>
+                                <p:cTn id="19" presetID="1" presetClass="entr" presetSubtype="0" fill="hold" nodeType="withEffect">
+                                  <p:stCondLst>
+                                    <p:cond delay="0"/>
+                                  </p:stCondLst>
+                                  <p:childTnLst>
+                                    <p:set>
+                                      <p:cBhvr>
+                                        <p:cTn id="20" dur="1" fill="hold">
+                                          <p:stCondLst>
+                                            <p:cond delay="0"/>
+                                          </p:stCondLst>
+                                        </p:cTn>
+                                        <p:tgtEl>
+                                          <p:spTgt spid="3">
+                                            <p:txEl>
+                                              <p:pRg st="5" end="5"/>
+                                            </p:txEl>
+                                          </p:spTgt>
+                                        </p:tgtEl>
+                                        <p:attrNameLst>
+                                          <p:attrName>style.visibility</p:attrName>
+                                        </p:attrNameLst>
+                                      </p:cBhvr>
+                                      <p:to>
+                                        <p:strVal val="visible"/>
+                                      </p:to>
+                                    </p:set>
+                                  </p:childTnLst>
+                                </p:cTn>
+                              </p:par>
+                              <p:par>
+                                <p:cTn id="21" presetID="1" presetClass="entr" presetSubtype="0" fill="hold" nodeType="withEffect">
+                                  <p:stCondLst>
+                                    <p:cond delay="0"/>
+                                  </p:stCondLst>
+                                  <p:childTnLst>
+                                    <p:set>
+                                      <p:cBhvr>
+                                        <p:cTn id="22" dur="1" fill="hold">
+                                          <p:stCondLst>
+                                            <p:cond delay="0"/>
+                                          </p:stCondLst>
+                                        </p:cTn>
+                                        <p:tgtEl>
+                                          <p:spTgt spid="3">
+                                            <p:txEl>
+                                              <p:pRg st="6" end="6"/>
+                                            </p:txEl>
+                                          </p:spTgt>
+                                        </p:tgtEl>
+                                        <p:attrNameLst>
+                                          <p:attrName>style.visibility</p:attrName>
+                                        </p:attrNameLst>
+                                      </p:cBhvr>
+                                      <p:to>
+                                        <p:strVal val="visible"/>
+                                      </p:to>
+                                    </p:set>
+                                  </p:childTnLst>
+                                </p:cTn>
+                              </p:par>
+                              <p:par>
+                                <p:cTn id="23" presetID="1" presetClass="entr" presetSubtype="0" fill="hold" nodeType="withEffect">
+                                  <p:stCondLst>
+                                    <p:cond delay="0"/>
+                                  </p:stCondLst>
+                                  <p:childTnLst>
+                                    <p:set>
+                                      <p:cBhvr>
+                                        <p:cTn id="24" dur="1" fill="hold">
+                                          <p:stCondLst>
+                                            <p:cond delay="0"/>
+                                          </p:stCondLst>
+                                        </p:cTn>
+                                        <p:tgtEl>
+                                          <p:spTgt spid="3">
+                                            <p:txEl>
+                                              <p:pRg st="7" end="7"/>
+                                            </p:txEl>
+                                          </p:spTgt>
+                                        </p:tgtEl>
+                                        <p:attrNameLst>
+                                          <p:attrName>style.visibility</p:attrName>
+                                        </p:attrNameLst>
+                                      </p:cBhvr>
+                                      <p:to>
+                                        <p:strVal val="visible"/>
+                                      </p:to>
+                                    </p:set>
+                                  </p:childTnLst>
+                                </p:cTn>
+                              </p:par>
+                              <p:par>
+                                <p:cTn id="25" presetID="1" presetClass="entr" presetSubtype="0" fill="hold" nodeType="withEffect">
+                                  <p:stCondLst>
+                                    <p:cond delay="0"/>
+                                  </p:stCondLst>
+                                  <p:childTnLst>
+                                    <p:set>
+                                      <p:cBhvr>
+                                        <p:cTn id="26" dur="1" fill="hold">
+                                          <p:stCondLst>
+                                            <p:cond delay="0"/>
+                                          </p:stCondLst>
+                                        </p:cTn>
+                                        <p:tgtEl>
+                                          <p:spTgt spid="3">
+                                            <p:txEl>
+                                              <p:pRg st="8" end="8"/>
+                                            </p:txEl>
+                                          </p:spTgt>
+                                        </p:tgtEl>
+                                        <p:attrNameLst>
+                                          <p:attrName>style.visibility</p:attrName>
+                                        </p:attrNameLst>
+                                      </p:cBhvr>
+                                      <p:to>
+                                        <p:strVal val="visible"/>
+                                      </p:to>
+                                    </p:set>
+                                  </p:childTnLst>
+                                </p:cTn>
+                              </p:par>
+                            </p:childTnLst>
+                          </p:cTn>
+                        </p:par>
+                      </p:childTnLst>
+                    </p:cTn>
+                  </p:par>
+                  <p:par>
+                    <p:cTn id="27" fill="hold">
+                      <p:stCondLst>
+                        <p:cond delay="indefinite"/>
+                      </p:stCondLst>
+                      <p:childTnLst>
+                        <p:par>
+                          <p:cTn id="28" fill="hold">
+                            <p:stCondLst>
+                              <p:cond delay="0"/>
+                            </p:stCondLst>
+                            <p:childTnLst>
+                              <p:par>
+                                <p:cTn id="29" presetID="1" presetClass="entr" presetSubtype="0" fill="hold" grpId="0" nodeType="clickEffect">
+                                  <p:stCondLst>
+                                    <p:cond delay="0"/>
+                                  </p:stCondLst>
+                                  <p:childTnLst>
+                                    <p:set>
+                                      <p:cBhvr>
+                                        <p:cTn id="30" dur="1" fill="hold">
+                                          <p:stCondLst>
+                                            <p:cond delay="0"/>
+                                          </p:stCondLst>
+                                        </p:cTn>
+                                        <p:tgtEl>
+                                          <p:spTgt spid="5"/>
+                                        </p:tgtEl>
+                                        <p:attrNameLst>
+                                          <p:attrName>style.visibility</p:attrName>
+                                        </p:attrNameLst>
+                                      </p:cBhvr>
+                                      <p:to>
+                                        <p:strVal val="visible"/>
+                                      </p:to>
+                                    </p:set>
+                                  </p:childTnLst>
+                                </p:cTn>
+                              </p:par>
+                              <p:par>
+                                <p:cTn id="31" presetID="1" presetClass="entr" presetSubtype="0" fill="hold" nodeType="withEffect">
+                                  <p:stCondLst>
+                                    <p:cond delay="0"/>
+                                  </p:stCondLst>
+                                  <p:childTnLst>
+                                    <p:set>
+                                      <p:cBhvr>
+                                        <p:cTn id="32" dur="1" fill="hold">
+                                          <p:stCondLst>
+                                            <p:cond delay="0"/>
+                                          </p:stCondLst>
+                                        </p:cTn>
+                                        <p:tgtEl>
+                                          <p:spTgt spid="16"/>
+                                        </p:tgtEl>
+                                        <p:attrNameLst>
+                                          <p:attrName>style.visibility</p:attrName>
+                                        </p:attrNameLst>
+                                      </p:cBhvr>
+                                      <p:to>
+                                        <p:strVal val="visible"/>
+                                      </p:to>
+                                    </p:set>
+                                  </p:childTnLst>
+                                </p:cTn>
+                              </p:par>
+                            </p:childTnLst>
+                          </p:cTn>
+                        </p:par>
+                      </p:childTnLst>
+                    </p:cTn>
+                  </p:par>
+                  <p:par>
+                    <p:cTn id="33" fill="hold">
+                      <p:stCondLst>
+                        <p:cond delay="indefinite"/>
+                      </p:stCondLst>
+                      <p:childTnLst>
+                        <p:par>
+                          <p:cTn id="34" fill="hold">
+                            <p:stCondLst>
+                              <p:cond delay="0"/>
+                            </p:stCondLst>
+                            <p:childTnLst>
+                              <p:par>
+                                <p:cTn id="35" presetID="1" presetClass="entr" presetSubtype="0" fill="hold" grpId="0" nodeType="clickEffect">
+                                  <p:stCondLst>
+                                    <p:cond delay="0"/>
+                                  </p:stCondLst>
+                                  <p:childTnLst>
+                                    <p:set>
+                                      <p:cBhvr>
+                                        <p:cTn id="36" dur="1" fill="hold">
+                                          <p:stCondLst>
+                                            <p:cond delay="0"/>
+                                          </p:stCondLst>
+                                        </p:cTn>
+                                        <p:tgtEl>
+                                          <p:spTgt spid="17"/>
+                                        </p:tgtEl>
+                                        <p:attrNameLst>
+                                          <p:attrName>style.visibility</p:attrName>
+                                        </p:attrNameLst>
+                                      </p:cBhvr>
+                                      <p:to>
+                                        <p:strVal val="visible"/>
+                                      </p:to>
+                                    </p:set>
+                                  </p:childTnLst>
+                                </p:cTn>
+                              </p:par>
+                              <p:par>
+                                <p:cTn id="37" presetID="1" presetClass="entr" presetSubtype="0" fill="hold" nodeType="withEffect">
+                                  <p:stCondLst>
+                                    <p:cond delay="0"/>
+                                  </p:stCondLst>
+                                  <p:childTnLst>
+                                    <p:set>
+                                      <p:cBhvr>
+                                        <p:cTn id="38" dur="1" fill="hold">
+                                          <p:stCondLst>
+                                            <p:cond delay="0"/>
+                                          </p:stCondLst>
+                                        </p:cTn>
+                                        <p:tgtEl>
+                                          <p:spTgt spid="8"/>
+                                        </p:tgtEl>
+                                        <p:attrNameLst>
+                                          <p:attrName>style.visibility</p:attrName>
+                                        </p:attrNameLst>
+                                      </p:cBhvr>
+                                      <p:to>
+                                        <p:strVal val="visible"/>
+                                      </p:to>
+                                    </p:set>
+                                  </p:childTnLst>
+                                </p:cTn>
+                              </p:par>
+                            </p:childTnLst>
+                          </p:cTn>
+                        </p:par>
+                      </p:childTnLst>
+                    </p:cTn>
+                  </p:par>
+                </p:childTnLst>
+              </p:cTn>
+              <p:prevCondLst>
+                <p:cond evt="onPrev" delay="0">
+                  <p:tgtEl>
+                    <p:sldTgt/>
+                  </p:tgtEl>
+                </p:cond>
+              </p:prevCondLst>
+              <p:nextCondLst>
+                <p:cond evt="onNext" delay="0">
+                  <p:tgtEl>
+                    <p:sldTgt/>
+                  </p:tgtEl>
+                </p:cond>
+              </p:nextCondLst>
+            </p:seq>
+          </p:childTnLst>
+        </p:cTn>
+      </p:par>
+    </p:tnLst>
+    <p:bldLst>
+      <p:bldP spid="4" grpId="0"/>
+      <p:bldP spid="5" grpId="0"/>
+      <p:bldP spid="17" grpId="0"/>
+      <p:bldP spid="18" grpId="0"/>
+    </p:bldLst>
+  </p:timing>
 </p:sld>
 </file>
 
@@ -10063,7 +11545,7 @@
                   <a:schemeClr val="tx2"/>
                 </a:solidFill>
               </a:rPr>
-              <a:t>Testing is completely under-utilized by engineers/scientists; yet easy to learn</a:t>
+              <a:t>Testing is under-utilized by engineers/scientists; yet easy to learn</a:t>
             </a:r>
           </a:p>
           <a:p>
@@ -10074,18 +11556,7 @@
                   <a:schemeClr val="tx2"/>
                 </a:solidFill>
               </a:rPr>
-              <a:t>Standard Python Pytest library manages testing from separate file from model code</a:t>
-            </a:r>
-          </a:p>
-          <a:p>
-            <a:pPr lvl="1"/>
-            <a:r>
-              <a:rPr lang="en-US" dirty="0">
-                <a:solidFill>
-                  <a:schemeClr val="tx2"/>
-                </a:solidFill>
-              </a:rPr>
-              <a:t>Standard should be minimum one test per model function</a:t>
+              <a:t>Many “validations” consist of feeding a model some inputs, looking at the results and pronouncing it validated</a:t>
             </a:r>
           </a:p>
           <a:p>
@@ -10124,6 +11595,28 @@
                 </a:solidFill>
               </a:rPr>
               <a:t> works</a:t>
+            </a:r>
+          </a:p>
+          <a:p>
+            <a:pPr lvl="1"/>
+            <a:r>
+              <a:rPr lang="en-US" dirty="0">
+                <a:solidFill>
+                  <a:schemeClr val="tx2"/>
+                </a:solidFill>
+              </a:rPr>
+              <a:t>Standard Python Pytest library manages testing from *.py file separate from model code’s *.py</a:t>
+            </a:r>
+          </a:p>
+          <a:p>
+            <a:pPr lvl="1"/>
+            <a:r>
+              <a:rPr lang="en-US" dirty="0">
+                <a:solidFill>
+                  <a:schemeClr val="tx2"/>
+                </a:solidFill>
+              </a:rPr>
+              <a:t>Advise minimum one test per model function</a:t>
             </a:r>
           </a:p>
         </p:txBody>
@@ -10142,8 +11635,8 @@
         </p:nvSpPr>
         <p:spPr>
           <a:xfrm>
-            <a:off x="8219061" y="552197"/>
-            <a:ext cx="2164375" cy="307777"/>
+            <a:off x="8326776" y="506007"/>
+            <a:ext cx="1843903" cy="307777"/>
           </a:xfrm>
           <a:prstGeom prst="rect">
             <a:avLst/>
@@ -10157,22 +11650,18 @@
           <a:lstStyle/>
           <a:p>
             <a:r>
-              <a:rPr lang="en-US" sz="1400" dirty="0" err="1"/>
-              <a:t>test_FitRawData</a:t>
-            </a:r>
-            <a:r>
               <a:rPr lang="en-US" sz="1400" dirty="0"/>
-              <a:t> Function </a:t>
+              <a:t>Github Copilot Prompt</a:t>
             </a:r>
           </a:p>
         </p:txBody>
       </p:sp>
       <p:pic>
         <p:nvPicPr>
-          <p:cNvPr id="9" name="Picture 8" descr="A screenshot of a computer code&#10;&#10;AI-generated content may be incorrect.">
+          <p:cNvPr id="6" name="Picture 5" descr="A screenshot of a computer&#10;&#10;AI-generated content may be incorrect.">
             <a:extLst>
               <a:ext uri="{FF2B5EF4-FFF2-40B4-BE49-F238E27FC236}">
-                <a16:creationId xmlns:a16="http://schemas.microsoft.com/office/drawing/2014/main" id="{2681D9DA-0294-B9FB-E19F-64052D22CAB4}"/>
+                <a16:creationId xmlns:a16="http://schemas.microsoft.com/office/drawing/2014/main" id="{34E7E1C6-5831-A0D4-1895-4345E9048794}"/>
               </a:ext>
             </a:extLst>
           </p:cNvPr>
@@ -10195,8 +11684,80 @@
         </p:blipFill>
         <p:spPr>
           <a:xfrm>
-            <a:off x="6561526" y="1009396"/>
-            <a:ext cx="5335229" cy="4309739"/>
+            <a:off x="598177" y="4277212"/>
+            <a:ext cx="5963349" cy="2083846"/>
+          </a:xfrm>
+          <a:prstGeom prst="rect">
+            <a:avLst/>
+          </a:prstGeom>
+        </p:spPr>
+      </p:pic>
+      <p:pic>
+        <p:nvPicPr>
+          <p:cNvPr id="8" name="Picture 7" descr="A screenshot of a computer code&#10;&#10;AI-generated content may be incorrect.">
+            <a:extLst>
+              <a:ext uri="{FF2B5EF4-FFF2-40B4-BE49-F238E27FC236}">
+                <a16:creationId xmlns:a16="http://schemas.microsoft.com/office/drawing/2014/main" id="{624DCFC2-5A99-F2CA-E74D-594722E7C9AE}"/>
+              </a:ext>
+            </a:extLst>
+          </p:cNvPr>
+          <p:cNvPicPr>
+            <a:picLocks noChangeAspect="1"/>
+          </p:cNvPicPr>
+          <p:nvPr/>
+        </p:nvPicPr>
+        <p:blipFill>
+          <a:blip r:embed="rId3">
+            <a:extLst>
+              <a:ext uri="{28A0092B-C50C-407E-A947-70E740481C1C}">
+                <a14:useLocalDpi xmlns:a14="http://schemas.microsoft.com/office/drawing/2010/main" val="0"/>
+              </a:ext>
+            </a:extLst>
+          </a:blip>
+          <a:stretch>
+            <a:fillRect/>
+          </a:stretch>
+        </p:blipFill>
+        <p:spPr>
+          <a:xfrm>
+            <a:off x="7000536" y="3133617"/>
+            <a:ext cx="4496381" cy="3765085"/>
+          </a:xfrm>
+          <a:prstGeom prst="rect">
+            <a:avLst/>
+          </a:prstGeom>
+        </p:spPr>
+      </p:pic>
+      <p:pic>
+        <p:nvPicPr>
+          <p:cNvPr id="14" name="Picture 13" descr="A screenshot of a computer code&#10;&#10;AI-generated content may be incorrect.">
+            <a:extLst>
+              <a:ext uri="{FF2B5EF4-FFF2-40B4-BE49-F238E27FC236}">
+                <a16:creationId xmlns:a16="http://schemas.microsoft.com/office/drawing/2014/main" id="{388917D2-7B0A-7731-EC0D-2E9A6F38302F}"/>
+              </a:ext>
+            </a:extLst>
+          </p:cNvPr>
+          <p:cNvPicPr>
+            <a:picLocks noChangeAspect="1"/>
+          </p:cNvPicPr>
+          <p:nvPr/>
+        </p:nvPicPr>
+        <p:blipFill>
+          <a:blip r:embed="rId4">
+            <a:extLst>
+              <a:ext uri="{28A0092B-C50C-407E-A947-70E740481C1C}">
+                <a14:useLocalDpi xmlns:a14="http://schemas.microsoft.com/office/drawing/2010/main" val="0"/>
+              </a:ext>
+            </a:extLst>
+          </a:blip>
+          <a:stretch>
+            <a:fillRect/>
+          </a:stretch>
+        </p:blipFill>
+        <p:spPr>
+          <a:xfrm>
+            <a:off x="6751417" y="1009397"/>
+            <a:ext cx="5233893" cy="1816979"/>
           </a:xfrm>
           <a:prstGeom prst="rect">
             <a:avLst/>
@@ -10205,10 +11766,10 @@
       </p:pic>
       <p:sp>
         <p:nvSpPr>
-          <p:cNvPr id="11" name="TextBox 10">
+          <p:cNvPr id="16" name="TextBox 15">
             <a:extLst>
               <a:ext uri="{FF2B5EF4-FFF2-40B4-BE49-F238E27FC236}">
-                <a16:creationId xmlns:a16="http://schemas.microsoft.com/office/drawing/2014/main" id="{BEB58256-471C-5507-76AD-E443C37E70AF}"/>
+                <a16:creationId xmlns:a16="http://schemas.microsoft.com/office/drawing/2014/main" id="{678979A9-6675-3F57-9C67-A697153B43B3}"/>
               </a:ext>
             </a:extLst>
           </p:cNvPr>
@@ -10217,8 +11778,8 @@
         </p:nvSpPr>
         <p:spPr>
           <a:xfrm>
-            <a:off x="2036823" y="4274062"/>
-            <a:ext cx="2212593" cy="307777"/>
+            <a:off x="7974682" y="2868100"/>
+            <a:ext cx="2931222" cy="307777"/>
           </a:xfrm>
           <a:prstGeom prst="rect">
             <a:avLst/>
@@ -10226,14 +11787,14 @@
           <a:noFill/>
         </p:spPr>
         <p:txBody>
-          <a:bodyPr wrap="none" rtlCol="0">
+          <a:bodyPr wrap="square">
             <a:spAutoFit/>
           </a:bodyPr>
           <a:lstStyle/>
           <a:p>
             <a:r>
               <a:rPr lang="en-US" sz="1400" dirty="0"/>
-              <a:t>Screen pic of Pytest output</a:t>
+              <a:t>Resulting Pytest Function</a:t>
             </a:r>
           </a:p>
         </p:txBody>
@@ -10248,6 +11809,229 @@
   <p:clrMapOvr>
     <a:masterClrMapping/>
   </p:clrMapOvr>
+  <p:timing>
+    <p:tnLst>
+      <p:par>
+        <p:cTn id="1" dur="indefinite" restart="never" nodeType="tmRoot">
+          <p:childTnLst>
+            <p:seq concurrent="1" nextAc="seek">
+              <p:cTn id="2" dur="indefinite" nodeType="mainSeq">
+                <p:childTnLst>
+                  <p:par>
+                    <p:cTn id="3" fill="hold">
+                      <p:stCondLst>
+                        <p:cond delay="indefinite"/>
+                      </p:stCondLst>
+                      <p:childTnLst>
+                        <p:par>
+                          <p:cTn id="4" fill="hold">
+                            <p:stCondLst>
+                              <p:cond delay="0"/>
+                            </p:stCondLst>
+                            <p:childTnLst>
+                              <p:par>
+                                <p:cTn id="5" presetID="1" presetClass="entr" presetSubtype="0" fill="hold" grpId="0" nodeType="clickEffect">
+                                  <p:stCondLst>
+                                    <p:cond delay="0"/>
+                                  </p:stCondLst>
+                                  <p:childTnLst>
+                                    <p:set>
+                                      <p:cBhvr>
+                                        <p:cTn id="6" dur="1" fill="hold">
+                                          <p:stCondLst>
+                                            <p:cond delay="0"/>
+                                          </p:stCondLst>
+                                        </p:cTn>
+                                        <p:tgtEl>
+                                          <p:spTgt spid="5"/>
+                                        </p:tgtEl>
+                                        <p:attrNameLst>
+                                          <p:attrName>style.visibility</p:attrName>
+                                        </p:attrNameLst>
+                                      </p:cBhvr>
+                                      <p:to>
+                                        <p:strVal val="visible"/>
+                                      </p:to>
+                                    </p:set>
+                                  </p:childTnLst>
+                                </p:cTn>
+                              </p:par>
+                              <p:par>
+                                <p:cTn id="7" presetID="1" presetClass="entr" presetSubtype="0" fill="hold" nodeType="withEffect">
+                                  <p:stCondLst>
+                                    <p:cond delay="0"/>
+                                  </p:stCondLst>
+                                  <p:childTnLst>
+                                    <p:set>
+                                      <p:cBhvr>
+                                        <p:cTn id="8" dur="1" fill="hold">
+                                          <p:stCondLst>
+                                            <p:cond delay="0"/>
+                                          </p:stCondLst>
+                                        </p:cTn>
+                                        <p:tgtEl>
+                                          <p:spTgt spid="14"/>
+                                        </p:tgtEl>
+                                        <p:attrNameLst>
+                                          <p:attrName>style.visibility</p:attrName>
+                                        </p:attrNameLst>
+                                      </p:cBhvr>
+                                      <p:to>
+                                        <p:strVal val="visible"/>
+                                      </p:to>
+                                    </p:set>
+                                  </p:childTnLst>
+                                </p:cTn>
+                              </p:par>
+                            </p:childTnLst>
+                          </p:cTn>
+                        </p:par>
+                      </p:childTnLst>
+                    </p:cTn>
+                  </p:par>
+                  <p:par>
+                    <p:cTn id="9" fill="hold">
+                      <p:stCondLst>
+                        <p:cond delay="indefinite"/>
+                      </p:stCondLst>
+                      <p:childTnLst>
+                        <p:par>
+                          <p:cTn id="10" fill="hold">
+                            <p:stCondLst>
+                              <p:cond delay="0"/>
+                            </p:stCondLst>
+                            <p:childTnLst>
+                              <p:par>
+                                <p:cTn id="11" presetID="1" presetClass="entr" presetSubtype="0" fill="hold" grpId="0" nodeType="clickEffect">
+                                  <p:stCondLst>
+                                    <p:cond delay="0"/>
+                                  </p:stCondLst>
+                                  <p:childTnLst>
+                                    <p:set>
+                                      <p:cBhvr>
+                                        <p:cTn id="12" dur="1" fill="hold">
+                                          <p:stCondLst>
+                                            <p:cond delay="0"/>
+                                          </p:stCondLst>
+                                        </p:cTn>
+                                        <p:tgtEl>
+                                          <p:spTgt spid="16"/>
+                                        </p:tgtEl>
+                                        <p:attrNameLst>
+                                          <p:attrName>style.visibility</p:attrName>
+                                        </p:attrNameLst>
+                                      </p:cBhvr>
+                                      <p:to>
+                                        <p:strVal val="visible"/>
+                                      </p:to>
+                                    </p:set>
+                                  </p:childTnLst>
+                                </p:cTn>
+                              </p:par>
+                              <p:par>
+                                <p:cTn id="13" presetID="1" presetClass="entr" presetSubtype="0" fill="hold" nodeType="withEffect">
+                                  <p:stCondLst>
+                                    <p:cond delay="0"/>
+                                  </p:stCondLst>
+                                  <p:childTnLst>
+                                    <p:set>
+                                      <p:cBhvr>
+                                        <p:cTn id="14" dur="1" fill="hold">
+                                          <p:stCondLst>
+                                            <p:cond delay="0"/>
+                                          </p:stCondLst>
+                                        </p:cTn>
+                                        <p:tgtEl>
+                                          <p:spTgt spid="8"/>
+                                        </p:tgtEl>
+                                        <p:attrNameLst>
+                                          <p:attrName>style.visibility</p:attrName>
+                                        </p:attrNameLst>
+                                      </p:cBhvr>
+                                      <p:to>
+                                        <p:strVal val="visible"/>
+                                      </p:to>
+                                    </p:set>
+                                  </p:childTnLst>
+                                </p:cTn>
+                              </p:par>
+                            </p:childTnLst>
+                          </p:cTn>
+                        </p:par>
+                      </p:childTnLst>
+                    </p:cTn>
+                  </p:par>
+                  <p:par>
+                    <p:cTn id="15" fill="hold">
+                      <p:stCondLst>
+                        <p:cond delay="indefinite"/>
+                      </p:stCondLst>
+                      <p:childTnLst>
+                        <p:par>
+                          <p:cTn id="16" fill="hold">
+                            <p:stCondLst>
+                              <p:cond delay="0"/>
+                            </p:stCondLst>
+                            <p:childTnLst>
+                              <p:par>
+                                <p:cTn id="17" presetID="1" presetClass="entr" presetSubtype="0" fill="hold" nodeType="clickEffect">
+                                  <p:stCondLst>
+                                    <p:cond delay="0"/>
+                                  </p:stCondLst>
+                                  <p:childTnLst>
+                                    <p:set>
+                                      <p:cBhvr>
+                                        <p:cTn id="18" dur="1" fill="hold">
+                                          <p:stCondLst>
+                                            <p:cond delay="0"/>
+                                          </p:stCondLst>
+                                        </p:cTn>
+                                        <p:tgtEl>
+                                          <p:spTgt spid="6"/>
+                                        </p:tgtEl>
+                                        <p:attrNameLst>
+                                          <p:attrName>style.visibility</p:attrName>
+                                        </p:attrNameLst>
+                                      </p:cBhvr>
+                                      <p:to>
+                                        <p:strVal val="visible"/>
+                                      </p:to>
+                                    </p:set>
+                                  </p:childTnLst>
+                                </p:cTn>
+                              </p:par>
+                            </p:childTnLst>
+                          </p:cTn>
+                        </p:par>
+                      </p:childTnLst>
+                    </p:cTn>
+                  </p:par>
+                </p:childTnLst>
+              </p:cTn>
+              <p:prevCondLst>
+                <p:cond evt="onPrev" delay="0">
+                  <p:tgtEl>
+                    <p:sldTgt/>
+                  </p:tgtEl>
+                </p:cond>
+              </p:prevCondLst>
+              <p:nextCondLst>
+                <p:cond evt="onNext" delay="0">
+                  <p:tgtEl>
+                    <p:sldTgt/>
+                  </p:tgtEl>
+                </p:cond>
+              </p:nextCondLst>
+            </p:seq>
+          </p:childTnLst>
+        </p:cTn>
+      </p:par>
+    </p:tnLst>
+    <p:bldLst>
+      <p:bldP spid="5" grpId="0"/>
+      <p:bldP spid="16" grpId="0"/>
+    </p:bldLst>
+  </p:timing>
 </p:sld>
 </file>
 
@@ -10282,66 +12066,6 @@
           <a:chExt cx="0" cy="0"/>
         </a:xfrm>
       </p:grpSpPr>
-      <p:sp useBgFill="1">
-        <p:nvSpPr>
-          <p:cNvPr id="32" name="Rectangle 31">
-            <a:extLst>
-              <a:ext uri="{FF2B5EF4-FFF2-40B4-BE49-F238E27FC236}">
-                <a16:creationId xmlns:a16="http://schemas.microsoft.com/office/drawing/2014/main" id="{38624205-A9EF-2B52-DED4-731B59A7EDE0}"/>
-              </a:ext>
-              <a:ext uri="{C183D7F6-B498-43B3-948B-1728B52AA6E4}">
-                <adec:decorative xmlns:adec="http://schemas.microsoft.com/office/drawing/2017/decorative" val="1"/>
-              </a:ext>
-            </a:extLst>
-          </p:cNvPr>
-          <p:cNvSpPr>
-            <a:spLocks noGrp="1" noRot="1" noChangeAspect="1" noMove="1" noResize="1" noEditPoints="1" noAdjustHandles="1" noChangeArrowheads="1" noChangeShapeType="1" noTextEdit="1"/>
-          </p:cNvSpPr>
-          <p:nvPr>
-            <p:extLst>
-              <p:ext uri="{386F3935-93C4-4BCD-93E2-E3B085C9AB24}">
-                <p16:designElem xmlns:p16="http://schemas.microsoft.com/office/powerpoint/2015/main" val="1"/>
-              </p:ext>
-            </p:extLst>
-          </p:nvPr>
-        </p:nvSpPr>
-        <p:spPr>
-          <a:xfrm>
-            <a:off x="0" y="0"/>
-            <a:ext cx="12192000" cy="6858000"/>
-          </a:xfrm>
-          <a:prstGeom prst="rect">
-            <a:avLst/>
-          </a:prstGeom>
-          <a:ln>
-            <a:noFill/>
-          </a:ln>
-        </p:spPr>
-        <p:style>
-          <a:lnRef idx="2">
-            <a:schemeClr val="accent1">
-              <a:shade val="50000"/>
-            </a:schemeClr>
-          </a:lnRef>
-          <a:fillRef idx="1">
-            <a:schemeClr val="accent1"/>
-          </a:fillRef>
-          <a:effectRef idx="0">
-            <a:schemeClr val="accent1"/>
-          </a:effectRef>
-          <a:fontRef idx="minor">
-            <a:schemeClr val="lt1"/>
-          </a:fontRef>
-        </p:style>
-        <p:txBody>
-          <a:bodyPr rtlCol="0" anchor="ctr"/>
-          <a:lstStyle/>
-          <a:p>
-            <a:pPr algn="ctr"/>
-            <a:endParaRPr lang="en-US"/>
-          </a:p>
-        </p:txBody>
-      </p:sp>
       <p:sp>
         <p:nvSpPr>
           <p:cNvPr id="2" name="Title 1">
@@ -10360,22 +12084,18 @@
         </p:nvSpPr>
         <p:spPr>
           <a:xfrm>
-            <a:off x="581193" y="702156"/>
-            <a:ext cx="6822142" cy="1013800"/>
+            <a:off x="581192" y="702156"/>
+            <a:ext cx="11029616" cy="1188720"/>
           </a:xfrm>
         </p:spPr>
         <p:txBody>
-          <a:bodyPr anchor="t" anchorCtr="0">
+          <a:bodyPr anchorCtr="0">
             <a:normAutofit/>
           </a:bodyPr>
           <a:lstStyle/>
           <a:p>
             <a:r>
-              <a:rPr lang="en-US" dirty="0">
-                <a:solidFill>
-                  <a:schemeClr val="tx2"/>
-                </a:solidFill>
-              </a:rPr>
+              <a:rPr lang="en-US"/>
               <a:t>AI Tools For Coded Models</a:t>
             </a:r>
           </a:p>
@@ -10383,10 +12103,10 @@
       </p:sp>
       <p:sp>
         <p:nvSpPr>
-          <p:cNvPr id="34" name="Rectangle 33">
+          <p:cNvPr id="39" name="Rectangle 38">
             <a:extLst>
               <a:ext uri="{FF2B5EF4-FFF2-40B4-BE49-F238E27FC236}">
-                <a16:creationId xmlns:a16="http://schemas.microsoft.com/office/drawing/2014/main" id="{5ECE5442-1030-2596-2F16-B05E09BE1A86}"/>
+                <a16:creationId xmlns:a16="http://schemas.microsoft.com/office/drawing/2014/main" id="{7A4CA679-3546-4E14-8FB8-F57168C37635}"/>
               </a:ext>
               <a:ext uri="{C183D7F6-B498-43B3-948B-1728B52AA6E4}">
                 <adec:decorative xmlns:adec="http://schemas.microsoft.com/office/drawing/2017/decorative" val="1"/>
@@ -10407,7 +12127,68 @@
         <p:spPr>
           <a:xfrm>
             <a:off x="446534" y="457200"/>
-            <a:ext cx="6675120" cy="94997"/>
+            <a:ext cx="3703320" cy="94997"/>
+          </a:xfrm>
+          <a:prstGeom prst="rect">
+            <a:avLst/>
+          </a:prstGeom>
+          <a:solidFill>
+            <a:srgbClr val="465359"/>
+          </a:solidFill>
+          <a:ln>
+            <a:noFill/>
+          </a:ln>
+          <a:effectLst/>
+        </p:spPr>
+        <p:style>
+          <a:lnRef idx="1">
+            <a:schemeClr val="accent1"/>
+          </a:lnRef>
+          <a:fillRef idx="3">
+            <a:schemeClr val="accent1"/>
+          </a:fillRef>
+          <a:effectRef idx="2">
+            <a:schemeClr val="accent1"/>
+          </a:effectRef>
+          <a:fontRef idx="minor">
+            <a:schemeClr val="lt1"/>
+          </a:fontRef>
+        </p:style>
+        <p:txBody>
+          <a:bodyPr/>
+          <a:lstStyle/>
+          <a:p>
+            <a:endParaRPr lang="en-US"/>
+          </a:p>
+        </p:txBody>
+      </p:sp>
+      <p:sp>
+        <p:nvSpPr>
+          <p:cNvPr id="41" name="Rectangle 40">
+            <a:extLst>
+              <a:ext uri="{FF2B5EF4-FFF2-40B4-BE49-F238E27FC236}">
+                <a16:creationId xmlns:a16="http://schemas.microsoft.com/office/drawing/2014/main" id="{44D16E90-7C64-4C04-A50A-B866A1A92B4E}"/>
+              </a:ext>
+              <a:ext uri="{C183D7F6-B498-43B3-948B-1728B52AA6E4}">
+                <adec:decorative xmlns:adec="http://schemas.microsoft.com/office/drawing/2017/decorative" val="1"/>
+              </a:ext>
+            </a:extLst>
+          </p:cNvPr>
+          <p:cNvSpPr>
+            <a:spLocks noGrp="1" noRot="1" noChangeAspect="1" noMove="1" noResize="1" noEditPoints="1" noAdjustHandles="1" noChangeArrowheads="1" noChangeShapeType="1" noTextEdit="1"/>
+          </p:cNvSpPr>
+          <p:nvPr>
+            <p:extLst>
+              <p:ext uri="{386F3935-93C4-4BCD-93E2-E3B085C9AB24}">
+                <p16:designElem xmlns:p16="http://schemas.microsoft.com/office/powerpoint/2015/main" val="1"/>
+              </p:ext>
+            </p:extLst>
+          </p:nvPr>
+        </p:nvSpPr>
+        <p:spPr>
+          <a:xfrm>
+            <a:off x="4241830" y="457200"/>
+            <a:ext cx="3703320" cy="91440"/>
           </a:xfrm>
           <a:prstGeom prst="rect">
             <a:avLst/>
@@ -10444,6 +12225,169 @@
       </p:sp>
       <p:sp>
         <p:nvSpPr>
+          <p:cNvPr id="43" name="Rectangle 42">
+            <a:extLst>
+              <a:ext uri="{FF2B5EF4-FFF2-40B4-BE49-F238E27FC236}">
+                <a16:creationId xmlns:a16="http://schemas.microsoft.com/office/drawing/2014/main" id="{DBE4DD59-5AA2-46C6-B6A8-9B4C62D19877}"/>
+              </a:ext>
+              <a:ext uri="{C183D7F6-B498-43B3-948B-1728B52AA6E4}">
+                <adec:decorative xmlns:adec="http://schemas.microsoft.com/office/drawing/2017/decorative" val="1"/>
+              </a:ext>
+            </a:extLst>
+          </p:cNvPr>
+          <p:cNvSpPr>
+            <a:spLocks noGrp="1" noRot="1" noChangeAspect="1" noMove="1" noResize="1" noEditPoints="1" noAdjustHandles="1" noChangeArrowheads="1" noChangeShapeType="1" noTextEdit="1"/>
+          </p:cNvSpPr>
+          <p:nvPr>
+            <p:extLst>
+              <p:ext uri="{386F3935-93C4-4BCD-93E2-E3B085C9AB24}">
+                <p16:designElem xmlns:p16="http://schemas.microsoft.com/office/powerpoint/2015/main" val="1"/>
+              </p:ext>
+            </p:extLst>
+          </p:nvPr>
+        </p:nvSpPr>
+        <p:spPr>
+          <a:xfrm>
+            <a:off x="8042147" y="453643"/>
+            <a:ext cx="3703320" cy="98554"/>
+          </a:xfrm>
+          <a:prstGeom prst="rect">
+            <a:avLst/>
+          </a:prstGeom>
+          <a:solidFill>
+            <a:srgbClr val="969FA7"/>
+          </a:solidFill>
+          <a:ln>
+            <a:noFill/>
+          </a:ln>
+          <a:effectLst/>
+        </p:spPr>
+        <p:style>
+          <a:lnRef idx="1">
+            <a:schemeClr val="accent1"/>
+          </a:lnRef>
+          <a:fillRef idx="3">
+            <a:schemeClr val="accent1"/>
+          </a:fillRef>
+          <a:effectRef idx="2">
+            <a:schemeClr val="accent1"/>
+          </a:effectRef>
+          <a:fontRef idx="minor">
+            <a:schemeClr val="lt1"/>
+          </a:fontRef>
+        </p:style>
+        <p:txBody>
+          <a:bodyPr/>
+          <a:lstStyle/>
+          <a:p>
+            <a:endParaRPr lang="en-US"/>
+          </a:p>
+        </p:txBody>
+      </p:sp>
+      <p:sp>
+        <p:nvSpPr>
+          <p:cNvPr id="45" name="Rectangle 44">
+            <a:extLst>
+              <a:ext uri="{FF2B5EF4-FFF2-40B4-BE49-F238E27FC236}">
+                <a16:creationId xmlns:a16="http://schemas.microsoft.com/office/drawing/2014/main" id="{160CE81C-67DC-489E-BFFB-877C80B854DB}"/>
+              </a:ext>
+              <a:ext uri="{C183D7F6-B498-43B3-948B-1728B52AA6E4}">
+                <adec:decorative xmlns:adec="http://schemas.microsoft.com/office/drawing/2017/decorative" val="1"/>
+              </a:ext>
+            </a:extLst>
+          </p:cNvPr>
+          <p:cNvSpPr>
+            <a:spLocks noGrp="1" noRot="1" noChangeAspect="1" noMove="1" noResize="1" noEditPoints="1" noAdjustHandles="1" noChangeArrowheads="1" noChangeShapeType="1" noTextEdit="1"/>
+          </p:cNvSpPr>
+          <p:nvPr>
+            <p:extLst>
+              <p:ext uri="{386F3935-93C4-4BCD-93E2-E3B085C9AB24}">
+                <p16:designElem xmlns:p16="http://schemas.microsoft.com/office/powerpoint/2015/main" val="1"/>
+              </p:ext>
+            </p:extLst>
+          </p:nvPr>
+        </p:nvSpPr>
+        <p:spPr>
+          <a:xfrm>
+            <a:off x="446533" y="2180496"/>
+            <a:ext cx="5404639" cy="4045683"/>
+          </a:xfrm>
+          <a:prstGeom prst="rect">
+            <a:avLst/>
+          </a:prstGeom>
+          <a:solidFill>
+            <a:srgbClr val="FFFFFF">
+              <a:alpha val="80000"/>
+            </a:srgbClr>
+          </a:solidFill>
+          <a:ln w="38100">
+            <a:solidFill>
+              <a:srgbClr val="465359"/>
+            </a:solidFill>
+          </a:ln>
+        </p:spPr>
+        <p:style>
+          <a:lnRef idx="2">
+            <a:schemeClr val="accent1">
+              <a:shade val="50000"/>
+            </a:schemeClr>
+          </a:lnRef>
+          <a:fillRef idx="1">
+            <a:schemeClr val="accent1"/>
+          </a:fillRef>
+          <a:effectRef idx="0">
+            <a:schemeClr val="accent1"/>
+          </a:effectRef>
+          <a:fontRef idx="minor">
+            <a:schemeClr val="lt1"/>
+          </a:fontRef>
+        </p:style>
+        <p:txBody>
+          <a:bodyPr rtlCol="0" anchor="ctr"/>
+          <a:lstStyle/>
+          <a:p>
+            <a:pPr algn="ctr"/>
+            <a:endParaRPr lang="en-US"/>
+          </a:p>
+        </p:txBody>
+      </p:sp>
+      <p:pic>
+        <p:nvPicPr>
+          <p:cNvPr id="5" name="Picture 4" descr="A screenshot of a computer&#10;&#10;AI-generated content may be incorrect.">
+            <a:extLst>
+              <a:ext uri="{FF2B5EF4-FFF2-40B4-BE49-F238E27FC236}">
+                <a16:creationId xmlns:a16="http://schemas.microsoft.com/office/drawing/2014/main" id="{A4B50A91-C383-F741-271F-6642C28ED593}"/>
+              </a:ext>
+            </a:extLst>
+          </p:cNvPr>
+          <p:cNvPicPr>
+            <a:picLocks noChangeAspect="1"/>
+          </p:cNvPicPr>
+          <p:nvPr/>
+        </p:nvPicPr>
+        <p:blipFill>
+          <a:blip r:embed="rId2">
+            <a:extLst>
+              <a:ext uri="{28A0092B-C50C-407E-A947-70E740481C1C}">
+                <a14:useLocalDpi xmlns:a14="http://schemas.microsoft.com/office/drawing/2010/main" val="0"/>
+              </a:ext>
+            </a:extLst>
+          </a:blip>
+          <a:srcRect r="554" b="3"/>
+          <a:stretch/>
+        </p:blipFill>
+        <p:spPr>
+          <a:xfrm>
+            <a:off x="611392" y="2347105"/>
+            <a:ext cx="5074920" cy="3712464"/>
+          </a:xfrm>
+          <a:prstGeom prst="rect">
+            <a:avLst/>
+          </a:prstGeom>
+        </p:spPr>
+      </p:pic>
+      <p:sp>
+        <p:nvSpPr>
           <p:cNvPr id="3" name="Content Placeholder 2">
             <a:extLst>
               <a:ext uri="{FF2B5EF4-FFF2-40B4-BE49-F238E27FC236}">
@@ -10460,100 +12404,110 @@
         </p:nvSpPr>
         <p:spPr>
           <a:xfrm>
-            <a:off x="222162" y="1319879"/>
-            <a:ext cx="6204037" cy="4309739"/>
+            <a:off x="6340830" y="979136"/>
+            <a:ext cx="5269977" cy="4996214"/>
           </a:xfrm>
         </p:spPr>
         <p:txBody>
-          <a:bodyPr anchor="t" anchorCtr="0">
-            <a:normAutofit/>
+          <a:bodyPr anchorCtr="0">
+            <a:normAutofit fontScale="92500" lnSpcReduction="10000"/>
           </a:bodyPr>
           <a:lstStyle/>
           <a:p>
-            <a:pPr lvl="1"/>
-            <a:r>
-              <a:rPr lang="en-US" dirty="0">
-                <a:solidFill>
-                  <a:schemeClr val="tx2"/>
-                </a:solidFill>
+            <a:pPr lvl="1">
+              <a:lnSpc>
+                <a:spcPct val="90000"/>
+              </a:lnSpc>
+            </a:pPr>
+            <a:r>
+              <a:rPr lang="en-US" sz="1500" dirty="0"/>
+              <a:t>Organization should provide subscription and not-so-subtly encourage use (“Can you share your background prompt for Copilot?”)</a:t>
+            </a:r>
+          </a:p>
+          <a:p>
+            <a:pPr lvl="1">
+              <a:lnSpc>
+                <a:spcPct val="90000"/>
+              </a:lnSpc>
+            </a:pPr>
+            <a:r>
+              <a:rPr lang="en-US" sz="1500" dirty="0"/>
+              <a:t>Github Copilot Chat + </a:t>
+            </a:r>
+            <a:r>
+              <a:rPr lang="en-US" sz="1500" dirty="0">
+                <a:hlinkClick r:id="rId3"/>
               </a:rPr>
-              <a:t>Organization should provide subscription and not-so-subtly encourage use (“Can you send me a link to an AI chat that explains your code?”)</a:t>
-            </a:r>
-          </a:p>
-          <a:p>
-            <a:pPr lvl="1"/>
-            <a:r>
-              <a:rPr lang="en-US" dirty="0">
-                <a:solidFill>
-                  <a:schemeClr val="tx2"/>
-                </a:solidFill>
-              </a:rPr>
-              <a:t>Github Copilot Chat + Microsoft VS Code is one, strong option</a:t>
-            </a:r>
-          </a:p>
-          <a:p>
-            <a:pPr lvl="1"/>
-            <a:r>
-              <a:rPr lang="en-US" dirty="0">
-                <a:solidFill>
-                  <a:schemeClr val="tx2"/>
-                </a:solidFill>
-              </a:rPr>
+              <a:t>Microsoft VS Code </a:t>
+            </a:r>
+            <a:r>
+              <a:rPr lang="en-US" sz="1500" dirty="0"/>
+              <a:t>is one, strong option (can select AI model to use)</a:t>
+            </a:r>
+          </a:p>
+          <a:p>
+            <a:pPr lvl="1">
+              <a:lnSpc>
+                <a:spcPct val="90000"/>
+              </a:lnSpc>
+            </a:pPr>
+            <a:r>
+              <a:rPr lang="en-US" sz="1500" dirty="0"/>
               <a:t>[Typical] Use Case 1 = one-time queries like “How to write a custom, Python iterator for to iterate over a range of DataFrame cells?”</a:t>
             </a:r>
           </a:p>
           <a:p>
-            <a:pPr lvl="1"/>
-            <a:r>
-              <a:rPr lang="en-US" dirty="0">
-                <a:solidFill>
-                  <a:schemeClr val="tx2"/>
-                </a:solidFill>
-              </a:rPr>
+            <a:pPr lvl="1">
+              <a:lnSpc>
+                <a:spcPct val="90000"/>
+              </a:lnSpc>
+            </a:pPr>
+            <a:r>
+              <a:rPr lang="en-US" sz="1500" dirty="0"/>
               <a:t>[More valuable] Use Case 2 = “Write the FitRawData function and its Pytest test_FitRawData that creates mockup data…”</a:t>
             </a:r>
           </a:p>
           <a:p>
-            <a:pPr lvl="2"/>
-            <a:r>
-              <a:rPr lang="en-US" b="1" dirty="0">
-                <a:solidFill>
-                  <a:schemeClr val="tx2"/>
-                </a:solidFill>
-              </a:rPr>
+            <a:pPr lvl="2">
+              <a:lnSpc>
+                <a:spcPct val="90000"/>
+              </a:lnSpc>
+            </a:pPr>
+            <a:r>
+              <a:rPr lang="en-US" sz="1500" b="1" dirty="0"/>
               <a:t>Previous best practices of object-oriented and modular, single-action functions + tests are an ideal fit with using current AI chat tools</a:t>
             </a:r>
           </a:p>
           <a:p>
-            <a:pPr lvl="2"/>
-            <a:r>
-              <a:rPr lang="en-US" dirty="0">
-                <a:solidFill>
-                  <a:schemeClr val="tx2"/>
-                </a:solidFill>
-              </a:rPr>
+            <a:pPr lvl="2">
+              <a:lnSpc>
+                <a:spcPct val="90000"/>
+              </a:lnSpc>
+            </a:pPr>
+            <a:r>
+              <a:rPr lang="en-US" sz="1500" dirty="0"/>
               <a:t>Need to supply tool with background to explain “how life works.” This can be standard/pasteable text file (tutorial example)</a:t>
             </a:r>
           </a:p>
           <a:p>
-            <a:pPr lvl="2"/>
-            <a:r>
-              <a:rPr lang="en-US" dirty="0">
-                <a:solidFill>
-                  <a:schemeClr val="tx2"/>
-                </a:solidFill>
-              </a:rPr>
+            <a:pPr lvl="2">
+              <a:lnSpc>
+                <a:spcPct val="90000"/>
+              </a:lnSpc>
+            </a:pPr>
+            <a:r>
+              <a:rPr lang="en-US" sz="1500" dirty="0"/>
               <a:t>For many modelers, requires more pre-planning than historical practices</a:t>
             </a:r>
           </a:p>
           <a:p>
-            <a:pPr lvl="2"/>
-            <a:r>
-              <a:rPr lang="en-US" dirty="0">
-                <a:solidFill>
-                  <a:schemeClr val="tx2"/>
-                </a:solidFill>
-              </a:rPr>
+            <a:pPr lvl="2">
+              <a:lnSpc>
+                <a:spcPct val="90000"/>
+              </a:lnSpc>
+            </a:pPr>
+            <a:r>
+              <a:rPr lang="en-US" sz="1500" dirty="0"/>
               <a:t>Does not eliminate need for knowing coding –AI tools make mistakes and/or can stray from background intent</a:t>
             </a:r>
           </a:p>
@@ -10569,6 +12523,209 @@
   <p:clrMapOvr>
     <a:masterClrMapping/>
   </p:clrMapOvr>
+  <p:timing>
+    <p:tnLst>
+      <p:par>
+        <p:cTn id="1" dur="indefinite" restart="never" nodeType="tmRoot">
+          <p:childTnLst>
+            <p:seq concurrent="1" nextAc="seek">
+              <p:cTn id="2" dur="indefinite" nodeType="mainSeq">
+                <p:childTnLst>
+                  <p:par>
+                    <p:cTn id="3" fill="hold">
+                      <p:stCondLst>
+                        <p:cond delay="indefinite"/>
+                      </p:stCondLst>
+                      <p:childTnLst>
+                        <p:par>
+                          <p:cTn id="4" fill="hold">
+                            <p:stCondLst>
+                              <p:cond delay="0"/>
+                            </p:stCondLst>
+                            <p:childTnLst>
+                              <p:par>
+                                <p:cTn id="5" presetID="1" presetClass="entr" presetSubtype="0" fill="hold" nodeType="clickEffect">
+                                  <p:stCondLst>
+                                    <p:cond delay="0"/>
+                                  </p:stCondLst>
+                                  <p:childTnLst>
+                                    <p:set>
+                                      <p:cBhvr>
+                                        <p:cTn id="6" dur="1" fill="hold">
+                                          <p:stCondLst>
+                                            <p:cond delay="0"/>
+                                          </p:stCondLst>
+                                        </p:cTn>
+                                        <p:tgtEl>
+                                          <p:spTgt spid="3">
+                                            <p:txEl>
+                                              <p:pRg st="3" end="3"/>
+                                            </p:txEl>
+                                          </p:spTgt>
+                                        </p:tgtEl>
+                                        <p:attrNameLst>
+                                          <p:attrName>style.visibility</p:attrName>
+                                        </p:attrNameLst>
+                                      </p:cBhvr>
+                                      <p:to>
+                                        <p:strVal val="visible"/>
+                                      </p:to>
+                                    </p:set>
+                                  </p:childTnLst>
+                                </p:cTn>
+                              </p:par>
+                              <p:par>
+                                <p:cTn id="7" presetID="1" presetClass="entr" presetSubtype="0" fill="hold" nodeType="withEffect">
+                                  <p:stCondLst>
+                                    <p:cond delay="0"/>
+                                  </p:stCondLst>
+                                  <p:childTnLst>
+                                    <p:set>
+                                      <p:cBhvr>
+                                        <p:cTn id="8" dur="1" fill="hold">
+                                          <p:stCondLst>
+                                            <p:cond delay="0"/>
+                                          </p:stCondLst>
+                                        </p:cTn>
+                                        <p:tgtEl>
+                                          <p:spTgt spid="3">
+                                            <p:txEl>
+                                              <p:pRg st="4" end="4"/>
+                                            </p:txEl>
+                                          </p:spTgt>
+                                        </p:tgtEl>
+                                        <p:attrNameLst>
+                                          <p:attrName>style.visibility</p:attrName>
+                                        </p:attrNameLst>
+                                      </p:cBhvr>
+                                      <p:to>
+                                        <p:strVal val="visible"/>
+                                      </p:to>
+                                    </p:set>
+                                  </p:childTnLst>
+                                </p:cTn>
+                              </p:par>
+                              <p:par>
+                                <p:cTn id="9" presetID="1" presetClass="entr" presetSubtype="0" fill="hold" nodeType="withEffect">
+                                  <p:stCondLst>
+                                    <p:cond delay="0"/>
+                                  </p:stCondLst>
+                                  <p:childTnLst>
+                                    <p:set>
+                                      <p:cBhvr>
+                                        <p:cTn id="10" dur="1" fill="hold">
+                                          <p:stCondLst>
+                                            <p:cond delay="0"/>
+                                          </p:stCondLst>
+                                        </p:cTn>
+                                        <p:tgtEl>
+                                          <p:spTgt spid="3">
+                                            <p:txEl>
+                                              <p:pRg st="5" end="5"/>
+                                            </p:txEl>
+                                          </p:spTgt>
+                                        </p:tgtEl>
+                                        <p:attrNameLst>
+                                          <p:attrName>style.visibility</p:attrName>
+                                        </p:attrNameLst>
+                                      </p:cBhvr>
+                                      <p:to>
+                                        <p:strVal val="visible"/>
+                                      </p:to>
+                                    </p:set>
+                                  </p:childTnLst>
+                                </p:cTn>
+                              </p:par>
+                              <p:par>
+                                <p:cTn id="11" presetID="1" presetClass="entr" presetSubtype="0" fill="hold" nodeType="withEffect">
+                                  <p:stCondLst>
+                                    <p:cond delay="0"/>
+                                  </p:stCondLst>
+                                  <p:childTnLst>
+                                    <p:set>
+                                      <p:cBhvr>
+                                        <p:cTn id="12" dur="1" fill="hold">
+                                          <p:stCondLst>
+                                            <p:cond delay="0"/>
+                                          </p:stCondLst>
+                                        </p:cTn>
+                                        <p:tgtEl>
+                                          <p:spTgt spid="3">
+                                            <p:txEl>
+                                              <p:pRg st="6" end="6"/>
+                                            </p:txEl>
+                                          </p:spTgt>
+                                        </p:tgtEl>
+                                        <p:attrNameLst>
+                                          <p:attrName>style.visibility</p:attrName>
+                                        </p:attrNameLst>
+                                      </p:cBhvr>
+                                      <p:to>
+                                        <p:strVal val="visible"/>
+                                      </p:to>
+                                    </p:set>
+                                  </p:childTnLst>
+                                </p:cTn>
+                              </p:par>
+                              <p:par>
+                                <p:cTn id="13" presetID="1" presetClass="entr" presetSubtype="0" fill="hold" nodeType="withEffect">
+                                  <p:stCondLst>
+                                    <p:cond delay="0"/>
+                                  </p:stCondLst>
+                                  <p:childTnLst>
+                                    <p:set>
+                                      <p:cBhvr>
+                                        <p:cTn id="14" dur="1" fill="hold">
+                                          <p:stCondLst>
+                                            <p:cond delay="0"/>
+                                          </p:stCondLst>
+                                        </p:cTn>
+                                        <p:tgtEl>
+                                          <p:spTgt spid="3">
+                                            <p:txEl>
+                                              <p:pRg st="7" end="7"/>
+                                            </p:txEl>
+                                          </p:spTgt>
+                                        </p:tgtEl>
+                                        <p:attrNameLst>
+                                          <p:attrName>style.visibility</p:attrName>
+                                        </p:attrNameLst>
+                                      </p:cBhvr>
+                                      <p:to>
+                                        <p:strVal val="visible"/>
+                                      </p:to>
+                                    </p:set>
+                                  </p:childTnLst>
+                                </p:cTn>
+                              </p:par>
+                            </p:childTnLst>
+                          </p:cTn>
+                        </p:par>
+                      </p:childTnLst>
+                    </p:cTn>
+                  </p:par>
+                </p:childTnLst>
+              </p:cTn>
+              <p:prevCondLst>
+                <p:cond evt="onPrev" delay="0">
+                  <p:tgtEl>
+                    <p:sldTgt/>
+                  </p:tgtEl>
+                </p:cond>
+              </p:prevCondLst>
+              <p:nextCondLst>
+                <p:cond evt="onNext" delay="0">
+                  <p:tgtEl>
+                    <p:sldTgt/>
+                  </p:tgtEl>
+                </p:cond>
+              </p:nextCondLst>
+            </p:seq>
+          </p:childTnLst>
+        </p:cTn>
+      </p:par>
+    </p:tnLst>
+  </p:timing>
 </p:sld>
 </file>
 

</xml_diff>